<commit_message>
learn tutorial chapter 1 part 1
</commit_message>
<xml_diff>
--- a/OpenSCAD.pptx
+++ b/OpenSCAD.pptx
@@ -5,13 +5,16 @@
     <p:sldMasterId id="2147483672" r:id="rId4"/>
   </p:sldMasterIdLst>
   <p:notesMasterIdLst>
-    <p:notesMasterId r:id="rId6"/>
+    <p:notesMasterId r:id="rId9"/>
   </p:notesMasterIdLst>
   <p:handoutMasterIdLst>
-    <p:handoutMasterId r:id="rId7"/>
+    <p:handoutMasterId r:id="rId10"/>
   </p:handoutMasterIdLst>
   <p:sldIdLst>
     <p:sldId id="256" r:id="rId5"/>
+    <p:sldId id="257" r:id="rId6"/>
+    <p:sldId id="258" r:id="rId7"/>
+    <p:sldId id="259" r:id="rId8"/>
   </p:sldIdLst>
   <p:sldSz cx="12192000" cy="6858000"/>
   <p:notesSz cx="6858000" cy="9144000"/>
@@ -5094,6 +5097,555 @@
     <p:extLst>
       <p:ext uri="{BB962C8B-B14F-4D97-AF65-F5344CB8AC3E}">
         <p14:creationId xmlns:p14="http://schemas.microsoft.com/office/powerpoint/2010/main" val="1487700712"/>
+      </p:ext>
+    </p:extLst>
+  </p:cSld>
+  <p:clrMapOvr>
+    <a:masterClrMapping/>
+  </p:clrMapOvr>
+</p:sld>
+</file>
+
+<file path=ppt/slides/slide2.xml><?xml version="1.0" encoding="utf-8"?>
+<p:sld xmlns:a="http://schemas.openxmlformats.org/drawingml/2006/main" xmlns:r="http://schemas.openxmlformats.org/officeDocument/2006/relationships" xmlns:p="http://schemas.openxmlformats.org/presentationml/2006/main">
+  <p:cSld>
+    <p:spTree>
+      <p:nvGrpSpPr>
+        <p:cNvPr id="1" name=""/>
+        <p:cNvGrpSpPr/>
+        <p:nvPr/>
+      </p:nvGrpSpPr>
+      <p:grpSpPr>
+        <a:xfrm>
+          <a:off x="0" y="0"/>
+          <a:ext cx="0" cy="0"/>
+          <a:chOff x="0" y="0"/>
+          <a:chExt cx="0" cy="0"/>
+        </a:xfrm>
+      </p:grpSpPr>
+      <p:sp>
+        <p:nvSpPr>
+          <p:cNvPr id="4" name="Title 3">
+            <a:extLst>
+              <a:ext uri="{FF2B5EF4-FFF2-40B4-BE49-F238E27FC236}">
+                <a16:creationId xmlns:a16="http://schemas.microsoft.com/office/drawing/2014/main" id="{1E1A75EA-3DE1-6BD1-8A84-A8D3D57E2F03}"/>
+              </a:ext>
+            </a:extLst>
+          </p:cNvPr>
+          <p:cNvSpPr>
+            <a:spLocks noGrp="1"/>
+          </p:cNvSpPr>
+          <p:nvPr>
+            <p:ph type="ctrTitle"/>
+          </p:nvPr>
+        </p:nvSpPr>
+        <p:spPr>
+          <a:xfrm>
+            <a:off x="581191" y="756139"/>
+            <a:ext cx="10993549" cy="1072662"/>
+          </a:xfrm>
+        </p:spPr>
+        <p:txBody>
+          <a:bodyPr>
+            <a:normAutofit/>
+          </a:bodyPr>
+          <a:lstStyle/>
+          <a:p>
+            <a:r>
+              <a:rPr lang="en-US" sz="4800" cap="none" dirty="0"/>
+              <a:t>OpenSCAD Modeling Practice</a:t>
+            </a:r>
+          </a:p>
+        </p:txBody>
+      </p:sp>
+      <p:sp>
+        <p:nvSpPr>
+          <p:cNvPr id="5" name="Subtitle 4">
+            <a:extLst>
+              <a:ext uri="{FF2B5EF4-FFF2-40B4-BE49-F238E27FC236}">
+                <a16:creationId xmlns:a16="http://schemas.microsoft.com/office/drawing/2014/main" id="{4B2FCE2E-86B8-4A2C-B7B7-0B929427A000}"/>
+              </a:ext>
+            </a:extLst>
+          </p:cNvPr>
+          <p:cNvSpPr>
+            <a:spLocks noGrp="1"/>
+          </p:cNvSpPr>
+          <p:nvPr>
+            <p:ph type="subTitle" idx="1"/>
+          </p:nvPr>
+        </p:nvSpPr>
+        <p:spPr>
+          <a:xfrm>
+            <a:off x="581194" y="2127739"/>
+            <a:ext cx="10993546" cy="958028"/>
+          </a:xfrm>
+        </p:spPr>
+        <p:txBody>
+          <a:bodyPr>
+            <a:normAutofit/>
+          </a:bodyPr>
+          <a:lstStyle/>
+          <a:p>
+            <a:r>
+              <a:rPr lang="en-US" sz="3600" dirty="0"/>
+              <a:t>Installation and Configure the Tool</a:t>
+            </a:r>
+          </a:p>
+        </p:txBody>
+      </p:sp>
+      <p:pic>
+        <p:nvPicPr>
+          <p:cNvPr id="6" name="Picture 5" descr="A yellow and green object with holes&#10;&#10;Description automatically generated">
+            <a:extLst>
+              <a:ext uri="{FF2B5EF4-FFF2-40B4-BE49-F238E27FC236}">
+                <a16:creationId xmlns:a16="http://schemas.microsoft.com/office/drawing/2014/main" id="{0731BA8F-6478-2556-A80D-8B9077A55A1F}"/>
+              </a:ext>
+            </a:extLst>
+          </p:cNvPr>
+          <p:cNvPicPr>
+            <a:picLocks noChangeAspect="1"/>
+          </p:cNvPicPr>
+          <p:nvPr/>
+        </p:nvPicPr>
+        <p:blipFill>
+          <a:blip r:embed="rId2"/>
+          <a:stretch>
+            <a:fillRect/>
+          </a:stretch>
+        </p:blipFill>
+        <p:spPr>
+          <a:xfrm>
+            <a:off x="9101136" y="3458306"/>
+            <a:ext cx="1950794" cy="1623642"/>
+          </a:xfrm>
+          <a:prstGeom prst="roundRect">
+            <a:avLst>
+              <a:gd name="adj" fmla="val 8594"/>
+            </a:avLst>
+          </a:prstGeom>
+          <a:solidFill>
+            <a:srgbClr val="FFFFFF">
+              <a:shade val="85000"/>
+            </a:srgbClr>
+          </a:solidFill>
+          <a:ln>
+            <a:noFill/>
+          </a:ln>
+          <a:effectLst>
+            <a:reflection blurRad="12700" stA="38000" endPos="28000" dist="5000" dir="5400000" sy="-100000" algn="bl" rotWithShape="0"/>
+          </a:effectLst>
+        </p:spPr>
+      </p:pic>
+      <p:pic>
+        <p:nvPicPr>
+          <p:cNvPr id="8" name="Picture 7">
+            <a:extLst>
+              <a:ext uri="{FF2B5EF4-FFF2-40B4-BE49-F238E27FC236}">
+                <a16:creationId xmlns:a16="http://schemas.microsoft.com/office/drawing/2014/main" id="{E2FB51F4-946F-A340-488E-3F706FA0E9A5}"/>
+              </a:ext>
+            </a:extLst>
+          </p:cNvPr>
+          <p:cNvPicPr>
+            <a:picLocks noChangeAspect="1"/>
+          </p:cNvPicPr>
+          <p:nvPr/>
+        </p:nvPicPr>
+        <p:blipFill>
+          <a:blip r:embed="rId3"/>
+          <a:stretch>
+            <a:fillRect/>
+          </a:stretch>
+        </p:blipFill>
+        <p:spPr>
+          <a:xfrm>
+            <a:off x="2022230" y="3177337"/>
+            <a:ext cx="5322277" cy="3057141"/>
+          </a:xfrm>
+          <a:prstGeom prst="rect">
+            <a:avLst/>
+          </a:prstGeom>
+          <a:ln>
+            <a:noFill/>
+          </a:ln>
+          <a:effectLst>
+            <a:outerShdw blurRad="292100" dist="139700" dir="2700000" algn="tl" rotWithShape="0">
+              <a:srgbClr val="333333">
+                <a:alpha val="65000"/>
+              </a:srgbClr>
+            </a:outerShdw>
+          </a:effectLst>
+        </p:spPr>
+      </p:pic>
+    </p:spTree>
+    <p:extLst>
+      <p:ext uri="{BB962C8B-B14F-4D97-AF65-F5344CB8AC3E}">
+        <p14:creationId xmlns:p14="http://schemas.microsoft.com/office/powerpoint/2010/main" val="3308895958"/>
+      </p:ext>
+    </p:extLst>
+  </p:cSld>
+  <p:clrMapOvr>
+    <a:masterClrMapping/>
+  </p:clrMapOvr>
+</p:sld>
+</file>
+
+<file path=ppt/slides/slide3.xml><?xml version="1.0" encoding="utf-8"?>
+<p:sld xmlns:a="http://schemas.openxmlformats.org/drawingml/2006/main" xmlns:r="http://schemas.openxmlformats.org/officeDocument/2006/relationships" xmlns:p="http://schemas.openxmlformats.org/presentationml/2006/main">
+  <p:cSld>
+    <p:spTree>
+      <p:nvGrpSpPr>
+        <p:cNvPr id="1" name=""/>
+        <p:cNvGrpSpPr/>
+        <p:nvPr/>
+      </p:nvGrpSpPr>
+      <p:grpSpPr>
+        <a:xfrm>
+          <a:off x="0" y="0"/>
+          <a:ext cx="0" cy="0"/>
+          <a:chOff x="0" y="0"/>
+          <a:chExt cx="0" cy="0"/>
+        </a:xfrm>
+      </p:grpSpPr>
+      <p:sp>
+        <p:nvSpPr>
+          <p:cNvPr id="4" name="Title 3">
+            <a:extLst>
+              <a:ext uri="{FF2B5EF4-FFF2-40B4-BE49-F238E27FC236}">
+                <a16:creationId xmlns:a16="http://schemas.microsoft.com/office/drawing/2014/main" id="{1E1A75EA-3DE1-6BD1-8A84-A8D3D57E2F03}"/>
+              </a:ext>
+            </a:extLst>
+          </p:cNvPr>
+          <p:cNvSpPr>
+            <a:spLocks noGrp="1"/>
+          </p:cNvSpPr>
+          <p:nvPr>
+            <p:ph type="ctrTitle"/>
+          </p:nvPr>
+        </p:nvSpPr>
+        <p:spPr>
+          <a:xfrm>
+            <a:off x="581191" y="756139"/>
+            <a:ext cx="10993549" cy="1072662"/>
+          </a:xfrm>
+        </p:spPr>
+        <p:txBody>
+          <a:bodyPr>
+            <a:normAutofit/>
+          </a:bodyPr>
+          <a:lstStyle/>
+          <a:p>
+            <a:r>
+              <a:rPr lang="en-US" sz="4800" cap="none" dirty="0"/>
+              <a:t>OpenSCAD Modeling Practice</a:t>
+            </a:r>
+          </a:p>
+        </p:txBody>
+      </p:sp>
+      <p:sp>
+        <p:nvSpPr>
+          <p:cNvPr id="5" name="Subtitle 4">
+            <a:extLst>
+              <a:ext uri="{FF2B5EF4-FFF2-40B4-BE49-F238E27FC236}">
+                <a16:creationId xmlns:a16="http://schemas.microsoft.com/office/drawing/2014/main" id="{4B2FCE2E-86B8-4A2C-B7B7-0B929427A000}"/>
+              </a:ext>
+            </a:extLst>
+          </p:cNvPr>
+          <p:cNvSpPr>
+            <a:spLocks noGrp="1"/>
+          </p:cNvSpPr>
+          <p:nvPr>
+            <p:ph type="subTitle" idx="1"/>
+          </p:nvPr>
+        </p:nvSpPr>
+        <p:spPr>
+          <a:xfrm>
+            <a:off x="581194" y="2127739"/>
+            <a:ext cx="10993546" cy="958028"/>
+          </a:xfrm>
+        </p:spPr>
+        <p:txBody>
+          <a:bodyPr>
+            <a:normAutofit/>
+          </a:bodyPr>
+          <a:lstStyle/>
+          <a:p>
+            <a:r>
+              <a:rPr lang="en-US" sz="3600" cap="none" dirty="0"/>
+              <a:t>OpenSCAD Tutorial/Chapter 1 (part 1)</a:t>
+            </a:r>
+          </a:p>
+        </p:txBody>
+      </p:sp>
+      <p:pic>
+        <p:nvPicPr>
+          <p:cNvPr id="6" name="Picture 5" descr="A yellow and green object with holes&#10;&#10;Description automatically generated">
+            <a:extLst>
+              <a:ext uri="{FF2B5EF4-FFF2-40B4-BE49-F238E27FC236}">
+                <a16:creationId xmlns:a16="http://schemas.microsoft.com/office/drawing/2014/main" id="{0731BA8F-6478-2556-A80D-8B9077A55A1F}"/>
+              </a:ext>
+            </a:extLst>
+          </p:cNvPr>
+          <p:cNvPicPr>
+            <a:picLocks noChangeAspect="1"/>
+          </p:cNvPicPr>
+          <p:nvPr/>
+        </p:nvPicPr>
+        <p:blipFill>
+          <a:blip r:embed="rId2"/>
+          <a:stretch>
+            <a:fillRect/>
+          </a:stretch>
+        </p:blipFill>
+        <p:spPr>
+          <a:xfrm>
+            <a:off x="9101136" y="3458306"/>
+            <a:ext cx="1950794" cy="1623642"/>
+          </a:xfrm>
+          <a:prstGeom prst="roundRect">
+            <a:avLst>
+              <a:gd name="adj" fmla="val 8594"/>
+            </a:avLst>
+          </a:prstGeom>
+          <a:solidFill>
+            <a:srgbClr val="FFFFFF">
+              <a:shade val="85000"/>
+            </a:srgbClr>
+          </a:solidFill>
+          <a:ln>
+            <a:noFill/>
+          </a:ln>
+          <a:effectLst>
+            <a:reflection blurRad="12700" stA="38000" endPos="28000" dist="5000" dir="5400000" sy="-100000" algn="bl" rotWithShape="0"/>
+          </a:effectLst>
+        </p:spPr>
+      </p:pic>
+      <p:pic>
+        <p:nvPicPr>
+          <p:cNvPr id="3" name="Picture 2">
+            <a:extLst>
+              <a:ext uri="{FF2B5EF4-FFF2-40B4-BE49-F238E27FC236}">
+                <a16:creationId xmlns:a16="http://schemas.microsoft.com/office/drawing/2014/main" id="{CA2634B1-E323-5049-2425-487DFBE5C005}"/>
+              </a:ext>
+            </a:extLst>
+          </p:cNvPr>
+          <p:cNvPicPr>
+            <a:picLocks noChangeAspect="1"/>
+          </p:cNvPicPr>
+          <p:nvPr/>
+        </p:nvPicPr>
+        <p:blipFill>
+          <a:blip r:embed="rId3"/>
+          <a:stretch>
+            <a:fillRect/>
+          </a:stretch>
+        </p:blipFill>
+        <p:spPr>
+          <a:xfrm>
+            <a:off x="2057399" y="3310439"/>
+            <a:ext cx="4943475" cy="2715222"/>
+          </a:xfrm>
+          <a:prstGeom prst="rect">
+            <a:avLst/>
+          </a:prstGeom>
+          <a:ln>
+            <a:noFill/>
+          </a:ln>
+          <a:effectLst>
+            <a:outerShdw blurRad="292100" dist="139700" dir="2700000" algn="tl" rotWithShape="0">
+              <a:srgbClr val="333333">
+                <a:alpha val="65000"/>
+              </a:srgbClr>
+            </a:outerShdw>
+          </a:effectLst>
+        </p:spPr>
+      </p:pic>
+    </p:spTree>
+    <p:extLst>
+      <p:ext uri="{BB962C8B-B14F-4D97-AF65-F5344CB8AC3E}">
+        <p14:creationId xmlns:p14="http://schemas.microsoft.com/office/powerpoint/2010/main" val="4042695871"/>
+      </p:ext>
+    </p:extLst>
+  </p:cSld>
+  <p:clrMapOvr>
+    <a:masterClrMapping/>
+  </p:clrMapOvr>
+</p:sld>
+</file>
+
+<file path=ppt/slides/slide4.xml><?xml version="1.0" encoding="utf-8"?>
+<p:sld xmlns:a="http://schemas.openxmlformats.org/drawingml/2006/main" xmlns:r="http://schemas.openxmlformats.org/officeDocument/2006/relationships" xmlns:p="http://schemas.openxmlformats.org/presentationml/2006/main">
+  <p:cSld>
+    <p:spTree>
+      <p:nvGrpSpPr>
+        <p:cNvPr id="1" name=""/>
+        <p:cNvGrpSpPr/>
+        <p:nvPr/>
+      </p:nvGrpSpPr>
+      <p:grpSpPr>
+        <a:xfrm>
+          <a:off x="0" y="0"/>
+          <a:ext cx="0" cy="0"/>
+          <a:chOff x="0" y="0"/>
+          <a:chExt cx="0" cy="0"/>
+        </a:xfrm>
+      </p:grpSpPr>
+      <p:sp>
+        <p:nvSpPr>
+          <p:cNvPr id="4" name="Title 3">
+            <a:extLst>
+              <a:ext uri="{FF2B5EF4-FFF2-40B4-BE49-F238E27FC236}">
+                <a16:creationId xmlns:a16="http://schemas.microsoft.com/office/drawing/2014/main" id="{1E1A75EA-3DE1-6BD1-8A84-A8D3D57E2F03}"/>
+              </a:ext>
+            </a:extLst>
+          </p:cNvPr>
+          <p:cNvSpPr>
+            <a:spLocks noGrp="1"/>
+          </p:cNvSpPr>
+          <p:nvPr>
+            <p:ph type="ctrTitle"/>
+          </p:nvPr>
+        </p:nvSpPr>
+        <p:spPr>
+          <a:xfrm>
+            <a:off x="581191" y="756139"/>
+            <a:ext cx="10993549" cy="1072662"/>
+          </a:xfrm>
+        </p:spPr>
+        <p:txBody>
+          <a:bodyPr>
+            <a:normAutofit/>
+          </a:bodyPr>
+          <a:lstStyle/>
+          <a:p>
+            <a:r>
+              <a:rPr lang="en-US" sz="4800" cap="none" dirty="0"/>
+              <a:t>OpenSCAD Modeling Practice</a:t>
+            </a:r>
+          </a:p>
+        </p:txBody>
+      </p:sp>
+      <p:sp>
+        <p:nvSpPr>
+          <p:cNvPr id="5" name="Subtitle 4">
+            <a:extLst>
+              <a:ext uri="{FF2B5EF4-FFF2-40B4-BE49-F238E27FC236}">
+                <a16:creationId xmlns:a16="http://schemas.microsoft.com/office/drawing/2014/main" id="{4B2FCE2E-86B8-4A2C-B7B7-0B929427A000}"/>
+              </a:ext>
+            </a:extLst>
+          </p:cNvPr>
+          <p:cNvSpPr>
+            <a:spLocks noGrp="1"/>
+          </p:cNvSpPr>
+          <p:nvPr>
+            <p:ph type="subTitle" idx="1"/>
+          </p:nvPr>
+        </p:nvSpPr>
+        <p:spPr>
+          <a:xfrm>
+            <a:off x="581194" y="2127739"/>
+            <a:ext cx="10993546" cy="958028"/>
+          </a:xfrm>
+        </p:spPr>
+        <p:txBody>
+          <a:bodyPr>
+            <a:normAutofit/>
+          </a:bodyPr>
+          <a:lstStyle/>
+          <a:p>
+            <a:r>
+              <a:rPr lang="en-US" sz="3600" cap="none" dirty="0"/>
+              <a:t>OpenSCAD Tutorial/Chapter 1 (part 2)</a:t>
+            </a:r>
+          </a:p>
+        </p:txBody>
+      </p:sp>
+      <p:pic>
+        <p:nvPicPr>
+          <p:cNvPr id="6" name="Picture 5" descr="A yellow and green object with holes&#10;&#10;Description automatically generated">
+            <a:extLst>
+              <a:ext uri="{FF2B5EF4-FFF2-40B4-BE49-F238E27FC236}">
+                <a16:creationId xmlns:a16="http://schemas.microsoft.com/office/drawing/2014/main" id="{0731BA8F-6478-2556-A80D-8B9077A55A1F}"/>
+              </a:ext>
+            </a:extLst>
+          </p:cNvPr>
+          <p:cNvPicPr>
+            <a:picLocks noChangeAspect="1"/>
+          </p:cNvPicPr>
+          <p:nvPr/>
+        </p:nvPicPr>
+        <p:blipFill>
+          <a:blip r:embed="rId2"/>
+          <a:stretch>
+            <a:fillRect/>
+          </a:stretch>
+        </p:blipFill>
+        <p:spPr>
+          <a:xfrm>
+            <a:off x="9101136" y="3458306"/>
+            <a:ext cx="1950794" cy="1623642"/>
+          </a:xfrm>
+          <a:prstGeom prst="roundRect">
+            <a:avLst>
+              <a:gd name="adj" fmla="val 8594"/>
+            </a:avLst>
+          </a:prstGeom>
+          <a:solidFill>
+            <a:srgbClr val="FFFFFF">
+              <a:shade val="85000"/>
+            </a:srgbClr>
+          </a:solidFill>
+          <a:ln>
+            <a:noFill/>
+          </a:ln>
+          <a:effectLst>
+            <a:reflection blurRad="12700" stA="38000" endPos="28000" dist="5000" dir="5400000" sy="-100000" algn="bl" rotWithShape="0"/>
+          </a:effectLst>
+        </p:spPr>
+      </p:pic>
+      <p:pic>
+        <p:nvPicPr>
+          <p:cNvPr id="3" name="Picture 2">
+            <a:extLst>
+              <a:ext uri="{FF2B5EF4-FFF2-40B4-BE49-F238E27FC236}">
+                <a16:creationId xmlns:a16="http://schemas.microsoft.com/office/drawing/2014/main" id="{0649B26D-B1AD-2F13-9CF7-9078D3865F29}"/>
+              </a:ext>
+            </a:extLst>
+          </p:cNvPr>
+          <p:cNvPicPr>
+            <a:picLocks noChangeAspect="1"/>
+          </p:cNvPicPr>
+          <p:nvPr/>
+        </p:nvPicPr>
+        <p:blipFill>
+          <a:blip r:embed="rId3"/>
+          <a:stretch>
+            <a:fillRect/>
+          </a:stretch>
+        </p:blipFill>
+        <p:spPr>
+          <a:xfrm>
+            <a:off x="2256609" y="3265820"/>
+            <a:ext cx="4399168" cy="2943501"/>
+          </a:xfrm>
+          <a:prstGeom prst="rect">
+            <a:avLst/>
+          </a:prstGeom>
+          <a:ln>
+            <a:noFill/>
+          </a:ln>
+          <a:effectLst>
+            <a:outerShdw blurRad="292100" dist="139700" dir="2700000" algn="tl" rotWithShape="0">
+              <a:srgbClr val="333333">
+                <a:alpha val="65000"/>
+              </a:srgbClr>
+            </a:outerShdw>
+          </a:effectLst>
+        </p:spPr>
+      </p:pic>
+    </p:spTree>
+    <p:extLst>
+      <p:ext uri="{BB962C8B-B14F-4D97-AF65-F5344CB8AC3E}">
+        <p14:creationId xmlns:p14="http://schemas.microsoft.com/office/powerpoint/2010/main" val="1683202641"/>
       </p:ext>
     </p:extLst>
   </p:cSld>
@@ -5963,6 +6515,35 @@
 </file>
 
 <file path=customXml/item1.xml><?xml version="1.0" encoding="utf-8"?>
+<?mso-contentType ?>
+<FormTemplates xmlns="http://schemas.microsoft.com/sharepoint/v3/contenttype/forms">
+  <Display>DocumentLibraryForm</Display>
+  <Edit>DocumentLibraryForm</Edit>
+  <New>DocumentLibraryForm</New>
+</FormTemplates>
+</file>
+
+<file path=customXml/item2.xml><?xml version="1.0" encoding="utf-8"?>
+<p:properties xmlns:p="http://schemas.microsoft.com/office/2006/metadata/properties" xmlns:xsi="http://www.w3.org/2001/XMLSchema-instance" xmlns:pc="http://schemas.microsoft.com/office/infopath/2007/PartnerControls">
+  <documentManagement>
+    <_ip_UnifiedCompliancePolicyUIAction xmlns="http://schemas.microsoft.com/sharepoint/v3" xsi:nil="true"/>
+    <Image xmlns="71af3243-3dd4-4a8d-8c0d-dd76da1f02a5">
+      <Url xsi:nil="true"/>
+      <Description xsi:nil="true"/>
+    </Image>
+    <Status xmlns="71af3243-3dd4-4a8d-8c0d-dd76da1f02a5">Not started</Status>
+    <Background xmlns="71af3243-3dd4-4a8d-8c0d-dd76da1f02a5">false</Background>
+    <_ip_UnifiedCompliancePolicyProperties xmlns="http://schemas.microsoft.com/sharepoint/v3" xsi:nil="true"/>
+    <ImageTagsTaxHTField xmlns="71af3243-3dd4-4a8d-8c0d-dd76da1f02a5">
+      <Terms xmlns="http://schemas.microsoft.com/office/infopath/2007/PartnerControls"/>
+    </ImageTagsTaxHTField>
+    <TaxCatchAll xmlns="230e9df3-be65-4c73-a93b-d1236ebd677e" xsi:nil="true"/>
+    <MediaServiceKeyPoints xmlns="71af3243-3dd4-4a8d-8c0d-dd76da1f02a5" xsi:nil="true"/>
+  </documentManagement>
+</p:properties>
+</file>
+
+<file path=customXml/item3.xml><?xml version="1.0" encoding="utf-8"?>
 <ct:contentTypeSchema xmlns:ct="http://schemas.microsoft.com/office/2006/metadata/contentType" xmlns:ma="http://schemas.microsoft.com/office/2006/metadata/properties/metaAttributes" ct:_="" ma:_="" ma:contentTypeName="Document" ma:contentTypeID="0x01010079F111ED35F8CC479449609E8A0923A6" ma:contentTypeVersion="27" ma:contentTypeDescription="Create a new document." ma:contentTypeScope="" ma:versionID="c6f9a84f66a9c8b9a21755b9ffafb945">
   <xsd:schema xmlns:xsd="http://www.w3.org/2001/XMLSchema" xmlns:xs="http://www.w3.org/2001/XMLSchema" xmlns:p="http://schemas.microsoft.com/office/2006/metadata/properties" xmlns:ns1="http://schemas.microsoft.com/sharepoint/v3" xmlns:ns2="71af3243-3dd4-4a8d-8c0d-dd76da1f02a5" xmlns:ns3="16c05727-aa75-4e4a-9b5f-8a80a1165891" xmlns:ns4="230e9df3-be65-4c73-a93b-d1236ebd677e" targetNamespace="http://schemas.microsoft.com/office/2006/metadata/properties" ma:root="true" ma:fieldsID="27df39e3e7036dff54f89ddd5805ce72" ns1:_="" ns2:_="" ns3:_="" ns4:_="">
     <xsd:import namespace="http://schemas.microsoft.com/sharepoint/v3"/>
@@ -6268,36 +6849,27 @@
 </ct:contentTypeSchema>
 </file>
 
-<file path=customXml/item2.xml><?xml version="1.0" encoding="utf-8"?>
-<p:properties xmlns:p="http://schemas.microsoft.com/office/2006/metadata/properties" xmlns:xsi="http://www.w3.org/2001/XMLSchema-instance" xmlns:pc="http://schemas.microsoft.com/office/infopath/2007/PartnerControls">
-  <documentManagement>
-    <_ip_UnifiedCompliancePolicyUIAction xmlns="http://schemas.microsoft.com/sharepoint/v3" xsi:nil="true"/>
-    <Image xmlns="71af3243-3dd4-4a8d-8c0d-dd76da1f02a5">
-      <Url xsi:nil="true"/>
-      <Description xsi:nil="true"/>
-    </Image>
-    <Status xmlns="71af3243-3dd4-4a8d-8c0d-dd76da1f02a5">Not started</Status>
-    <Background xmlns="71af3243-3dd4-4a8d-8c0d-dd76da1f02a5">false</Background>
-    <_ip_UnifiedCompliancePolicyProperties xmlns="http://schemas.microsoft.com/sharepoint/v3" xsi:nil="true"/>
-    <ImageTagsTaxHTField xmlns="71af3243-3dd4-4a8d-8c0d-dd76da1f02a5">
-      <Terms xmlns="http://schemas.microsoft.com/office/infopath/2007/PartnerControls"/>
-    </ImageTagsTaxHTField>
-    <TaxCatchAll xmlns="230e9df3-be65-4c73-a93b-d1236ebd677e" xsi:nil="true"/>
-    <MediaServiceKeyPoints xmlns="71af3243-3dd4-4a8d-8c0d-dd76da1f02a5" xsi:nil="true"/>
-  </documentManagement>
-</p:properties>
+<file path=customXml/itemProps1.xml><?xml version="1.0" encoding="utf-8"?>
+<ds:datastoreItem xmlns:ds="http://schemas.openxmlformats.org/officeDocument/2006/customXml" ds:itemID="{342D3C2F-55A5-48C0-9D5A-95C7FF0389D0}">
+  <ds:schemaRefs>
+    <ds:schemaRef ds:uri="http://schemas.microsoft.com/sharepoint/v3/contenttype/forms"/>
+  </ds:schemaRefs>
+</ds:datastoreItem>
 </file>
 
-<file path=customXml/item3.xml><?xml version="1.0" encoding="utf-8"?>
-<?mso-contentType ?>
-<FormTemplates xmlns="http://schemas.microsoft.com/sharepoint/v3/contenttype/forms">
-  <Display>DocumentLibraryForm</Display>
-  <Edit>DocumentLibraryForm</Edit>
-  <New>DocumentLibraryForm</New>
-</FormTemplates>
+<file path=customXml/itemProps2.xml><?xml version="1.0" encoding="utf-8"?>
+<ds:datastoreItem xmlns:ds="http://schemas.openxmlformats.org/officeDocument/2006/customXml" ds:itemID="{3791575F-4C21-47C4-8D13-EB9BE66B536F}">
+  <ds:schemaRefs>
+    <ds:schemaRef ds:uri="http://schemas.microsoft.com/office/2006/metadata/properties"/>
+    <ds:schemaRef ds:uri="http://schemas.microsoft.com/office/infopath/2007/PartnerControls"/>
+    <ds:schemaRef ds:uri="http://schemas.microsoft.com/sharepoint/v3"/>
+    <ds:schemaRef ds:uri="71af3243-3dd4-4a8d-8c0d-dd76da1f02a5"/>
+    <ds:schemaRef ds:uri="230e9df3-be65-4c73-a93b-d1236ebd677e"/>
+  </ds:schemaRefs>
+</ds:datastoreItem>
 </file>
 
-<file path=customXml/itemProps1.xml><?xml version="1.0" encoding="utf-8"?>
+<file path=customXml/itemProps3.xml><?xml version="1.0" encoding="utf-8"?>
 <ds:datastoreItem xmlns:ds="http://schemas.openxmlformats.org/officeDocument/2006/customXml" ds:itemID="{792209EB-3212-4116-B574-D1F56C7C4922}">
   <ds:schemaRefs>
     <ds:schemaRef ds:uri="http://schemas.microsoft.com/office/2006/metadata/contentType"/>
@@ -6316,24 +6888,4 @@
     <ds:schemaRef ds:uri="http://schemas.microsoft.com/internal/obd"/>
   </ds:schemaRefs>
 </ds:datastoreItem>
-</file>
-
-<file path=customXml/itemProps2.xml><?xml version="1.0" encoding="utf-8"?>
-<ds:datastoreItem xmlns:ds="http://schemas.openxmlformats.org/officeDocument/2006/customXml" ds:itemID="{3791575F-4C21-47C4-8D13-EB9BE66B536F}">
-  <ds:schemaRefs>
-    <ds:schemaRef ds:uri="http://schemas.microsoft.com/office/2006/metadata/properties"/>
-    <ds:schemaRef ds:uri="http://schemas.microsoft.com/office/infopath/2007/PartnerControls"/>
-    <ds:schemaRef ds:uri="http://schemas.microsoft.com/sharepoint/v3"/>
-    <ds:schemaRef ds:uri="71af3243-3dd4-4a8d-8c0d-dd76da1f02a5"/>
-    <ds:schemaRef ds:uri="230e9df3-be65-4c73-a93b-d1236ebd677e"/>
-  </ds:schemaRefs>
-</ds:datastoreItem>
-</file>
-
-<file path=customXml/itemProps3.xml><?xml version="1.0" encoding="utf-8"?>
-<ds:datastoreItem xmlns:ds="http://schemas.openxmlformats.org/officeDocument/2006/customXml" ds:itemID="{342D3C2F-55A5-48C0-9D5A-95C7FF0389D0}">
-  <ds:schemaRefs>
-    <ds:schemaRef ds:uri="http://schemas.microsoft.com/sharepoint/v3/contenttype/forms"/>
-  </ds:schemaRefs>
-</ds:datastoreItem>
 </file>
</xml_diff>

<commit_message>
add tutorial chapter 2 part 1
</commit_message>
<xml_diff>
--- a/OpenSCAD.pptx
+++ b/OpenSCAD.pptx
@@ -5,16 +5,18 @@
     <p:sldMasterId id="2147483672" r:id="rId4"/>
   </p:sldMasterIdLst>
   <p:notesMasterIdLst>
-    <p:notesMasterId r:id="rId9"/>
+    <p:notesMasterId r:id="rId11"/>
   </p:notesMasterIdLst>
   <p:handoutMasterIdLst>
-    <p:handoutMasterId r:id="rId10"/>
+    <p:handoutMasterId r:id="rId12"/>
   </p:handoutMasterIdLst>
   <p:sldIdLst>
     <p:sldId id="256" r:id="rId5"/>
     <p:sldId id="257" r:id="rId6"/>
     <p:sldId id="258" r:id="rId7"/>
     <p:sldId id="259" r:id="rId8"/>
+    <p:sldId id="260" r:id="rId9"/>
+    <p:sldId id="261" r:id="rId10"/>
   </p:sldIdLst>
   <p:sldSz cx="12192000" cy="6858000"/>
   <p:notesSz cx="6858000" cy="9144000"/>
@@ -218,7 +220,7 @@
           <a:p>
             <a:fld id="{AF869721-F543-4A6C-BF9D-65D7CC540427}" type="datetimeFigureOut">
               <a:rPr lang="en-US" smtClean="0"/>
-              <a:t>9/7/2023</a:t>
+              <a:t>9/8/2023</a:t>
             </a:fld>
             <a:endParaRPr lang="en-US" dirty="0"/>
           </a:p>
@@ -395,7 +397,7 @@
           <a:p>
             <a:fld id="{C732326A-4C88-4AFB-AA5B-5919D81DFF5B}" type="datetimeFigureOut">
               <a:rPr lang="en-US" smtClean="0"/>
-              <a:t>9/7/2023</a:t>
+              <a:t>9/8/2023</a:t>
             </a:fld>
             <a:endParaRPr lang="en-US" dirty="0"/>
           </a:p>
@@ -992,7 +994,7 @@
             <a:fld id="{B61BEF0D-F0BB-DE4B-95CE-6DB70DBA9567}" type="datetimeFigureOut">
               <a:rPr lang="en-US" smtClean="0"/>
               <a:pPr/>
-              <a:t>9/7/2023</a:t>
+              <a:t>9/8/2023</a:t>
             </a:fld>
             <a:endParaRPr lang="en-US" dirty="0"/>
           </a:p>
@@ -1256,7 +1258,7 @@
             <a:fld id="{B61BEF0D-F0BB-DE4B-95CE-6DB70DBA9567}" type="datetimeFigureOut">
               <a:rPr lang="en-US" smtClean="0"/>
               <a:pPr/>
-              <a:t>9/7/2023</a:t>
+              <a:t>9/8/2023</a:t>
             </a:fld>
             <a:endParaRPr lang="en-US" dirty="0"/>
           </a:p>
@@ -1493,7 +1495,7 @@
             <a:fld id="{B61BEF0D-F0BB-DE4B-95CE-6DB70DBA9567}" type="datetimeFigureOut">
               <a:rPr lang="en-US" smtClean="0"/>
               <a:pPr/>
-              <a:t>9/7/2023</a:t>
+              <a:t>9/8/2023</a:t>
             </a:fld>
             <a:endParaRPr lang="en-US" dirty="0"/>
           </a:p>
@@ -1735,7 +1737,7 @@
             <a:fld id="{B61BEF0D-F0BB-DE4B-95CE-6DB70DBA9567}" type="datetimeFigureOut">
               <a:rPr lang="en-US" smtClean="0"/>
               <a:pPr/>
-              <a:t>9/7/2023</a:t>
+              <a:t>9/8/2023</a:t>
             </a:fld>
             <a:endParaRPr lang="en-US" dirty="0"/>
           </a:p>
@@ -2044,7 +2046,7 @@
             <a:fld id="{B61BEF0D-F0BB-DE4B-95CE-6DB70DBA9567}" type="datetimeFigureOut">
               <a:rPr lang="en-US" smtClean="0"/>
               <a:pPr/>
-              <a:t>9/7/2023</a:t>
+              <a:t>9/8/2023</a:t>
             </a:fld>
             <a:endParaRPr lang="en-US" dirty="0"/>
           </a:p>
@@ -2348,7 +2350,7 @@
             <a:fld id="{B61BEF0D-F0BB-DE4B-95CE-6DB70DBA9567}" type="datetimeFigureOut">
               <a:rPr lang="en-US" smtClean="0"/>
               <a:pPr/>
-              <a:t>9/7/2023</a:t>
+              <a:t>9/8/2023</a:t>
             </a:fld>
             <a:endParaRPr lang="en-US" dirty="0"/>
           </a:p>
@@ -2772,7 +2774,7 @@
             <a:fld id="{B61BEF0D-F0BB-DE4B-95CE-6DB70DBA9567}" type="datetimeFigureOut">
               <a:rPr lang="en-US" smtClean="0"/>
               <a:pPr/>
-              <a:t>9/7/2023</a:t>
+              <a:t>9/8/2023</a:t>
             </a:fld>
             <a:endParaRPr lang="en-US" dirty="0"/>
           </a:p>
@@ -2869,7 +2871,7 @@
             <a:fld id="{B61BEF0D-F0BB-DE4B-95CE-6DB70DBA9567}" type="datetimeFigureOut">
               <a:rPr lang="en-US" smtClean="0"/>
               <a:pPr/>
-              <a:t>9/7/2023</a:t>
+              <a:t>9/8/2023</a:t>
             </a:fld>
             <a:endParaRPr lang="en-US" dirty="0"/>
           </a:p>
@@ -3033,7 +3035,7 @@
             <a:fld id="{B61BEF0D-F0BB-DE4B-95CE-6DB70DBA9567}" type="datetimeFigureOut">
               <a:rPr lang="en-US" smtClean="0"/>
               <a:pPr/>
-              <a:t>9/7/2023</a:t>
+              <a:t>9/8/2023</a:t>
             </a:fld>
             <a:endParaRPr lang="en-US" dirty="0"/>
           </a:p>
@@ -3413,7 +3415,7 @@
             <a:fld id="{B61BEF0D-F0BB-DE4B-95CE-6DB70DBA9567}" type="datetimeFigureOut">
               <a:rPr lang="en-US" smtClean="0"/>
               <a:pPr/>
-              <a:t>9/7/2023</a:t>
+              <a:t>9/8/2023</a:t>
             </a:fld>
             <a:endParaRPr lang="en-US" dirty="0"/>
           </a:p>
@@ -3704,7 +3706,7 @@
             <a:fld id="{B61BEF0D-F0BB-DE4B-95CE-6DB70DBA9567}" type="datetimeFigureOut">
               <a:rPr lang="en-US" smtClean="0"/>
               <a:pPr/>
-              <a:t>9/7/2023</a:t>
+              <a:t>9/8/2023</a:t>
             </a:fld>
             <a:endParaRPr lang="en-US" dirty="0"/>
           </a:p>
@@ -3917,7 +3919,7 @@
             <a:fld id="{B61BEF0D-F0BB-DE4B-95CE-6DB70DBA9567}" type="datetimeFigureOut">
               <a:rPr lang="en-US" smtClean="0"/>
               <a:pPr/>
-              <a:t>9/7/2023</a:t>
+              <a:t>9/8/2023</a:t>
             </a:fld>
             <a:endParaRPr lang="en-US" dirty="0"/>
           </a:p>
@@ -5646,6 +5648,377 @@
     <p:extLst>
       <p:ext uri="{BB962C8B-B14F-4D97-AF65-F5344CB8AC3E}">
         <p14:creationId xmlns:p14="http://schemas.microsoft.com/office/powerpoint/2010/main" val="1683202641"/>
+      </p:ext>
+    </p:extLst>
+  </p:cSld>
+  <p:clrMapOvr>
+    <a:masterClrMapping/>
+  </p:clrMapOvr>
+</p:sld>
+</file>
+
+<file path=ppt/slides/slide5.xml><?xml version="1.0" encoding="utf-8"?>
+<p:sld xmlns:a="http://schemas.openxmlformats.org/drawingml/2006/main" xmlns:r="http://schemas.openxmlformats.org/officeDocument/2006/relationships" xmlns:p="http://schemas.openxmlformats.org/presentationml/2006/main">
+  <p:cSld>
+    <p:spTree>
+      <p:nvGrpSpPr>
+        <p:cNvPr id="1" name=""/>
+        <p:cNvGrpSpPr/>
+        <p:nvPr/>
+      </p:nvGrpSpPr>
+      <p:grpSpPr>
+        <a:xfrm>
+          <a:off x="0" y="0"/>
+          <a:ext cx="0" cy="0"/>
+          <a:chOff x="0" y="0"/>
+          <a:chExt cx="0" cy="0"/>
+        </a:xfrm>
+      </p:grpSpPr>
+      <p:sp>
+        <p:nvSpPr>
+          <p:cNvPr id="4" name="Title 3">
+            <a:extLst>
+              <a:ext uri="{FF2B5EF4-FFF2-40B4-BE49-F238E27FC236}">
+                <a16:creationId xmlns:a16="http://schemas.microsoft.com/office/drawing/2014/main" id="{1E1A75EA-3DE1-6BD1-8A84-A8D3D57E2F03}"/>
+              </a:ext>
+            </a:extLst>
+          </p:cNvPr>
+          <p:cNvSpPr>
+            <a:spLocks noGrp="1"/>
+          </p:cNvSpPr>
+          <p:nvPr>
+            <p:ph type="ctrTitle"/>
+          </p:nvPr>
+        </p:nvSpPr>
+        <p:spPr>
+          <a:xfrm>
+            <a:off x="581191" y="756139"/>
+            <a:ext cx="10993549" cy="1072662"/>
+          </a:xfrm>
+        </p:spPr>
+        <p:txBody>
+          <a:bodyPr>
+            <a:normAutofit/>
+          </a:bodyPr>
+          <a:lstStyle/>
+          <a:p>
+            <a:r>
+              <a:rPr lang="en-US" sz="4800" cap="none" dirty="0"/>
+              <a:t>OpenSCAD Modeling Practice</a:t>
+            </a:r>
+          </a:p>
+        </p:txBody>
+      </p:sp>
+      <p:sp>
+        <p:nvSpPr>
+          <p:cNvPr id="5" name="Subtitle 4">
+            <a:extLst>
+              <a:ext uri="{FF2B5EF4-FFF2-40B4-BE49-F238E27FC236}">
+                <a16:creationId xmlns:a16="http://schemas.microsoft.com/office/drawing/2014/main" id="{4B2FCE2E-86B8-4A2C-B7B7-0B929427A000}"/>
+              </a:ext>
+            </a:extLst>
+          </p:cNvPr>
+          <p:cNvSpPr>
+            <a:spLocks noGrp="1"/>
+          </p:cNvSpPr>
+          <p:nvPr>
+            <p:ph type="subTitle" idx="1"/>
+          </p:nvPr>
+        </p:nvSpPr>
+        <p:spPr>
+          <a:xfrm>
+            <a:off x="581194" y="2127739"/>
+            <a:ext cx="10993546" cy="958028"/>
+          </a:xfrm>
+        </p:spPr>
+        <p:txBody>
+          <a:bodyPr>
+            <a:normAutofit/>
+          </a:bodyPr>
+          <a:lstStyle/>
+          <a:p>
+            <a:r>
+              <a:rPr lang="en-US" sz="3600" cap="none" dirty="0"/>
+              <a:t>OpenSCAD Tutorial/Chapter 2 (part 1 – Scaling Parts)</a:t>
+            </a:r>
+          </a:p>
+        </p:txBody>
+      </p:sp>
+      <p:pic>
+        <p:nvPicPr>
+          <p:cNvPr id="6" name="Picture 5" descr="A yellow and green object with holes&#10;&#10;Description automatically generated">
+            <a:extLst>
+              <a:ext uri="{FF2B5EF4-FFF2-40B4-BE49-F238E27FC236}">
+                <a16:creationId xmlns:a16="http://schemas.microsoft.com/office/drawing/2014/main" id="{0731BA8F-6478-2556-A80D-8B9077A55A1F}"/>
+              </a:ext>
+            </a:extLst>
+          </p:cNvPr>
+          <p:cNvPicPr>
+            <a:picLocks noChangeAspect="1"/>
+          </p:cNvPicPr>
+          <p:nvPr/>
+        </p:nvPicPr>
+        <p:blipFill>
+          <a:blip r:embed="rId2"/>
+          <a:stretch>
+            <a:fillRect/>
+          </a:stretch>
+        </p:blipFill>
+        <p:spPr>
+          <a:xfrm>
+            <a:off x="9101136" y="3458306"/>
+            <a:ext cx="1950794" cy="1623642"/>
+          </a:xfrm>
+          <a:prstGeom prst="roundRect">
+            <a:avLst>
+              <a:gd name="adj" fmla="val 8594"/>
+            </a:avLst>
+          </a:prstGeom>
+          <a:solidFill>
+            <a:srgbClr val="FFFFFF">
+              <a:shade val="85000"/>
+            </a:srgbClr>
+          </a:solidFill>
+          <a:ln>
+            <a:noFill/>
+          </a:ln>
+          <a:effectLst>
+            <a:reflection blurRad="12700" stA="38000" endPos="28000" dist="5000" dir="5400000" sy="-100000" algn="bl" rotWithShape="0"/>
+          </a:effectLst>
+        </p:spPr>
+      </p:pic>
+      <p:pic>
+        <p:nvPicPr>
+          <p:cNvPr id="7" name="Picture 6">
+            <a:extLst>
+              <a:ext uri="{FF2B5EF4-FFF2-40B4-BE49-F238E27FC236}">
+                <a16:creationId xmlns:a16="http://schemas.microsoft.com/office/drawing/2014/main" id="{A8C4E3B3-6694-4013-8EFE-D848B5549D16}"/>
+              </a:ext>
+            </a:extLst>
+          </p:cNvPr>
+          <p:cNvPicPr>
+            <a:picLocks noChangeAspect="1"/>
+          </p:cNvPicPr>
+          <p:nvPr/>
+        </p:nvPicPr>
+        <p:blipFill>
+          <a:blip r:embed="rId3"/>
+          <a:stretch>
+            <a:fillRect/>
+          </a:stretch>
+        </p:blipFill>
+        <p:spPr>
+          <a:xfrm>
+            <a:off x="2083045" y="3384705"/>
+            <a:ext cx="4740546" cy="2672861"/>
+          </a:xfrm>
+          <a:prstGeom prst="rect">
+            <a:avLst/>
+          </a:prstGeom>
+          <a:ln>
+            <a:noFill/>
+          </a:ln>
+          <a:effectLst>
+            <a:outerShdw blurRad="292100" dist="139700" dir="2700000" algn="tl" rotWithShape="0">
+              <a:srgbClr val="333333">
+                <a:alpha val="65000"/>
+              </a:srgbClr>
+            </a:outerShdw>
+          </a:effectLst>
+        </p:spPr>
+      </p:pic>
+    </p:spTree>
+    <p:extLst>
+      <p:ext uri="{BB962C8B-B14F-4D97-AF65-F5344CB8AC3E}">
+        <p14:creationId xmlns:p14="http://schemas.microsoft.com/office/powerpoint/2010/main" val="2184678528"/>
+      </p:ext>
+    </p:extLst>
+  </p:cSld>
+  <p:clrMapOvr>
+    <a:masterClrMapping/>
+  </p:clrMapOvr>
+</p:sld>
+</file>
+
+<file path=ppt/slides/slide6.xml><?xml version="1.0" encoding="utf-8"?>
+<p:sld xmlns:a="http://schemas.openxmlformats.org/drawingml/2006/main" xmlns:r="http://schemas.openxmlformats.org/officeDocument/2006/relationships" xmlns:p="http://schemas.openxmlformats.org/presentationml/2006/main">
+  <p:cSld>
+    <p:spTree>
+      <p:nvGrpSpPr>
+        <p:cNvPr id="1" name=""/>
+        <p:cNvGrpSpPr/>
+        <p:nvPr/>
+      </p:nvGrpSpPr>
+      <p:grpSpPr>
+        <a:xfrm>
+          <a:off x="0" y="0"/>
+          <a:ext cx="0" cy="0"/>
+          <a:chOff x="0" y="0"/>
+          <a:chExt cx="0" cy="0"/>
+        </a:xfrm>
+      </p:grpSpPr>
+      <p:sp>
+        <p:nvSpPr>
+          <p:cNvPr id="4" name="Title 3">
+            <a:extLst>
+              <a:ext uri="{FF2B5EF4-FFF2-40B4-BE49-F238E27FC236}">
+                <a16:creationId xmlns:a16="http://schemas.microsoft.com/office/drawing/2014/main" id="{1E1A75EA-3DE1-6BD1-8A84-A8D3D57E2F03}"/>
+              </a:ext>
+            </a:extLst>
+          </p:cNvPr>
+          <p:cNvSpPr>
+            <a:spLocks noGrp="1"/>
+          </p:cNvSpPr>
+          <p:nvPr>
+            <p:ph type="ctrTitle"/>
+          </p:nvPr>
+        </p:nvSpPr>
+        <p:spPr>
+          <a:xfrm>
+            <a:off x="581191" y="756139"/>
+            <a:ext cx="10993549" cy="1072662"/>
+          </a:xfrm>
+        </p:spPr>
+        <p:txBody>
+          <a:bodyPr>
+            <a:normAutofit/>
+          </a:bodyPr>
+          <a:lstStyle/>
+          <a:p>
+            <a:r>
+              <a:rPr lang="en-US" sz="4800" cap="none" dirty="0"/>
+              <a:t>OpenSCAD Modeling Practice</a:t>
+            </a:r>
+          </a:p>
+        </p:txBody>
+      </p:sp>
+      <p:sp>
+        <p:nvSpPr>
+          <p:cNvPr id="5" name="Subtitle 4">
+            <a:extLst>
+              <a:ext uri="{FF2B5EF4-FFF2-40B4-BE49-F238E27FC236}">
+                <a16:creationId xmlns:a16="http://schemas.microsoft.com/office/drawing/2014/main" id="{4B2FCE2E-86B8-4A2C-B7B7-0B929427A000}"/>
+              </a:ext>
+            </a:extLst>
+          </p:cNvPr>
+          <p:cNvSpPr>
+            <a:spLocks noGrp="1"/>
+          </p:cNvSpPr>
+          <p:nvPr>
+            <p:ph type="subTitle" idx="1"/>
+          </p:nvPr>
+        </p:nvSpPr>
+        <p:spPr>
+          <a:xfrm>
+            <a:off x="581194" y="2127739"/>
+            <a:ext cx="10993546" cy="958028"/>
+          </a:xfrm>
+        </p:spPr>
+        <p:txBody>
+          <a:bodyPr>
+            <a:normAutofit/>
+          </a:bodyPr>
+          <a:lstStyle/>
+          <a:p>
+            <a:r>
+              <a:rPr lang="en-US" sz="3600" cap="none" dirty="0"/>
+              <a:t>OpenSCAD Tutorial/Chapter 2 (part 2 </a:t>
+            </a:r>
+            <a:r>
+              <a:rPr lang="en-US" sz="3600" cap="none"/>
+              <a:t>– ???)</a:t>
+            </a:r>
+            <a:endParaRPr lang="en-US" sz="3600" cap="none" dirty="0"/>
+          </a:p>
+        </p:txBody>
+      </p:sp>
+      <p:pic>
+        <p:nvPicPr>
+          <p:cNvPr id="6" name="Picture 5" descr="A yellow and green object with holes&#10;&#10;Description automatically generated">
+            <a:extLst>
+              <a:ext uri="{FF2B5EF4-FFF2-40B4-BE49-F238E27FC236}">
+                <a16:creationId xmlns:a16="http://schemas.microsoft.com/office/drawing/2014/main" id="{0731BA8F-6478-2556-A80D-8B9077A55A1F}"/>
+              </a:ext>
+            </a:extLst>
+          </p:cNvPr>
+          <p:cNvPicPr>
+            <a:picLocks noChangeAspect="1"/>
+          </p:cNvPicPr>
+          <p:nvPr/>
+        </p:nvPicPr>
+        <p:blipFill>
+          <a:blip r:embed="rId2"/>
+          <a:stretch>
+            <a:fillRect/>
+          </a:stretch>
+        </p:blipFill>
+        <p:spPr>
+          <a:xfrm>
+            <a:off x="9101136" y="3458306"/>
+            <a:ext cx="1950794" cy="1623642"/>
+          </a:xfrm>
+          <a:prstGeom prst="roundRect">
+            <a:avLst>
+              <a:gd name="adj" fmla="val 8594"/>
+            </a:avLst>
+          </a:prstGeom>
+          <a:solidFill>
+            <a:srgbClr val="FFFFFF">
+              <a:shade val="85000"/>
+            </a:srgbClr>
+          </a:solidFill>
+          <a:ln>
+            <a:noFill/>
+          </a:ln>
+          <a:effectLst>
+            <a:reflection blurRad="12700" stA="38000" endPos="28000" dist="5000" dir="5400000" sy="-100000" algn="bl" rotWithShape="0"/>
+          </a:effectLst>
+        </p:spPr>
+      </p:pic>
+      <p:pic>
+        <p:nvPicPr>
+          <p:cNvPr id="7" name="Picture 6">
+            <a:extLst>
+              <a:ext uri="{FF2B5EF4-FFF2-40B4-BE49-F238E27FC236}">
+                <a16:creationId xmlns:a16="http://schemas.microsoft.com/office/drawing/2014/main" id="{A8C4E3B3-6694-4013-8EFE-D848B5549D16}"/>
+              </a:ext>
+            </a:extLst>
+          </p:cNvPr>
+          <p:cNvPicPr>
+            <a:picLocks noChangeAspect="1"/>
+          </p:cNvPicPr>
+          <p:nvPr/>
+        </p:nvPicPr>
+        <p:blipFill>
+          <a:blip r:embed="rId3"/>
+          <a:stretch>
+            <a:fillRect/>
+          </a:stretch>
+        </p:blipFill>
+        <p:spPr>
+          <a:xfrm>
+            <a:off x="2083045" y="3384705"/>
+            <a:ext cx="4740546" cy="2672861"/>
+          </a:xfrm>
+          <a:prstGeom prst="rect">
+            <a:avLst/>
+          </a:prstGeom>
+          <a:ln>
+            <a:noFill/>
+          </a:ln>
+          <a:effectLst>
+            <a:outerShdw blurRad="292100" dist="139700" dir="2700000" algn="tl" rotWithShape="0">
+              <a:srgbClr val="333333">
+                <a:alpha val="65000"/>
+              </a:srgbClr>
+            </a:outerShdw>
+          </a:effectLst>
+        </p:spPr>
+      </p:pic>
+    </p:spTree>
+    <p:extLst>
+      <p:ext uri="{BB962C8B-B14F-4D97-AF65-F5344CB8AC3E}">
+        <p14:creationId xmlns:p14="http://schemas.microsoft.com/office/powerpoint/2010/main" val="3849727963"/>
       </p:ext>
     </p:extLst>
   </p:cSld>
@@ -6515,35 +6888,6 @@
 </file>
 
 <file path=customXml/item1.xml><?xml version="1.0" encoding="utf-8"?>
-<?mso-contentType ?>
-<FormTemplates xmlns="http://schemas.microsoft.com/sharepoint/v3/contenttype/forms">
-  <Display>DocumentLibraryForm</Display>
-  <Edit>DocumentLibraryForm</Edit>
-  <New>DocumentLibraryForm</New>
-</FormTemplates>
-</file>
-
-<file path=customXml/item2.xml><?xml version="1.0" encoding="utf-8"?>
-<p:properties xmlns:p="http://schemas.microsoft.com/office/2006/metadata/properties" xmlns:xsi="http://www.w3.org/2001/XMLSchema-instance" xmlns:pc="http://schemas.microsoft.com/office/infopath/2007/PartnerControls">
-  <documentManagement>
-    <_ip_UnifiedCompliancePolicyUIAction xmlns="http://schemas.microsoft.com/sharepoint/v3" xsi:nil="true"/>
-    <Image xmlns="71af3243-3dd4-4a8d-8c0d-dd76da1f02a5">
-      <Url xsi:nil="true"/>
-      <Description xsi:nil="true"/>
-    </Image>
-    <Status xmlns="71af3243-3dd4-4a8d-8c0d-dd76da1f02a5">Not started</Status>
-    <Background xmlns="71af3243-3dd4-4a8d-8c0d-dd76da1f02a5">false</Background>
-    <_ip_UnifiedCompliancePolicyProperties xmlns="http://schemas.microsoft.com/sharepoint/v3" xsi:nil="true"/>
-    <ImageTagsTaxHTField xmlns="71af3243-3dd4-4a8d-8c0d-dd76da1f02a5">
-      <Terms xmlns="http://schemas.microsoft.com/office/infopath/2007/PartnerControls"/>
-    </ImageTagsTaxHTField>
-    <TaxCatchAll xmlns="230e9df3-be65-4c73-a93b-d1236ebd677e" xsi:nil="true"/>
-    <MediaServiceKeyPoints xmlns="71af3243-3dd4-4a8d-8c0d-dd76da1f02a5" xsi:nil="true"/>
-  </documentManagement>
-</p:properties>
-</file>
-
-<file path=customXml/item3.xml><?xml version="1.0" encoding="utf-8"?>
 <ct:contentTypeSchema xmlns:ct="http://schemas.microsoft.com/office/2006/metadata/contentType" xmlns:ma="http://schemas.microsoft.com/office/2006/metadata/properties/metaAttributes" ct:_="" ma:_="" ma:contentTypeName="Document" ma:contentTypeID="0x01010079F111ED35F8CC479449609E8A0923A6" ma:contentTypeVersion="27" ma:contentTypeDescription="Create a new document." ma:contentTypeScope="" ma:versionID="c6f9a84f66a9c8b9a21755b9ffafb945">
   <xsd:schema xmlns:xsd="http://www.w3.org/2001/XMLSchema" xmlns:xs="http://www.w3.org/2001/XMLSchema" xmlns:p="http://schemas.microsoft.com/office/2006/metadata/properties" xmlns:ns1="http://schemas.microsoft.com/sharepoint/v3" xmlns:ns2="71af3243-3dd4-4a8d-8c0d-dd76da1f02a5" xmlns:ns3="16c05727-aa75-4e4a-9b5f-8a80a1165891" xmlns:ns4="230e9df3-be65-4c73-a93b-d1236ebd677e" targetNamespace="http://schemas.microsoft.com/office/2006/metadata/properties" ma:root="true" ma:fieldsID="27df39e3e7036dff54f89ddd5805ce72" ns1:_="" ns2:_="" ns3:_="" ns4:_="">
     <xsd:import namespace="http://schemas.microsoft.com/sharepoint/v3"/>
@@ -6849,27 +7193,36 @@
 </ct:contentTypeSchema>
 </file>
 
-<file path=customXml/itemProps1.xml><?xml version="1.0" encoding="utf-8"?>
-<ds:datastoreItem xmlns:ds="http://schemas.openxmlformats.org/officeDocument/2006/customXml" ds:itemID="{342D3C2F-55A5-48C0-9D5A-95C7FF0389D0}">
-  <ds:schemaRefs>
-    <ds:schemaRef ds:uri="http://schemas.microsoft.com/sharepoint/v3/contenttype/forms"/>
-  </ds:schemaRefs>
-</ds:datastoreItem>
+<file path=customXml/item2.xml><?xml version="1.0" encoding="utf-8"?>
+<p:properties xmlns:p="http://schemas.microsoft.com/office/2006/metadata/properties" xmlns:xsi="http://www.w3.org/2001/XMLSchema-instance" xmlns:pc="http://schemas.microsoft.com/office/infopath/2007/PartnerControls">
+  <documentManagement>
+    <_ip_UnifiedCompliancePolicyUIAction xmlns="http://schemas.microsoft.com/sharepoint/v3" xsi:nil="true"/>
+    <Image xmlns="71af3243-3dd4-4a8d-8c0d-dd76da1f02a5">
+      <Url xsi:nil="true"/>
+      <Description xsi:nil="true"/>
+    </Image>
+    <Status xmlns="71af3243-3dd4-4a8d-8c0d-dd76da1f02a5">Not started</Status>
+    <Background xmlns="71af3243-3dd4-4a8d-8c0d-dd76da1f02a5">false</Background>
+    <_ip_UnifiedCompliancePolicyProperties xmlns="http://schemas.microsoft.com/sharepoint/v3" xsi:nil="true"/>
+    <ImageTagsTaxHTField xmlns="71af3243-3dd4-4a8d-8c0d-dd76da1f02a5">
+      <Terms xmlns="http://schemas.microsoft.com/office/infopath/2007/PartnerControls"/>
+    </ImageTagsTaxHTField>
+    <TaxCatchAll xmlns="230e9df3-be65-4c73-a93b-d1236ebd677e" xsi:nil="true"/>
+    <MediaServiceKeyPoints xmlns="71af3243-3dd4-4a8d-8c0d-dd76da1f02a5" xsi:nil="true"/>
+  </documentManagement>
+</p:properties>
 </file>
 
-<file path=customXml/itemProps2.xml><?xml version="1.0" encoding="utf-8"?>
-<ds:datastoreItem xmlns:ds="http://schemas.openxmlformats.org/officeDocument/2006/customXml" ds:itemID="{3791575F-4C21-47C4-8D13-EB9BE66B536F}">
-  <ds:schemaRefs>
-    <ds:schemaRef ds:uri="http://schemas.microsoft.com/office/2006/metadata/properties"/>
-    <ds:schemaRef ds:uri="http://schemas.microsoft.com/office/infopath/2007/PartnerControls"/>
-    <ds:schemaRef ds:uri="http://schemas.microsoft.com/sharepoint/v3"/>
-    <ds:schemaRef ds:uri="71af3243-3dd4-4a8d-8c0d-dd76da1f02a5"/>
-    <ds:schemaRef ds:uri="230e9df3-be65-4c73-a93b-d1236ebd677e"/>
-  </ds:schemaRefs>
-</ds:datastoreItem>
+<file path=customXml/item3.xml><?xml version="1.0" encoding="utf-8"?>
+<?mso-contentType ?>
+<FormTemplates xmlns="http://schemas.microsoft.com/sharepoint/v3/contenttype/forms">
+  <Display>DocumentLibraryForm</Display>
+  <Edit>DocumentLibraryForm</Edit>
+  <New>DocumentLibraryForm</New>
+</FormTemplates>
 </file>
 
-<file path=customXml/itemProps3.xml><?xml version="1.0" encoding="utf-8"?>
+<file path=customXml/itemProps1.xml><?xml version="1.0" encoding="utf-8"?>
 <ds:datastoreItem xmlns:ds="http://schemas.openxmlformats.org/officeDocument/2006/customXml" ds:itemID="{792209EB-3212-4116-B574-D1F56C7C4922}">
   <ds:schemaRefs>
     <ds:schemaRef ds:uri="http://schemas.microsoft.com/office/2006/metadata/contentType"/>
@@ -6888,4 +7241,24 @@
     <ds:schemaRef ds:uri="http://schemas.microsoft.com/internal/obd"/>
   </ds:schemaRefs>
 </ds:datastoreItem>
+</file>
+
+<file path=customXml/itemProps2.xml><?xml version="1.0" encoding="utf-8"?>
+<ds:datastoreItem xmlns:ds="http://schemas.openxmlformats.org/officeDocument/2006/customXml" ds:itemID="{3791575F-4C21-47C4-8D13-EB9BE66B536F}">
+  <ds:schemaRefs>
+    <ds:schemaRef ds:uri="http://schemas.microsoft.com/office/2006/metadata/properties"/>
+    <ds:schemaRef ds:uri="http://schemas.microsoft.com/office/infopath/2007/PartnerControls"/>
+    <ds:schemaRef ds:uri="http://schemas.microsoft.com/sharepoint/v3"/>
+    <ds:schemaRef ds:uri="71af3243-3dd4-4a8d-8c0d-dd76da1f02a5"/>
+    <ds:schemaRef ds:uri="230e9df3-be65-4c73-a93b-d1236ebd677e"/>
+  </ds:schemaRefs>
+</ds:datastoreItem>
+</file>
+
+<file path=customXml/itemProps3.xml><?xml version="1.0" encoding="utf-8"?>
+<ds:datastoreItem xmlns:ds="http://schemas.openxmlformats.org/officeDocument/2006/customXml" ds:itemID="{342D3C2F-55A5-48C0-9D5A-95C7FF0389D0}">
+  <ds:schemaRefs>
+    <ds:schemaRef ds:uri="http://schemas.microsoft.com/sharepoint/v3/contenttype/forms"/>
+  </ds:schemaRefs>
+</ds:datastoreItem>
 </file>
</xml_diff>

<commit_message>
add tutorial to finish chapter 2
</commit_message>
<xml_diff>
--- a/OpenSCAD.pptx
+++ b/OpenSCAD.pptx
@@ -5922,13 +5922,8 @@
           <a:p>
             <a:r>
               <a:rPr lang="en-US" sz="3600" cap="none" dirty="0"/>
-              <a:t>OpenSCAD Tutorial/Chapter 2 (part 2 </a:t>
-            </a:r>
-            <a:r>
-              <a:rPr lang="en-US" sz="3600" cap="none"/>
-              <a:t>– ???)</a:t>
-            </a:r>
-            <a:endParaRPr lang="en-US" sz="3600" cap="none" dirty="0"/>
+              <a:t>OpenSCAD Tutorial/Chapter 2 (part 2 – Parameterizing)</a:t>
+            </a:r>
           </a:p>
         </p:txBody>
       </p:sp>
@@ -5977,10 +5972,10 @@
       </p:pic>
       <p:pic>
         <p:nvPicPr>
-          <p:cNvPr id="7" name="Picture 6">
+          <p:cNvPr id="3" name="Picture 2">
             <a:extLst>
               <a:ext uri="{FF2B5EF4-FFF2-40B4-BE49-F238E27FC236}">
-                <a16:creationId xmlns:a16="http://schemas.microsoft.com/office/drawing/2014/main" id="{A8C4E3B3-6694-4013-8EFE-D848B5549D16}"/>
+                <a16:creationId xmlns:a16="http://schemas.microsoft.com/office/drawing/2014/main" id="{9B56D241-4C78-2ACE-4A4F-E2D4669FAD44}"/>
               </a:ext>
             </a:extLst>
           </p:cNvPr>
@@ -5997,8 +5992,8 @@
         </p:blipFill>
         <p:spPr>
           <a:xfrm>
-            <a:off x="2083045" y="3384705"/>
-            <a:ext cx="4740546" cy="2672861"/>
+            <a:off x="2754557" y="3366787"/>
+            <a:ext cx="3749200" cy="2501777"/>
           </a:xfrm>
           <a:prstGeom prst="rect">
             <a:avLst/>
@@ -6888,6 +6883,26 @@
 </file>
 
 <file path=customXml/item1.xml><?xml version="1.0" encoding="utf-8"?>
+<p:properties xmlns:p="http://schemas.microsoft.com/office/2006/metadata/properties" xmlns:xsi="http://www.w3.org/2001/XMLSchema-instance" xmlns:pc="http://schemas.microsoft.com/office/infopath/2007/PartnerControls">
+  <documentManagement>
+    <_ip_UnifiedCompliancePolicyUIAction xmlns="http://schemas.microsoft.com/sharepoint/v3" xsi:nil="true"/>
+    <Image xmlns="71af3243-3dd4-4a8d-8c0d-dd76da1f02a5">
+      <Url xsi:nil="true"/>
+      <Description xsi:nil="true"/>
+    </Image>
+    <Status xmlns="71af3243-3dd4-4a8d-8c0d-dd76da1f02a5">Not started</Status>
+    <Background xmlns="71af3243-3dd4-4a8d-8c0d-dd76da1f02a5">false</Background>
+    <_ip_UnifiedCompliancePolicyProperties xmlns="http://schemas.microsoft.com/sharepoint/v3" xsi:nil="true"/>
+    <ImageTagsTaxHTField xmlns="71af3243-3dd4-4a8d-8c0d-dd76da1f02a5">
+      <Terms xmlns="http://schemas.microsoft.com/office/infopath/2007/PartnerControls"/>
+    </ImageTagsTaxHTField>
+    <TaxCatchAll xmlns="230e9df3-be65-4c73-a93b-d1236ebd677e" xsi:nil="true"/>
+    <MediaServiceKeyPoints xmlns="71af3243-3dd4-4a8d-8c0d-dd76da1f02a5" xsi:nil="true"/>
+  </documentManagement>
+</p:properties>
+</file>
+
+<file path=customXml/item2.xml><?xml version="1.0" encoding="utf-8"?>
 <ct:contentTypeSchema xmlns:ct="http://schemas.microsoft.com/office/2006/metadata/contentType" xmlns:ma="http://schemas.microsoft.com/office/2006/metadata/properties/metaAttributes" ct:_="" ma:_="" ma:contentTypeName="Document" ma:contentTypeID="0x01010079F111ED35F8CC479449609E8A0923A6" ma:contentTypeVersion="27" ma:contentTypeDescription="Create a new document." ma:contentTypeScope="" ma:versionID="c6f9a84f66a9c8b9a21755b9ffafb945">
   <xsd:schema xmlns:xsd="http://www.w3.org/2001/XMLSchema" xmlns:xs="http://www.w3.org/2001/XMLSchema" xmlns:p="http://schemas.microsoft.com/office/2006/metadata/properties" xmlns:ns1="http://schemas.microsoft.com/sharepoint/v3" xmlns:ns2="71af3243-3dd4-4a8d-8c0d-dd76da1f02a5" xmlns:ns3="16c05727-aa75-4e4a-9b5f-8a80a1165891" xmlns:ns4="230e9df3-be65-4c73-a93b-d1236ebd677e" targetNamespace="http://schemas.microsoft.com/office/2006/metadata/properties" ma:root="true" ma:fieldsID="27df39e3e7036dff54f89ddd5805ce72" ns1:_="" ns2:_="" ns3:_="" ns4:_="">
     <xsd:import namespace="http://schemas.microsoft.com/sharepoint/v3"/>
@@ -7193,26 +7208,6 @@
 </ct:contentTypeSchema>
 </file>
 
-<file path=customXml/item2.xml><?xml version="1.0" encoding="utf-8"?>
-<p:properties xmlns:p="http://schemas.microsoft.com/office/2006/metadata/properties" xmlns:xsi="http://www.w3.org/2001/XMLSchema-instance" xmlns:pc="http://schemas.microsoft.com/office/infopath/2007/PartnerControls">
-  <documentManagement>
-    <_ip_UnifiedCompliancePolicyUIAction xmlns="http://schemas.microsoft.com/sharepoint/v3" xsi:nil="true"/>
-    <Image xmlns="71af3243-3dd4-4a8d-8c0d-dd76da1f02a5">
-      <Url xsi:nil="true"/>
-      <Description xsi:nil="true"/>
-    </Image>
-    <Status xmlns="71af3243-3dd4-4a8d-8c0d-dd76da1f02a5">Not started</Status>
-    <Background xmlns="71af3243-3dd4-4a8d-8c0d-dd76da1f02a5">false</Background>
-    <_ip_UnifiedCompliancePolicyProperties xmlns="http://schemas.microsoft.com/sharepoint/v3" xsi:nil="true"/>
-    <ImageTagsTaxHTField xmlns="71af3243-3dd4-4a8d-8c0d-dd76da1f02a5">
-      <Terms xmlns="http://schemas.microsoft.com/office/infopath/2007/PartnerControls"/>
-    </ImageTagsTaxHTField>
-    <TaxCatchAll xmlns="230e9df3-be65-4c73-a93b-d1236ebd677e" xsi:nil="true"/>
-    <MediaServiceKeyPoints xmlns="71af3243-3dd4-4a8d-8c0d-dd76da1f02a5" xsi:nil="true"/>
-  </documentManagement>
-</p:properties>
-</file>
-
 <file path=customXml/item3.xml><?xml version="1.0" encoding="utf-8"?>
 <?mso-contentType ?>
 <FormTemplates xmlns="http://schemas.microsoft.com/sharepoint/v3/contenttype/forms">
@@ -7223,6 +7218,18 @@
 </file>
 
 <file path=customXml/itemProps1.xml><?xml version="1.0" encoding="utf-8"?>
+<ds:datastoreItem xmlns:ds="http://schemas.openxmlformats.org/officeDocument/2006/customXml" ds:itemID="{3791575F-4C21-47C4-8D13-EB9BE66B536F}">
+  <ds:schemaRefs>
+    <ds:schemaRef ds:uri="http://schemas.microsoft.com/office/2006/metadata/properties"/>
+    <ds:schemaRef ds:uri="http://schemas.microsoft.com/office/infopath/2007/PartnerControls"/>
+    <ds:schemaRef ds:uri="http://schemas.microsoft.com/sharepoint/v3"/>
+    <ds:schemaRef ds:uri="71af3243-3dd4-4a8d-8c0d-dd76da1f02a5"/>
+    <ds:schemaRef ds:uri="230e9df3-be65-4c73-a93b-d1236ebd677e"/>
+  </ds:schemaRefs>
+</ds:datastoreItem>
+</file>
+
+<file path=customXml/itemProps2.xml><?xml version="1.0" encoding="utf-8"?>
 <ds:datastoreItem xmlns:ds="http://schemas.openxmlformats.org/officeDocument/2006/customXml" ds:itemID="{792209EB-3212-4116-B574-D1F56C7C4922}">
   <ds:schemaRefs>
     <ds:schemaRef ds:uri="http://schemas.microsoft.com/office/2006/metadata/contentType"/>
@@ -7243,18 +7250,6 @@
 </ds:datastoreItem>
 </file>
 
-<file path=customXml/itemProps2.xml><?xml version="1.0" encoding="utf-8"?>
-<ds:datastoreItem xmlns:ds="http://schemas.openxmlformats.org/officeDocument/2006/customXml" ds:itemID="{3791575F-4C21-47C4-8D13-EB9BE66B536F}">
-  <ds:schemaRefs>
-    <ds:schemaRef ds:uri="http://schemas.microsoft.com/office/2006/metadata/properties"/>
-    <ds:schemaRef ds:uri="http://schemas.microsoft.com/office/infopath/2007/PartnerControls"/>
-    <ds:schemaRef ds:uri="http://schemas.microsoft.com/sharepoint/v3"/>
-    <ds:schemaRef ds:uri="71af3243-3dd4-4a8d-8c0d-dd76da1f02a5"/>
-    <ds:schemaRef ds:uri="230e9df3-be65-4c73-a93b-d1236ebd677e"/>
-  </ds:schemaRefs>
-</ds:datastoreItem>
-</file>
-
 <file path=customXml/itemProps3.xml><?xml version="1.0" encoding="utf-8"?>
 <ds:datastoreItem xmlns:ds="http://schemas.openxmlformats.org/officeDocument/2006/customXml" ds:itemID="{342D3C2F-55A5-48C0-9D5A-95C7FF0389D0}">
   <ds:schemaRefs>

</xml_diff>

<commit_message>
add chapter2 part2 model
</commit_message>
<xml_diff>
--- a/OpenSCAD.pptx
+++ b/OpenSCAD.pptx
@@ -5,10 +5,10 @@
     <p:sldMasterId id="2147483672" r:id="rId4"/>
   </p:sldMasterIdLst>
   <p:notesMasterIdLst>
-    <p:notesMasterId r:id="rId11"/>
+    <p:notesMasterId r:id="rId13"/>
   </p:notesMasterIdLst>
   <p:handoutMasterIdLst>
-    <p:handoutMasterId r:id="rId12"/>
+    <p:handoutMasterId r:id="rId14"/>
   </p:handoutMasterIdLst>
   <p:sldIdLst>
     <p:sldId id="256" r:id="rId5"/>
@@ -17,6 +17,8 @@
     <p:sldId id="259" r:id="rId8"/>
     <p:sldId id="260" r:id="rId9"/>
     <p:sldId id="261" r:id="rId10"/>
+    <p:sldId id="262" r:id="rId11"/>
+    <p:sldId id="263" r:id="rId12"/>
   </p:sldIdLst>
   <p:sldSz cx="12192000" cy="6858000"/>
   <p:notesSz cx="6858000" cy="9144000"/>
@@ -6014,6 +6016,372 @@
     <p:extLst>
       <p:ext uri="{BB962C8B-B14F-4D97-AF65-F5344CB8AC3E}">
         <p14:creationId xmlns:p14="http://schemas.microsoft.com/office/powerpoint/2010/main" val="3849727963"/>
+      </p:ext>
+    </p:extLst>
+  </p:cSld>
+  <p:clrMapOvr>
+    <a:masterClrMapping/>
+  </p:clrMapOvr>
+</p:sld>
+</file>
+
+<file path=ppt/slides/slide7.xml><?xml version="1.0" encoding="utf-8"?>
+<p:sld xmlns:a="http://schemas.openxmlformats.org/drawingml/2006/main" xmlns:r="http://schemas.openxmlformats.org/officeDocument/2006/relationships" xmlns:p="http://schemas.openxmlformats.org/presentationml/2006/main">
+  <p:cSld>
+    <p:spTree>
+      <p:nvGrpSpPr>
+        <p:cNvPr id="1" name=""/>
+        <p:cNvGrpSpPr/>
+        <p:nvPr/>
+      </p:nvGrpSpPr>
+      <p:grpSpPr>
+        <a:xfrm>
+          <a:off x="0" y="0"/>
+          <a:ext cx="0" cy="0"/>
+          <a:chOff x="0" y="0"/>
+          <a:chExt cx="0" cy="0"/>
+        </a:xfrm>
+      </p:grpSpPr>
+      <p:sp>
+        <p:nvSpPr>
+          <p:cNvPr id="4" name="Title 3">
+            <a:extLst>
+              <a:ext uri="{FF2B5EF4-FFF2-40B4-BE49-F238E27FC236}">
+                <a16:creationId xmlns:a16="http://schemas.microsoft.com/office/drawing/2014/main" id="{1E1A75EA-3DE1-6BD1-8A84-A8D3D57E2F03}"/>
+              </a:ext>
+            </a:extLst>
+          </p:cNvPr>
+          <p:cNvSpPr>
+            <a:spLocks noGrp="1"/>
+          </p:cNvSpPr>
+          <p:nvPr>
+            <p:ph type="ctrTitle"/>
+          </p:nvPr>
+        </p:nvSpPr>
+        <p:spPr>
+          <a:xfrm>
+            <a:off x="581191" y="756139"/>
+            <a:ext cx="10993549" cy="1072662"/>
+          </a:xfrm>
+        </p:spPr>
+        <p:txBody>
+          <a:bodyPr>
+            <a:normAutofit/>
+          </a:bodyPr>
+          <a:lstStyle/>
+          <a:p>
+            <a:r>
+              <a:rPr lang="en-US" sz="4800" cap="none" dirty="0"/>
+              <a:t>OpenSCAD Modeling Practice</a:t>
+            </a:r>
+          </a:p>
+        </p:txBody>
+      </p:sp>
+      <p:sp>
+        <p:nvSpPr>
+          <p:cNvPr id="5" name="Subtitle 4">
+            <a:extLst>
+              <a:ext uri="{FF2B5EF4-FFF2-40B4-BE49-F238E27FC236}">
+                <a16:creationId xmlns:a16="http://schemas.microsoft.com/office/drawing/2014/main" id="{4B2FCE2E-86B8-4A2C-B7B7-0B929427A000}"/>
+              </a:ext>
+            </a:extLst>
+          </p:cNvPr>
+          <p:cNvSpPr>
+            <a:spLocks noGrp="1"/>
+          </p:cNvSpPr>
+          <p:nvPr>
+            <p:ph type="subTitle" idx="1"/>
+          </p:nvPr>
+        </p:nvSpPr>
+        <p:spPr>
+          <a:xfrm>
+            <a:off x="581194" y="2127739"/>
+            <a:ext cx="10993546" cy="958028"/>
+          </a:xfrm>
+        </p:spPr>
+        <p:txBody>
+          <a:bodyPr>
+            <a:normAutofit fontScale="92500"/>
+          </a:bodyPr>
+          <a:lstStyle/>
+          <a:p>
+            <a:r>
+              <a:rPr lang="en-US" sz="3600" cap="none" dirty="0"/>
+              <a:t>OpenSCAD Tutorial/Chapter 3 (part 1 – Sphere &amp; Resizing)</a:t>
+            </a:r>
+          </a:p>
+        </p:txBody>
+      </p:sp>
+      <p:pic>
+        <p:nvPicPr>
+          <p:cNvPr id="6" name="Picture 5" descr="A yellow and green object with holes&#10;&#10;Description automatically generated">
+            <a:extLst>
+              <a:ext uri="{FF2B5EF4-FFF2-40B4-BE49-F238E27FC236}">
+                <a16:creationId xmlns:a16="http://schemas.microsoft.com/office/drawing/2014/main" id="{0731BA8F-6478-2556-A80D-8B9077A55A1F}"/>
+              </a:ext>
+            </a:extLst>
+          </p:cNvPr>
+          <p:cNvPicPr>
+            <a:picLocks noChangeAspect="1"/>
+          </p:cNvPicPr>
+          <p:nvPr/>
+        </p:nvPicPr>
+        <p:blipFill>
+          <a:blip r:embed="rId2"/>
+          <a:stretch>
+            <a:fillRect/>
+          </a:stretch>
+        </p:blipFill>
+        <p:spPr>
+          <a:xfrm>
+            <a:off x="9101136" y="3458306"/>
+            <a:ext cx="1950794" cy="1623642"/>
+          </a:xfrm>
+          <a:prstGeom prst="roundRect">
+            <a:avLst>
+              <a:gd name="adj" fmla="val 8594"/>
+            </a:avLst>
+          </a:prstGeom>
+          <a:solidFill>
+            <a:srgbClr val="FFFFFF">
+              <a:shade val="85000"/>
+            </a:srgbClr>
+          </a:solidFill>
+          <a:ln>
+            <a:noFill/>
+          </a:ln>
+          <a:effectLst>
+            <a:reflection blurRad="12700" stA="38000" endPos="28000" dist="5000" dir="5400000" sy="-100000" algn="bl" rotWithShape="0"/>
+          </a:effectLst>
+        </p:spPr>
+      </p:pic>
+      <p:pic>
+        <p:nvPicPr>
+          <p:cNvPr id="7" name="Picture 6">
+            <a:extLst>
+              <a:ext uri="{FF2B5EF4-FFF2-40B4-BE49-F238E27FC236}">
+                <a16:creationId xmlns:a16="http://schemas.microsoft.com/office/drawing/2014/main" id="{F0EDADA6-0BB8-4A08-EED1-EDD5210A1F4C}"/>
+              </a:ext>
+            </a:extLst>
+          </p:cNvPr>
+          <p:cNvPicPr>
+            <a:picLocks noChangeAspect="1"/>
+          </p:cNvPicPr>
+          <p:nvPr/>
+        </p:nvPicPr>
+        <p:blipFill>
+          <a:blip r:embed="rId3"/>
+          <a:stretch>
+            <a:fillRect/>
+          </a:stretch>
+        </p:blipFill>
+        <p:spPr>
+          <a:xfrm>
+            <a:off x="2753458" y="3384705"/>
+            <a:ext cx="3153182" cy="2527422"/>
+          </a:xfrm>
+          <a:prstGeom prst="rect">
+            <a:avLst/>
+          </a:prstGeom>
+          <a:ln>
+            <a:noFill/>
+          </a:ln>
+          <a:effectLst>
+            <a:outerShdw blurRad="292100" dist="139700" dir="2700000" algn="tl" rotWithShape="0">
+              <a:srgbClr val="333333">
+                <a:alpha val="65000"/>
+              </a:srgbClr>
+            </a:outerShdw>
+          </a:effectLst>
+        </p:spPr>
+      </p:pic>
+    </p:spTree>
+    <p:extLst>
+      <p:ext uri="{BB962C8B-B14F-4D97-AF65-F5344CB8AC3E}">
+        <p14:creationId xmlns:p14="http://schemas.microsoft.com/office/powerpoint/2010/main" val="3976568440"/>
+      </p:ext>
+    </p:extLst>
+  </p:cSld>
+  <p:clrMapOvr>
+    <a:masterClrMapping/>
+  </p:clrMapOvr>
+</p:sld>
+</file>
+
+<file path=ppt/slides/slide8.xml><?xml version="1.0" encoding="utf-8"?>
+<p:sld xmlns:a="http://schemas.openxmlformats.org/drawingml/2006/main" xmlns:r="http://schemas.openxmlformats.org/officeDocument/2006/relationships" xmlns:p="http://schemas.openxmlformats.org/presentationml/2006/main">
+  <p:cSld>
+    <p:spTree>
+      <p:nvGrpSpPr>
+        <p:cNvPr id="1" name=""/>
+        <p:cNvGrpSpPr/>
+        <p:nvPr/>
+      </p:nvGrpSpPr>
+      <p:grpSpPr>
+        <a:xfrm>
+          <a:off x="0" y="0"/>
+          <a:ext cx="0" cy="0"/>
+          <a:chOff x="0" y="0"/>
+          <a:chExt cx="0" cy="0"/>
+        </a:xfrm>
+      </p:grpSpPr>
+      <p:sp>
+        <p:nvSpPr>
+          <p:cNvPr id="4" name="Title 3">
+            <a:extLst>
+              <a:ext uri="{FF2B5EF4-FFF2-40B4-BE49-F238E27FC236}">
+                <a16:creationId xmlns:a16="http://schemas.microsoft.com/office/drawing/2014/main" id="{1E1A75EA-3DE1-6BD1-8A84-A8D3D57E2F03}"/>
+              </a:ext>
+            </a:extLst>
+          </p:cNvPr>
+          <p:cNvSpPr>
+            <a:spLocks noGrp="1"/>
+          </p:cNvSpPr>
+          <p:nvPr>
+            <p:ph type="ctrTitle"/>
+          </p:nvPr>
+        </p:nvSpPr>
+        <p:spPr>
+          <a:xfrm>
+            <a:off x="581191" y="756139"/>
+            <a:ext cx="10993549" cy="1072662"/>
+          </a:xfrm>
+        </p:spPr>
+        <p:txBody>
+          <a:bodyPr>
+            <a:normAutofit/>
+          </a:bodyPr>
+          <a:lstStyle/>
+          <a:p>
+            <a:r>
+              <a:rPr lang="en-US" sz="4800" cap="none" dirty="0"/>
+              <a:t>OpenSCAD Modeling Practice</a:t>
+            </a:r>
+          </a:p>
+        </p:txBody>
+      </p:sp>
+      <p:sp>
+        <p:nvSpPr>
+          <p:cNvPr id="5" name="Subtitle 4">
+            <a:extLst>
+              <a:ext uri="{FF2B5EF4-FFF2-40B4-BE49-F238E27FC236}">
+                <a16:creationId xmlns:a16="http://schemas.microsoft.com/office/drawing/2014/main" id="{4B2FCE2E-86B8-4A2C-B7B7-0B929427A000}"/>
+              </a:ext>
+            </a:extLst>
+          </p:cNvPr>
+          <p:cNvSpPr>
+            <a:spLocks noGrp="1"/>
+          </p:cNvSpPr>
+          <p:nvPr>
+            <p:ph type="subTitle" idx="1"/>
+          </p:nvPr>
+        </p:nvSpPr>
+        <p:spPr>
+          <a:xfrm>
+            <a:off x="581194" y="2127739"/>
+            <a:ext cx="10993546" cy="958028"/>
+          </a:xfrm>
+        </p:spPr>
+        <p:txBody>
+          <a:bodyPr>
+            <a:normAutofit fontScale="92500"/>
+          </a:bodyPr>
+          <a:lstStyle/>
+          <a:p>
+            <a:r>
+              <a:rPr lang="en-US" sz="3600" cap="none" dirty="0"/>
+              <a:t>OpenSCAD Tutorial/Chapter 3 (part 2 – Combining Objects)</a:t>
+            </a:r>
+          </a:p>
+        </p:txBody>
+      </p:sp>
+      <p:pic>
+        <p:nvPicPr>
+          <p:cNvPr id="6" name="Picture 5" descr="A yellow and green object with holes&#10;&#10;Description automatically generated">
+            <a:extLst>
+              <a:ext uri="{FF2B5EF4-FFF2-40B4-BE49-F238E27FC236}">
+                <a16:creationId xmlns:a16="http://schemas.microsoft.com/office/drawing/2014/main" id="{0731BA8F-6478-2556-A80D-8B9077A55A1F}"/>
+              </a:ext>
+            </a:extLst>
+          </p:cNvPr>
+          <p:cNvPicPr>
+            <a:picLocks noChangeAspect="1"/>
+          </p:cNvPicPr>
+          <p:nvPr/>
+        </p:nvPicPr>
+        <p:blipFill>
+          <a:blip r:embed="rId2"/>
+          <a:stretch>
+            <a:fillRect/>
+          </a:stretch>
+        </p:blipFill>
+        <p:spPr>
+          <a:xfrm>
+            <a:off x="9101136" y="3458306"/>
+            <a:ext cx="1950794" cy="1623642"/>
+          </a:xfrm>
+          <a:prstGeom prst="roundRect">
+            <a:avLst>
+              <a:gd name="adj" fmla="val 8594"/>
+            </a:avLst>
+          </a:prstGeom>
+          <a:solidFill>
+            <a:srgbClr val="FFFFFF">
+              <a:shade val="85000"/>
+            </a:srgbClr>
+          </a:solidFill>
+          <a:ln>
+            <a:noFill/>
+          </a:ln>
+          <a:effectLst>
+            <a:reflection blurRad="12700" stA="38000" endPos="28000" dist="5000" dir="5400000" sy="-100000" algn="bl" rotWithShape="0"/>
+          </a:effectLst>
+        </p:spPr>
+      </p:pic>
+      <p:pic>
+        <p:nvPicPr>
+          <p:cNvPr id="3" name="Picture 2">
+            <a:extLst>
+              <a:ext uri="{FF2B5EF4-FFF2-40B4-BE49-F238E27FC236}">
+                <a16:creationId xmlns:a16="http://schemas.microsoft.com/office/drawing/2014/main" id="{89B4252B-CD5E-776E-80BE-07CE7BDFC809}"/>
+              </a:ext>
+            </a:extLst>
+          </p:cNvPr>
+          <p:cNvPicPr>
+            <a:picLocks noChangeAspect="1"/>
+          </p:cNvPicPr>
+          <p:nvPr/>
+        </p:nvPicPr>
+        <p:blipFill>
+          <a:blip r:embed="rId3"/>
+          <a:stretch>
+            <a:fillRect/>
+          </a:stretch>
+        </p:blipFill>
+        <p:spPr>
+          <a:xfrm>
+            <a:off x="2435469" y="3429000"/>
+            <a:ext cx="3794247" cy="2638568"/>
+          </a:xfrm>
+          <a:prstGeom prst="rect">
+            <a:avLst/>
+          </a:prstGeom>
+          <a:ln>
+            <a:noFill/>
+          </a:ln>
+          <a:effectLst>
+            <a:outerShdw blurRad="292100" dist="139700" dir="2700000" algn="tl" rotWithShape="0">
+              <a:srgbClr val="333333">
+                <a:alpha val="65000"/>
+              </a:srgbClr>
+            </a:outerShdw>
+          </a:effectLst>
+        </p:spPr>
+      </p:pic>
+    </p:spTree>
+    <p:extLst>
+      <p:ext uri="{BB962C8B-B14F-4D97-AF65-F5344CB8AC3E}">
+        <p14:creationId xmlns:p14="http://schemas.microsoft.com/office/powerpoint/2010/main" val="3205827949"/>
       </p:ext>
     </p:extLst>
   </p:cSld>
@@ -6883,26 +7251,6 @@
 </file>
 
 <file path=customXml/item1.xml><?xml version="1.0" encoding="utf-8"?>
-<p:properties xmlns:p="http://schemas.microsoft.com/office/2006/metadata/properties" xmlns:xsi="http://www.w3.org/2001/XMLSchema-instance" xmlns:pc="http://schemas.microsoft.com/office/infopath/2007/PartnerControls">
-  <documentManagement>
-    <_ip_UnifiedCompliancePolicyUIAction xmlns="http://schemas.microsoft.com/sharepoint/v3" xsi:nil="true"/>
-    <Image xmlns="71af3243-3dd4-4a8d-8c0d-dd76da1f02a5">
-      <Url xsi:nil="true"/>
-      <Description xsi:nil="true"/>
-    </Image>
-    <Status xmlns="71af3243-3dd4-4a8d-8c0d-dd76da1f02a5">Not started</Status>
-    <Background xmlns="71af3243-3dd4-4a8d-8c0d-dd76da1f02a5">false</Background>
-    <_ip_UnifiedCompliancePolicyProperties xmlns="http://schemas.microsoft.com/sharepoint/v3" xsi:nil="true"/>
-    <ImageTagsTaxHTField xmlns="71af3243-3dd4-4a8d-8c0d-dd76da1f02a5">
-      <Terms xmlns="http://schemas.microsoft.com/office/infopath/2007/PartnerControls"/>
-    </ImageTagsTaxHTField>
-    <TaxCatchAll xmlns="230e9df3-be65-4c73-a93b-d1236ebd677e" xsi:nil="true"/>
-    <MediaServiceKeyPoints xmlns="71af3243-3dd4-4a8d-8c0d-dd76da1f02a5" xsi:nil="true"/>
-  </documentManagement>
-</p:properties>
-</file>
-
-<file path=customXml/item2.xml><?xml version="1.0" encoding="utf-8"?>
 <ct:contentTypeSchema xmlns:ct="http://schemas.microsoft.com/office/2006/metadata/contentType" xmlns:ma="http://schemas.microsoft.com/office/2006/metadata/properties/metaAttributes" ct:_="" ma:_="" ma:contentTypeName="Document" ma:contentTypeID="0x01010079F111ED35F8CC479449609E8A0923A6" ma:contentTypeVersion="27" ma:contentTypeDescription="Create a new document." ma:contentTypeScope="" ma:versionID="c6f9a84f66a9c8b9a21755b9ffafb945">
   <xsd:schema xmlns:xsd="http://www.w3.org/2001/XMLSchema" xmlns:xs="http://www.w3.org/2001/XMLSchema" xmlns:p="http://schemas.microsoft.com/office/2006/metadata/properties" xmlns:ns1="http://schemas.microsoft.com/sharepoint/v3" xmlns:ns2="71af3243-3dd4-4a8d-8c0d-dd76da1f02a5" xmlns:ns3="16c05727-aa75-4e4a-9b5f-8a80a1165891" xmlns:ns4="230e9df3-be65-4c73-a93b-d1236ebd677e" targetNamespace="http://schemas.microsoft.com/office/2006/metadata/properties" ma:root="true" ma:fieldsID="27df39e3e7036dff54f89ddd5805ce72" ns1:_="" ns2:_="" ns3:_="" ns4:_="">
     <xsd:import namespace="http://schemas.microsoft.com/sharepoint/v3"/>
@@ -7208,6 +7556,26 @@
 </ct:contentTypeSchema>
 </file>
 
+<file path=customXml/item2.xml><?xml version="1.0" encoding="utf-8"?>
+<p:properties xmlns:p="http://schemas.microsoft.com/office/2006/metadata/properties" xmlns:xsi="http://www.w3.org/2001/XMLSchema-instance" xmlns:pc="http://schemas.microsoft.com/office/infopath/2007/PartnerControls">
+  <documentManagement>
+    <_ip_UnifiedCompliancePolicyUIAction xmlns="http://schemas.microsoft.com/sharepoint/v3" xsi:nil="true"/>
+    <Image xmlns="71af3243-3dd4-4a8d-8c0d-dd76da1f02a5">
+      <Url xsi:nil="true"/>
+      <Description xsi:nil="true"/>
+    </Image>
+    <Status xmlns="71af3243-3dd4-4a8d-8c0d-dd76da1f02a5">Not started</Status>
+    <Background xmlns="71af3243-3dd4-4a8d-8c0d-dd76da1f02a5">false</Background>
+    <_ip_UnifiedCompliancePolicyProperties xmlns="http://schemas.microsoft.com/sharepoint/v3" xsi:nil="true"/>
+    <ImageTagsTaxHTField xmlns="71af3243-3dd4-4a8d-8c0d-dd76da1f02a5">
+      <Terms xmlns="http://schemas.microsoft.com/office/infopath/2007/PartnerControls"/>
+    </ImageTagsTaxHTField>
+    <TaxCatchAll xmlns="230e9df3-be65-4c73-a93b-d1236ebd677e" xsi:nil="true"/>
+    <MediaServiceKeyPoints xmlns="71af3243-3dd4-4a8d-8c0d-dd76da1f02a5" xsi:nil="true"/>
+  </documentManagement>
+</p:properties>
+</file>
+
 <file path=customXml/item3.xml><?xml version="1.0" encoding="utf-8"?>
 <?mso-contentType ?>
 <FormTemplates xmlns="http://schemas.microsoft.com/sharepoint/v3/contenttype/forms">
@@ -7218,18 +7586,6 @@
 </file>
 
 <file path=customXml/itemProps1.xml><?xml version="1.0" encoding="utf-8"?>
-<ds:datastoreItem xmlns:ds="http://schemas.openxmlformats.org/officeDocument/2006/customXml" ds:itemID="{3791575F-4C21-47C4-8D13-EB9BE66B536F}">
-  <ds:schemaRefs>
-    <ds:schemaRef ds:uri="http://schemas.microsoft.com/office/2006/metadata/properties"/>
-    <ds:schemaRef ds:uri="http://schemas.microsoft.com/office/infopath/2007/PartnerControls"/>
-    <ds:schemaRef ds:uri="http://schemas.microsoft.com/sharepoint/v3"/>
-    <ds:schemaRef ds:uri="71af3243-3dd4-4a8d-8c0d-dd76da1f02a5"/>
-    <ds:schemaRef ds:uri="230e9df3-be65-4c73-a93b-d1236ebd677e"/>
-  </ds:schemaRefs>
-</ds:datastoreItem>
-</file>
-
-<file path=customXml/itemProps2.xml><?xml version="1.0" encoding="utf-8"?>
 <ds:datastoreItem xmlns:ds="http://schemas.openxmlformats.org/officeDocument/2006/customXml" ds:itemID="{792209EB-3212-4116-B574-D1F56C7C4922}">
   <ds:schemaRefs>
     <ds:schemaRef ds:uri="http://schemas.microsoft.com/office/2006/metadata/contentType"/>
@@ -7250,6 +7606,18 @@
 </ds:datastoreItem>
 </file>
 
+<file path=customXml/itemProps2.xml><?xml version="1.0" encoding="utf-8"?>
+<ds:datastoreItem xmlns:ds="http://schemas.openxmlformats.org/officeDocument/2006/customXml" ds:itemID="{3791575F-4C21-47C4-8D13-EB9BE66B536F}">
+  <ds:schemaRefs>
+    <ds:schemaRef ds:uri="http://schemas.microsoft.com/office/2006/metadata/properties"/>
+    <ds:schemaRef ds:uri="http://schemas.microsoft.com/office/infopath/2007/PartnerControls"/>
+    <ds:schemaRef ds:uri="http://schemas.microsoft.com/sharepoint/v3"/>
+    <ds:schemaRef ds:uri="71af3243-3dd4-4a8d-8c0d-dd76da1f02a5"/>
+    <ds:schemaRef ds:uri="230e9df3-be65-4c73-a93b-d1236ebd677e"/>
+  </ds:schemaRefs>
+</ds:datastoreItem>
+</file>
+
 <file path=customXml/itemProps3.xml><?xml version="1.0" encoding="utf-8"?>
 <ds:datastoreItem xmlns:ds="http://schemas.openxmlformats.org/officeDocument/2006/customXml" ds:itemID="{342D3C2F-55A5-48C0-9D5A-95C7FF0389D0}">
   <ds:schemaRefs>

</xml_diff>

<commit_message>
tutorial chapter 3 part 2
</commit_message>
<xml_diff>
--- a/OpenSCAD.pptx
+++ b/OpenSCAD.pptx
@@ -5,10 +5,10 @@
     <p:sldMasterId id="2147483672" r:id="rId4"/>
   </p:sldMasterIdLst>
   <p:notesMasterIdLst>
-    <p:notesMasterId r:id="rId13"/>
+    <p:notesMasterId r:id="rId14"/>
   </p:notesMasterIdLst>
   <p:handoutMasterIdLst>
-    <p:handoutMasterId r:id="rId14"/>
+    <p:handoutMasterId r:id="rId15"/>
   </p:handoutMasterIdLst>
   <p:sldIdLst>
     <p:sldId id="256" r:id="rId5"/>
@@ -19,6 +19,7 @@
     <p:sldId id="261" r:id="rId10"/>
     <p:sldId id="262" r:id="rId11"/>
     <p:sldId id="263" r:id="rId12"/>
+    <p:sldId id="264" r:id="rId13"/>
   </p:sldIdLst>
   <p:sldSz cx="12192000" cy="6858000"/>
   <p:notesSz cx="6858000" cy="9144000"/>
@@ -222,7 +223,7 @@
           <a:p>
             <a:fld id="{AF869721-F543-4A6C-BF9D-65D7CC540427}" type="datetimeFigureOut">
               <a:rPr lang="en-US" smtClean="0"/>
-              <a:t>9/8/2023</a:t>
+              <a:t>9/9/2023</a:t>
             </a:fld>
             <a:endParaRPr lang="en-US" dirty="0"/>
           </a:p>
@@ -399,7 +400,7 @@
           <a:p>
             <a:fld id="{C732326A-4C88-4AFB-AA5B-5919D81DFF5B}" type="datetimeFigureOut">
               <a:rPr lang="en-US" smtClean="0"/>
-              <a:t>9/8/2023</a:t>
+              <a:t>9/9/2023</a:t>
             </a:fld>
             <a:endParaRPr lang="en-US" dirty="0"/>
           </a:p>
@@ -996,7 +997,7 @@
             <a:fld id="{B61BEF0D-F0BB-DE4B-95CE-6DB70DBA9567}" type="datetimeFigureOut">
               <a:rPr lang="en-US" smtClean="0"/>
               <a:pPr/>
-              <a:t>9/8/2023</a:t>
+              <a:t>9/9/2023</a:t>
             </a:fld>
             <a:endParaRPr lang="en-US" dirty="0"/>
           </a:p>
@@ -1260,7 +1261,7 @@
             <a:fld id="{B61BEF0D-F0BB-DE4B-95CE-6DB70DBA9567}" type="datetimeFigureOut">
               <a:rPr lang="en-US" smtClean="0"/>
               <a:pPr/>
-              <a:t>9/8/2023</a:t>
+              <a:t>9/9/2023</a:t>
             </a:fld>
             <a:endParaRPr lang="en-US" dirty="0"/>
           </a:p>
@@ -1497,7 +1498,7 @@
             <a:fld id="{B61BEF0D-F0BB-DE4B-95CE-6DB70DBA9567}" type="datetimeFigureOut">
               <a:rPr lang="en-US" smtClean="0"/>
               <a:pPr/>
-              <a:t>9/8/2023</a:t>
+              <a:t>9/9/2023</a:t>
             </a:fld>
             <a:endParaRPr lang="en-US" dirty="0"/>
           </a:p>
@@ -1739,7 +1740,7 @@
             <a:fld id="{B61BEF0D-F0BB-DE4B-95CE-6DB70DBA9567}" type="datetimeFigureOut">
               <a:rPr lang="en-US" smtClean="0"/>
               <a:pPr/>
-              <a:t>9/8/2023</a:t>
+              <a:t>9/9/2023</a:t>
             </a:fld>
             <a:endParaRPr lang="en-US" dirty="0"/>
           </a:p>
@@ -2048,7 +2049,7 @@
             <a:fld id="{B61BEF0D-F0BB-DE4B-95CE-6DB70DBA9567}" type="datetimeFigureOut">
               <a:rPr lang="en-US" smtClean="0"/>
               <a:pPr/>
-              <a:t>9/8/2023</a:t>
+              <a:t>9/9/2023</a:t>
             </a:fld>
             <a:endParaRPr lang="en-US" dirty="0"/>
           </a:p>
@@ -2352,7 +2353,7 @@
             <a:fld id="{B61BEF0D-F0BB-DE4B-95CE-6DB70DBA9567}" type="datetimeFigureOut">
               <a:rPr lang="en-US" smtClean="0"/>
               <a:pPr/>
-              <a:t>9/8/2023</a:t>
+              <a:t>9/9/2023</a:t>
             </a:fld>
             <a:endParaRPr lang="en-US" dirty="0"/>
           </a:p>
@@ -2776,7 +2777,7 @@
             <a:fld id="{B61BEF0D-F0BB-DE4B-95CE-6DB70DBA9567}" type="datetimeFigureOut">
               <a:rPr lang="en-US" smtClean="0"/>
               <a:pPr/>
-              <a:t>9/8/2023</a:t>
+              <a:t>9/9/2023</a:t>
             </a:fld>
             <a:endParaRPr lang="en-US" dirty="0"/>
           </a:p>
@@ -2873,7 +2874,7 @@
             <a:fld id="{B61BEF0D-F0BB-DE4B-95CE-6DB70DBA9567}" type="datetimeFigureOut">
               <a:rPr lang="en-US" smtClean="0"/>
               <a:pPr/>
-              <a:t>9/8/2023</a:t>
+              <a:t>9/9/2023</a:t>
             </a:fld>
             <a:endParaRPr lang="en-US" dirty="0"/>
           </a:p>
@@ -3037,7 +3038,7 @@
             <a:fld id="{B61BEF0D-F0BB-DE4B-95CE-6DB70DBA9567}" type="datetimeFigureOut">
               <a:rPr lang="en-US" smtClean="0"/>
               <a:pPr/>
-              <a:t>9/8/2023</a:t>
+              <a:t>9/9/2023</a:t>
             </a:fld>
             <a:endParaRPr lang="en-US" dirty="0"/>
           </a:p>
@@ -3417,7 +3418,7 @@
             <a:fld id="{B61BEF0D-F0BB-DE4B-95CE-6DB70DBA9567}" type="datetimeFigureOut">
               <a:rPr lang="en-US" smtClean="0"/>
               <a:pPr/>
-              <a:t>9/8/2023</a:t>
+              <a:t>9/9/2023</a:t>
             </a:fld>
             <a:endParaRPr lang="en-US" dirty="0"/>
           </a:p>
@@ -3708,7 +3709,7 @@
             <a:fld id="{B61BEF0D-F0BB-DE4B-95CE-6DB70DBA9567}" type="datetimeFigureOut">
               <a:rPr lang="en-US" smtClean="0"/>
               <a:pPr/>
-              <a:t>9/8/2023</a:t>
+              <a:t>9/9/2023</a:t>
             </a:fld>
             <a:endParaRPr lang="en-US" dirty="0"/>
           </a:p>
@@ -3921,7 +3922,7 @@
             <a:fld id="{B61BEF0D-F0BB-DE4B-95CE-6DB70DBA9567}" type="datetimeFigureOut">
               <a:rPr lang="en-US" smtClean="0"/>
               <a:pPr/>
-              <a:t>9/8/2023</a:t>
+              <a:t>9/9/2023</a:t>
             </a:fld>
             <a:endParaRPr lang="en-US" dirty="0"/>
           </a:p>
@@ -6338,6 +6339,227 @@
           </a:effectLst>
         </p:spPr>
       </p:pic>
+      <p:sp>
+        <p:nvSpPr>
+          <p:cNvPr id="2" name="TextBox 1">
+            <a:extLst>
+              <a:ext uri="{FF2B5EF4-FFF2-40B4-BE49-F238E27FC236}">
+                <a16:creationId xmlns:a16="http://schemas.microsoft.com/office/drawing/2014/main" id="{4DE21F2A-0174-BFB6-E011-BB0414AA69EB}"/>
+              </a:ext>
+            </a:extLst>
+          </p:cNvPr>
+          <p:cNvSpPr txBox="1"/>
+          <p:nvPr/>
+        </p:nvSpPr>
+        <p:spPr>
+          <a:xfrm>
+            <a:off x="3090865" y="3314700"/>
+            <a:ext cx="2430474" cy="2862322"/>
+          </a:xfrm>
+          <a:prstGeom prst="rect">
+            <a:avLst/>
+          </a:prstGeom>
+          <a:noFill/>
+        </p:spPr>
+        <p:txBody>
+          <a:bodyPr wrap="none" rtlCol="0">
+            <a:spAutoFit/>
+          </a:bodyPr>
+          <a:lstStyle/>
+          <a:p>
+            <a:pPr algn="ctr"/>
+            <a:r>
+              <a:rPr lang="en-US" sz="3600" dirty="0">
+                <a:solidFill>
+                  <a:schemeClr val="bg1"/>
+                </a:solidFill>
+              </a:rPr>
+              <a:t>Union</a:t>
+            </a:r>
+          </a:p>
+          <a:p>
+            <a:pPr algn="ctr"/>
+            <a:endParaRPr lang="en-US" sz="3600" dirty="0">
+              <a:solidFill>
+                <a:schemeClr val="bg1"/>
+              </a:solidFill>
+            </a:endParaRPr>
+          </a:p>
+          <a:p>
+            <a:pPr algn="ctr"/>
+            <a:r>
+              <a:rPr lang="en-US" sz="3600" dirty="0">
+                <a:solidFill>
+                  <a:schemeClr val="bg1"/>
+                </a:solidFill>
+              </a:rPr>
+              <a:t>Difference</a:t>
+            </a:r>
+          </a:p>
+          <a:p>
+            <a:pPr algn="ctr"/>
+            <a:endParaRPr lang="en-US" sz="3600" dirty="0">
+              <a:solidFill>
+                <a:schemeClr val="bg1"/>
+              </a:solidFill>
+            </a:endParaRPr>
+          </a:p>
+          <a:p>
+            <a:pPr algn="ctr"/>
+            <a:r>
+              <a:rPr lang="en-US" sz="3600" dirty="0">
+                <a:solidFill>
+                  <a:schemeClr val="bg1"/>
+                </a:solidFill>
+              </a:rPr>
+              <a:t>Intersection</a:t>
+            </a:r>
+          </a:p>
+        </p:txBody>
+      </p:sp>
+    </p:spTree>
+    <p:extLst>
+      <p:ext uri="{BB962C8B-B14F-4D97-AF65-F5344CB8AC3E}">
+        <p14:creationId xmlns:p14="http://schemas.microsoft.com/office/powerpoint/2010/main" val="3205827949"/>
+      </p:ext>
+    </p:extLst>
+  </p:cSld>
+  <p:clrMapOvr>
+    <a:masterClrMapping/>
+  </p:clrMapOvr>
+</p:sld>
+</file>
+
+<file path=ppt/slides/slide9.xml><?xml version="1.0" encoding="utf-8"?>
+<p:sld xmlns:a="http://schemas.openxmlformats.org/drawingml/2006/main" xmlns:r="http://schemas.openxmlformats.org/officeDocument/2006/relationships" xmlns:p="http://schemas.openxmlformats.org/presentationml/2006/main">
+  <p:cSld>
+    <p:spTree>
+      <p:nvGrpSpPr>
+        <p:cNvPr id="1" name=""/>
+        <p:cNvGrpSpPr/>
+        <p:nvPr/>
+      </p:nvGrpSpPr>
+      <p:grpSpPr>
+        <a:xfrm>
+          <a:off x="0" y="0"/>
+          <a:ext cx="0" cy="0"/>
+          <a:chOff x="0" y="0"/>
+          <a:chExt cx="0" cy="0"/>
+        </a:xfrm>
+      </p:grpSpPr>
+      <p:sp>
+        <p:nvSpPr>
+          <p:cNvPr id="4" name="Title 3">
+            <a:extLst>
+              <a:ext uri="{FF2B5EF4-FFF2-40B4-BE49-F238E27FC236}">
+                <a16:creationId xmlns:a16="http://schemas.microsoft.com/office/drawing/2014/main" id="{1E1A75EA-3DE1-6BD1-8A84-A8D3D57E2F03}"/>
+              </a:ext>
+            </a:extLst>
+          </p:cNvPr>
+          <p:cNvSpPr>
+            <a:spLocks noGrp="1"/>
+          </p:cNvSpPr>
+          <p:nvPr>
+            <p:ph type="ctrTitle"/>
+          </p:nvPr>
+        </p:nvSpPr>
+        <p:spPr>
+          <a:xfrm>
+            <a:off x="581191" y="756139"/>
+            <a:ext cx="10993549" cy="1072662"/>
+          </a:xfrm>
+        </p:spPr>
+        <p:txBody>
+          <a:bodyPr>
+            <a:normAutofit/>
+          </a:bodyPr>
+          <a:lstStyle/>
+          <a:p>
+            <a:r>
+              <a:rPr lang="en-US" sz="4800" cap="none" dirty="0"/>
+              <a:t>OpenSCAD Modeling Practice</a:t>
+            </a:r>
+          </a:p>
+        </p:txBody>
+      </p:sp>
+      <p:sp>
+        <p:nvSpPr>
+          <p:cNvPr id="5" name="Subtitle 4">
+            <a:extLst>
+              <a:ext uri="{FF2B5EF4-FFF2-40B4-BE49-F238E27FC236}">
+                <a16:creationId xmlns:a16="http://schemas.microsoft.com/office/drawing/2014/main" id="{4B2FCE2E-86B8-4A2C-B7B7-0B929427A000}"/>
+              </a:ext>
+            </a:extLst>
+          </p:cNvPr>
+          <p:cNvSpPr>
+            <a:spLocks noGrp="1"/>
+          </p:cNvSpPr>
+          <p:nvPr>
+            <p:ph type="subTitle" idx="1"/>
+          </p:nvPr>
+        </p:nvSpPr>
+        <p:spPr>
+          <a:xfrm>
+            <a:off x="581194" y="2127739"/>
+            <a:ext cx="10993546" cy="958028"/>
+          </a:xfrm>
+        </p:spPr>
+        <p:txBody>
+          <a:bodyPr>
+            <a:normAutofit fontScale="92500"/>
+          </a:bodyPr>
+          <a:lstStyle/>
+          <a:p>
+            <a:r>
+              <a:rPr lang="en-US" sz="3600" cap="none" dirty="0"/>
+              <a:t>OpenSCAD Tutorial/Chapter 3 (part 3 – Update Car Model)</a:t>
+            </a:r>
+          </a:p>
+        </p:txBody>
+      </p:sp>
+      <p:pic>
+        <p:nvPicPr>
+          <p:cNvPr id="6" name="Picture 5" descr="A yellow and green object with holes&#10;&#10;Description automatically generated">
+            <a:extLst>
+              <a:ext uri="{FF2B5EF4-FFF2-40B4-BE49-F238E27FC236}">
+                <a16:creationId xmlns:a16="http://schemas.microsoft.com/office/drawing/2014/main" id="{0731BA8F-6478-2556-A80D-8B9077A55A1F}"/>
+              </a:ext>
+            </a:extLst>
+          </p:cNvPr>
+          <p:cNvPicPr>
+            <a:picLocks noChangeAspect="1"/>
+          </p:cNvPicPr>
+          <p:nvPr/>
+        </p:nvPicPr>
+        <p:blipFill>
+          <a:blip r:embed="rId2"/>
+          <a:stretch>
+            <a:fillRect/>
+          </a:stretch>
+        </p:blipFill>
+        <p:spPr>
+          <a:xfrm>
+            <a:off x="9101136" y="3458306"/>
+            <a:ext cx="1950794" cy="1623642"/>
+          </a:xfrm>
+          <a:prstGeom prst="roundRect">
+            <a:avLst>
+              <a:gd name="adj" fmla="val 8594"/>
+            </a:avLst>
+          </a:prstGeom>
+          <a:solidFill>
+            <a:srgbClr val="FFFFFF">
+              <a:shade val="85000"/>
+            </a:srgbClr>
+          </a:solidFill>
+          <a:ln>
+            <a:noFill/>
+          </a:ln>
+          <a:effectLst>
+            <a:reflection blurRad="12700" stA="38000" endPos="28000" dist="5000" dir="5400000" sy="-100000" algn="bl" rotWithShape="0"/>
+          </a:effectLst>
+        </p:spPr>
+      </p:pic>
       <p:pic>
         <p:nvPicPr>
           <p:cNvPr id="3" name="Picture 2">
@@ -6381,7 +6603,7 @@
     </p:spTree>
     <p:extLst>
       <p:ext uri="{BB962C8B-B14F-4D97-AF65-F5344CB8AC3E}">
-        <p14:creationId xmlns:p14="http://schemas.microsoft.com/office/powerpoint/2010/main" val="3205827949"/>
+        <p14:creationId xmlns:p14="http://schemas.microsoft.com/office/powerpoint/2010/main" val="71419579"/>
       </p:ext>
     </p:extLst>
   </p:cSld>
@@ -7557,6 +7779,15 @@
 </file>
 
 <file path=customXml/item2.xml><?xml version="1.0" encoding="utf-8"?>
+<?mso-contentType ?>
+<FormTemplates xmlns="http://schemas.microsoft.com/sharepoint/v3/contenttype/forms">
+  <Display>DocumentLibraryForm</Display>
+  <Edit>DocumentLibraryForm</Edit>
+  <New>DocumentLibraryForm</New>
+</FormTemplates>
+</file>
+
+<file path=customXml/item3.xml><?xml version="1.0" encoding="utf-8"?>
 <p:properties xmlns:p="http://schemas.microsoft.com/office/2006/metadata/properties" xmlns:xsi="http://www.w3.org/2001/XMLSchema-instance" xmlns:pc="http://schemas.microsoft.com/office/infopath/2007/PartnerControls">
   <documentManagement>
     <_ip_UnifiedCompliancePolicyUIAction xmlns="http://schemas.microsoft.com/sharepoint/v3" xsi:nil="true"/>
@@ -7574,15 +7805,6 @@
     <MediaServiceKeyPoints xmlns="71af3243-3dd4-4a8d-8c0d-dd76da1f02a5" xsi:nil="true"/>
   </documentManagement>
 </p:properties>
-</file>
-
-<file path=customXml/item3.xml><?xml version="1.0" encoding="utf-8"?>
-<?mso-contentType ?>
-<FormTemplates xmlns="http://schemas.microsoft.com/sharepoint/v3/contenttype/forms">
-  <Display>DocumentLibraryForm</Display>
-  <Edit>DocumentLibraryForm</Edit>
-  <New>DocumentLibraryForm</New>
-</FormTemplates>
 </file>
 
 <file path=customXml/itemProps1.xml><?xml version="1.0" encoding="utf-8"?>
@@ -7607,6 +7829,14 @@
 </file>
 
 <file path=customXml/itemProps2.xml><?xml version="1.0" encoding="utf-8"?>
+<ds:datastoreItem xmlns:ds="http://schemas.openxmlformats.org/officeDocument/2006/customXml" ds:itemID="{342D3C2F-55A5-48C0-9D5A-95C7FF0389D0}">
+  <ds:schemaRefs>
+    <ds:schemaRef ds:uri="http://schemas.microsoft.com/sharepoint/v3/contenttype/forms"/>
+  </ds:schemaRefs>
+</ds:datastoreItem>
+</file>
+
+<file path=customXml/itemProps3.xml><?xml version="1.0" encoding="utf-8"?>
 <ds:datastoreItem xmlns:ds="http://schemas.openxmlformats.org/officeDocument/2006/customXml" ds:itemID="{3791575F-4C21-47C4-8D13-EB9BE66B536F}">
   <ds:schemaRefs>
     <ds:schemaRef ds:uri="http://schemas.microsoft.com/office/2006/metadata/properties"/>
@@ -7616,12 +7846,4 @@
     <ds:schemaRef ds:uri="230e9df3-be65-4c73-a93b-d1236ebd677e"/>
   </ds:schemaRefs>
 </ds:datastoreItem>
-</file>
-
-<file path=customXml/itemProps3.xml><?xml version="1.0" encoding="utf-8"?>
-<ds:datastoreItem xmlns:ds="http://schemas.openxmlformats.org/officeDocument/2006/customXml" ds:itemID="{342D3C2F-55A5-48C0-9D5A-95C7FF0389D0}">
-  <ds:schemaRefs>
-    <ds:schemaRef ds:uri="http://schemas.microsoft.com/sharepoint/v3/contenttype/forms"/>
-  </ds:schemaRefs>
-</ds:datastoreItem>
 </file>
</xml_diff>

<commit_message>
add chapter 4 part 1 & 2
</commit_message>
<xml_diff>
--- a/OpenSCAD.pptx
+++ b/OpenSCAD.pptx
@@ -5,10 +5,10 @@
     <p:sldMasterId id="2147483672" r:id="rId4"/>
   </p:sldMasterIdLst>
   <p:notesMasterIdLst>
-    <p:notesMasterId r:id="rId14"/>
+    <p:notesMasterId r:id="rId18"/>
   </p:notesMasterIdLst>
   <p:handoutMasterIdLst>
-    <p:handoutMasterId r:id="rId15"/>
+    <p:handoutMasterId r:id="rId19"/>
   </p:handoutMasterIdLst>
   <p:sldIdLst>
     <p:sldId id="256" r:id="rId5"/>
@@ -20,6 +20,10 @@
     <p:sldId id="262" r:id="rId11"/>
     <p:sldId id="263" r:id="rId12"/>
     <p:sldId id="264" r:id="rId13"/>
+    <p:sldId id="265" r:id="rId14"/>
+    <p:sldId id="266" r:id="rId15"/>
+    <p:sldId id="267" r:id="rId16"/>
+    <p:sldId id="268" r:id="rId17"/>
   </p:sldIdLst>
   <p:sldSz cx="12192000" cy="6858000"/>
   <p:notesSz cx="6858000" cy="9144000"/>
@@ -223,7 +227,7 @@
           <a:p>
             <a:fld id="{AF869721-F543-4A6C-BF9D-65D7CC540427}" type="datetimeFigureOut">
               <a:rPr lang="en-US" smtClean="0"/>
-              <a:t>9/9/2023</a:t>
+              <a:t>9/10/2023</a:t>
             </a:fld>
             <a:endParaRPr lang="en-US" dirty="0"/>
           </a:p>
@@ -400,7 +404,7 @@
           <a:p>
             <a:fld id="{C732326A-4C88-4AFB-AA5B-5919D81DFF5B}" type="datetimeFigureOut">
               <a:rPr lang="en-US" smtClean="0"/>
-              <a:t>9/9/2023</a:t>
+              <a:t>9/10/2023</a:t>
             </a:fld>
             <a:endParaRPr lang="en-US" dirty="0"/>
           </a:p>
@@ -997,7 +1001,7 @@
             <a:fld id="{B61BEF0D-F0BB-DE4B-95CE-6DB70DBA9567}" type="datetimeFigureOut">
               <a:rPr lang="en-US" smtClean="0"/>
               <a:pPr/>
-              <a:t>9/9/2023</a:t>
+              <a:t>9/10/2023</a:t>
             </a:fld>
             <a:endParaRPr lang="en-US" dirty="0"/>
           </a:p>
@@ -1261,7 +1265,7 @@
             <a:fld id="{B61BEF0D-F0BB-DE4B-95CE-6DB70DBA9567}" type="datetimeFigureOut">
               <a:rPr lang="en-US" smtClean="0"/>
               <a:pPr/>
-              <a:t>9/9/2023</a:t>
+              <a:t>9/10/2023</a:t>
             </a:fld>
             <a:endParaRPr lang="en-US" dirty="0"/>
           </a:p>
@@ -1498,7 +1502,7 @@
             <a:fld id="{B61BEF0D-F0BB-DE4B-95CE-6DB70DBA9567}" type="datetimeFigureOut">
               <a:rPr lang="en-US" smtClean="0"/>
               <a:pPr/>
-              <a:t>9/9/2023</a:t>
+              <a:t>9/10/2023</a:t>
             </a:fld>
             <a:endParaRPr lang="en-US" dirty="0"/>
           </a:p>
@@ -1740,7 +1744,7 @@
             <a:fld id="{B61BEF0D-F0BB-DE4B-95CE-6DB70DBA9567}" type="datetimeFigureOut">
               <a:rPr lang="en-US" smtClean="0"/>
               <a:pPr/>
-              <a:t>9/9/2023</a:t>
+              <a:t>9/10/2023</a:t>
             </a:fld>
             <a:endParaRPr lang="en-US" dirty="0"/>
           </a:p>
@@ -2049,7 +2053,7 @@
             <a:fld id="{B61BEF0D-F0BB-DE4B-95CE-6DB70DBA9567}" type="datetimeFigureOut">
               <a:rPr lang="en-US" smtClean="0"/>
               <a:pPr/>
-              <a:t>9/9/2023</a:t>
+              <a:t>9/10/2023</a:t>
             </a:fld>
             <a:endParaRPr lang="en-US" dirty="0"/>
           </a:p>
@@ -2353,7 +2357,7 @@
             <a:fld id="{B61BEF0D-F0BB-DE4B-95CE-6DB70DBA9567}" type="datetimeFigureOut">
               <a:rPr lang="en-US" smtClean="0"/>
               <a:pPr/>
-              <a:t>9/9/2023</a:t>
+              <a:t>9/10/2023</a:t>
             </a:fld>
             <a:endParaRPr lang="en-US" dirty="0"/>
           </a:p>
@@ -2777,7 +2781,7 @@
             <a:fld id="{B61BEF0D-F0BB-DE4B-95CE-6DB70DBA9567}" type="datetimeFigureOut">
               <a:rPr lang="en-US" smtClean="0"/>
               <a:pPr/>
-              <a:t>9/9/2023</a:t>
+              <a:t>9/10/2023</a:t>
             </a:fld>
             <a:endParaRPr lang="en-US" dirty="0"/>
           </a:p>
@@ -2874,7 +2878,7 @@
             <a:fld id="{B61BEF0D-F0BB-DE4B-95CE-6DB70DBA9567}" type="datetimeFigureOut">
               <a:rPr lang="en-US" smtClean="0"/>
               <a:pPr/>
-              <a:t>9/9/2023</a:t>
+              <a:t>9/10/2023</a:t>
             </a:fld>
             <a:endParaRPr lang="en-US" dirty="0"/>
           </a:p>
@@ -3038,7 +3042,7 @@
             <a:fld id="{B61BEF0D-F0BB-DE4B-95CE-6DB70DBA9567}" type="datetimeFigureOut">
               <a:rPr lang="en-US" smtClean="0"/>
               <a:pPr/>
-              <a:t>9/9/2023</a:t>
+              <a:t>9/10/2023</a:t>
             </a:fld>
             <a:endParaRPr lang="en-US" dirty="0"/>
           </a:p>
@@ -3418,7 +3422,7 @@
             <a:fld id="{B61BEF0D-F0BB-DE4B-95CE-6DB70DBA9567}" type="datetimeFigureOut">
               <a:rPr lang="en-US" smtClean="0"/>
               <a:pPr/>
-              <a:t>9/9/2023</a:t>
+              <a:t>9/10/2023</a:t>
             </a:fld>
             <a:endParaRPr lang="en-US" dirty="0"/>
           </a:p>
@@ -3709,7 +3713,7 @@
             <a:fld id="{B61BEF0D-F0BB-DE4B-95CE-6DB70DBA9567}" type="datetimeFigureOut">
               <a:rPr lang="en-US" smtClean="0"/>
               <a:pPr/>
-              <a:t>9/9/2023</a:t>
+              <a:t>9/10/2023</a:t>
             </a:fld>
             <a:endParaRPr lang="en-US" dirty="0"/>
           </a:p>
@@ -3922,7 +3926,7 @@
             <a:fld id="{B61BEF0D-F0BB-DE4B-95CE-6DB70DBA9567}" type="datetimeFigureOut">
               <a:rPr lang="en-US" smtClean="0"/>
               <a:pPr/>
-              <a:t>9/9/2023</a:t>
+              <a:t>9/10/2023</a:t>
             </a:fld>
             <a:endParaRPr lang="en-US" dirty="0"/>
           </a:p>
@@ -5102,6 +5106,938 @@
     <p:extLst>
       <p:ext uri="{BB962C8B-B14F-4D97-AF65-F5344CB8AC3E}">
         <p14:creationId xmlns:p14="http://schemas.microsoft.com/office/powerpoint/2010/main" val="1487700712"/>
+      </p:ext>
+    </p:extLst>
+  </p:cSld>
+  <p:clrMapOvr>
+    <a:masterClrMapping/>
+  </p:clrMapOvr>
+</p:sld>
+</file>
+
+<file path=ppt/slides/slide10.xml><?xml version="1.0" encoding="utf-8"?>
+<p:sld xmlns:a="http://schemas.openxmlformats.org/drawingml/2006/main" xmlns:r="http://schemas.openxmlformats.org/officeDocument/2006/relationships" xmlns:p="http://schemas.openxmlformats.org/presentationml/2006/main">
+  <p:cSld>
+    <p:spTree>
+      <p:nvGrpSpPr>
+        <p:cNvPr id="1" name=""/>
+        <p:cNvGrpSpPr/>
+        <p:nvPr/>
+      </p:nvGrpSpPr>
+      <p:grpSpPr>
+        <a:xfrm>
+          <a:off x="0" y="0"/>
+          <a:ext cx="0" cy="0"/>
+          <a:chOff x="0" y="0"/>
+          <a:chExt cx="0" cy="0"/>
+        </a:xfrm>
+      </p:grpSpPr>
+      <p:sp>
+        <p:nvSpPr>
+          <p:cNvPr id="4" name="Title 3">
+            <a:extLst>
+              <a:ext uri="{FF2B5EF4-FFF2-40B4-BE49-F238E27FC236}">
+                <a16:creationId xmlns:a16="http://schemas.microsoft.com/office/drawing/2014/main" id="{1E1A75EA-3DE1-6BD1-8A84-A8D3D57E2F03}"/>
+              </a:ext>
+            </a:extLst>
+          </p:cNvPr>
+          <p:cNvSpPr>
+            <a:spLocks noGrp="1"/>
+          </p:cNvSpPr>
+          <p:nvPr>
+            <p:ph type="ctrTitle"/>
+          </p:nvPr>
+        </p:nvSpPr>
+        <p:spPr>
+          <a:xfrm>
+            <a:off x="581191" y="756139"/>
+            <a:ext cx="10993549" cy="1072662"/>
+          </a:xfrm>
+        </p:spPr>
+        <p:txBody>
+          <a:bodyPr>
+            <a:normAutofit/>
+          </a:bodyPr>
+          <a:lstStyle/>
+          <a:p>
+            <a:r>
+              <a:rPr lang="en-US" sz="4800" cap="none" dirty="0"/>
+              <a:t>OpenSCAD Modeling Practice</a:t>
+            </a:r>
+          </a:p>
+        </p:txBody>
+      </p:sp>
+      <p:sp>
+        <p:nvSpPr>
+          <p:cNvPr id="5" name="Subtitle 4">
+            <a:extLst>
+              <a:ext uri="{FF2B5EF4-FFF2-40B4-BE49-F238E27FC236}">
+                <a16:creationId xmlns:a16="http://schemas.microsoft.com/office/drawing/2014/main" id="{4B2FCE2E-86B8-4A2C-B7B7-0B929427A000}"/>
+              </a:ext>
+            </a:extLst>
+          </p:cNvPr>
+          <p:cNvSpPr>
+            <a:spLocks noGrp="1"/>
+          </p:cNvSpPr>
+          <p:nvPr>
+            <p:ph type="subTitle" idx="1"/>
+          </p:nvPr>
+        </p:nvSpPr>
+        <p:spPr>
+          <a:xfrm>
+            <a:off x="581194" y="2127739"/>
+            <a:ext cx="10993546" cy="958028"/>
+          </a:xfrm>
+        </p:spPr>
+        <p:txBody>
+          <a:bodyPr>
+            <a:normAutofit fontScale="92500"/>
+          </a:bodyPr>
+          <a:lstStyle/>
+          <a:p>
+            <a:r>
+              <a:rPr lang="en-US" sz="3600" cap="none" dirty="0"/>
+              <a:t>OpenSCAD Tutorial/Chapter 4 (part 1 – Defining Modules)</a:t>
+            </a:r>
+          </a:p>
+        </p:txBody>
+      </p:sp>
+      <p:pic>
+        <p:nvPicPr>
+          <p:cNvPr id="6" name="Picture 5" descr="A yellow and green object with holes&#10;&#10;Description automatically generated">
+            <a:extLst>
+              <a:ext uri="{FF2B5EF4-FFF2-40B4-BE49-F238E27FC236}">
+                <a16:creationId xmlns:a16="http://schemas.microsoft.com/office/drawing/2014/main" id="{0731BA8F-6478-2556-A80D-8B9077A55A1F}"/>
+              </a:ext>
+            </a:extLst>
+          </p:cNvPr>
+          <p:cNvPicPr>
+            <a:picLocks noChangeAspect="1"/>
+          </p:cNvPicPr>
+          <p:nvPr/>
+        </p:nvPicPr>
+        <p:blipFill>
+          <a:blip r:embed="rId2"/>
+          <a:stretch>
+            <a:fillRect/>
+          </a:stretch>
+        </p:blipFill>
+        <p:spPr>
+          <a:xfrm>
+            <a:off x="9101136" y="3458306"/>
+            <a:ext cx="1950794" cy="1623642"/>
+          </a:xfrm>
+          <a:prstGeom prst="roundRect">
+            <a:avLst>
+              <a:gd name="adj" fmla="val 8594"/>
+            </a:avLst>
+          </a:prstGeom>
+          <a:solidFill>
+            <a:srgbClr val="FFFFFF">
+              <a:shade val="85000"/>
+            </a:srgbClr>
+          </a:solidFill>
+          <a:ln>
+            <a:noFill/>
+          </a:ln>
+          <a:effectLst>
+            <a:reflection blurRad="12700" stA="38000" endPos="28000" dist="5000" dir="5400000" sy="-100000" algn="bl" rotWithShape="0"/>
+          </a:effectLst>
+        </p:spPr>
+      </p:pic>
+      <p:pic>
+        <p:nvPicPr>
+          <p:cNvPr id="7" name="Picture 6">
+            <a:extLst>
+              <a:ext uri="{FF2B5EF4-FFF2-40B4-BE49-F238E27FC236}">
+                <a16:creationId xmlns:a16="http://schemas.microsoft.com/office/drawing/2014/main" id="{A17C430B-943E-3F2C-810F-12E394F81864}"/>
+              </a:ext>
+            </a:extLst>
+          </p:cNvPr>
+          <p:cNvPicPr>
+            <a:picLocks noChangeAspect="1"/>
+          </p:cNvPicPr>
+          <p:nvPr/>
+        </p:nvPicPr>
+        <p:blipFill>
+          <a:blip r:embed="rId3"/>
+          <a:stretch>
+            <a:fillRect/>
+          </a:stretch>
+        </p:blipFill>
+        <p:spPr>
+          <a:xfrm>
+            <a:off x="1652954" y="3528644"/>
+            <a:ext cx="3305908" cy="2344527"/>
+          </a:xfrm>
+          <a:prstGeom prst="rect">
+            <a:avLst/>
+          </a:prstGeom>
+          <a:ln>
+            <a:noFill/>
+          </a:ln>
+          <a:effectLst>
+            <a:outerShdw blurRad="292100" dist="139700" dir="2700000" algn="tl" rotWithShape="0">
+              <a:srgbClr val="333333">
+                <a:alpha val="65000"/>
+              </a:srgbClr>
+            </a:outerShdw>
+          </a:effectLst>
+        </p:spPr>
+      </p:pic>
+      <p:sp>
+        <p:nvSpPr>
+          <p:cNvPr id="8" name="TextBox 7">
+            <a:extLst>
+              <a:ext uri="{FF2B5EF4-FFF2-40B4-BE49-F238E27FC236}">
+                <a16:creationId xmlns:a16="http://schemas.microsoft.com/office/drawing/2014/main" id="{B5919600-29C9-E4A9-6BBB-ACACE4861EC2}"/>
+              </a:ext>
+            </a:extLst>
+          </p:cNvPr>
+          <p:cNvSpPr txBox="1"/>
+          <p:nvPr/>
+        </p:nvSpPr>
+        <p:spPr>
+          <a:xfrm>
+            <a:off x="5048266" y="5742658"/>
+            <a:ext cx="6526474" cy="461665"/>
+          </a:xfrm>
+          <a:prstGeom prst="rect">
+            <a:avLst/>
+          </a:prstGeom>
+          <a:noFill/>
+        </p:spPr>
+        <p:txBody>
+          <a:bodyPr wrap="square" rtlCol="0">
+            <a:spAutoFit/>
+          </a:bodyPr>
+          <a:lstStyle/>
+          <a:p>
+            <a:pPr algn="ctr"/>
+            <a:r>
+              <a:rPr lang="en-US" sz="2400" dirty="0">
+                <a:solidFill>
+                  <a:schemeClr val="bg1"/>
+                </a:solidFill>
+              </a:rPr>
+              <a:t>Module_Name(parameter=defaultvalue,…) {block}</a:t>
+            </a:r>
+          </a:p>
+        </p:txBody>
+      </p:sp>
+    </p:spTree>
+    <p:extLst>
+      <p:ext uri="{BB962C8B-B14F-4D97-AF65-F5344CB8AC3E}">
+        <p14:creationId xmlns:p14="http://schemas.microsoft.com/office/powerpoint/2010/main" val="223040972"/>
+      </p:ext>
+    </p:extLst>
+  </p:cSld>
+  <p:clrMapOvr>
+    <a:masterClrMapping/>
+  </p:clrMapOvr>
+</p:sld>
+</file>
+
+<file path=ppt/slides/slide11.xml><?xml version="1.0" encoding="utf-8"?>
+<p:sld xmlns:a="http://schemas.openxmlformats.org/drawingml/2006/main" xmlns:r="http://schemas.openxmlformats.org/officeDocument/2006/relationships" xmlns:p="http://schemas.openxmlformats.org/presentationml/2006/main">
+  <p:cSld>
+    <p:spTree>
+      <p:nvGrpSpPr>
+        <p:cNvPr id="1" name=""/>
+        <p:cNvGrpSpPr/>
+        <p:nvPr/>
+      </p:nvGrpSpPr>
+      <p:grpSpPr>
+        <a:xfrm>
+          <a:off x="0" y="0"/>
+          <a:ext cx="0" cy="0"/>
+          <a:chOff x="0" y="0"/>
+          <a:chExt cx="0" cy="0"/>
+        </a:xfrm>
+      </p:grpSpPr>
+      <p:sp>
+        <p:nvSpPr>
+          <p:cNvPr id="4" name="Title 3">
+            <a:extLst>
+              <a:ext uri="{FF2B5EF4-FFF2-40B4-BE49-F238E27FC236}">
+                <a16:creationId xmlns:a16="http://schemas.microsoft.com/office/drawing/2014/main" id="{1E1A75EA-3DE1-6BD1-8A84-A8D3D57E2F03}"/>
+              </a:ext>
+            </a:extLst>
+          </p:cNvPr>
+          <p:cNvSpPr>
+            <a:spLocks noGrp="1"/>
+          </p:cNvSpPr>
+          <p:nvPr>
+            <p:ph type="ctrTitle"/>
+          </p:nvPr>
+        </p:nvSpPr>
+        <p:spPr>
+          <a:xfrm>
+            <a:off x="581191" y="756139"/>
+            <a:ext cx="10993549" cy="1072662"/>
+          </a:xfrm>
+        </p:spPr>
+        <p:txBody>
+          <a:bodyPr>
+            <a:normAutofit/>
+          </a:bodyPr>
+          <a:lstStyle/>
+          <a:p>
+            <a:r>
+              <a:rPr lang="en-US" sz="4800" cap="none" dirty="0"/>
+              <a:t>OpenSCAD Modeling Practice</a:t>
+            </a:r>
+          </a:p>
+        </p:txBody>
+      </p:sp>
+      <p:sp>
+        <p:nvSpPr>
+          <p:cNvPr id="5" name="Subtitle 4">
+            <a:extLst>
+              <a:ext uri="{FF2B5EF4-FFF2-40B4-BE49-F238E27FC236}">
+                <a16:creationId xmlns:a16="http://schemas.microsoft.com/office/drawing/2014/main" id="{4B2FCE2E-86B8-4A2C-B7B7-0B929427A000}"/>
+              </a:ext>
+            </a:extLst>
+          </p:cNvPr>
+          <p:cNvSpPr>
+            <a:spLocks noGrp="1"/>
+          </p:cNvSpPr>
+          <p:nvPr>
+            <p:ph type="subTitle" idx="1"/>
+          </p:nvPr>
+        </p:nvSpPr>
+        <p:spPr>
+          <a:xfrm>
+            <a:off x="581194" y="2127739"/>
+            <a:ext cx="10993546" cy="958028"/>
+          </a:xfrm>
+        </p:spPr>
+        <p:txBody>
+          <a:bodyPr>
+            <a:normAutofit fontScale="92500" lnSpcReduction="20000"/>
+          </a:bodyPr>
+          <a:lstStyle/>
+          <a:p>
+            <a:r>
+              <a:rPr lang="en-US" sz="3600" cap="none" dirty="0"/>
+              <a:t>OpenSCAD Tutorial/Chapter 4 (part 2 – Parameterizing Modules)</a:t>
+            </a:r>
+          </a:p>
+        </p:txBody>
+      </p:sp>
+      <p:pic>
+        <p:nvPicPr>
+          <p:cNvPr id="6" name="Picture 5" descr="A yellow and green object with holes&#10;&#10;Description automatically generated">
+            <a:extLst>
+              <a:ext uri="{FF2B5EF4-FFF2-40B4-BE49-F238E27FC236}">
+                <a16:creationId xmlns:a16="http://schemas.microsoft.com/office/drawing/2014/main" id="{0731BA8F-6478-2556-A80D-8B9077A55A1F}"/>
+              </a:ext>
+            </a:extLst>
+          </p:cNvPr>
+          <p:cNvPicPr>
+            <a:picLocks noChangeAspect="1"/>
+          </p:cNvPicPr>
+          <p:nvPr/>
+        </p:nvPicPr>
+        <p:blipFill>
+          <a:blip r:embed="rId2"/>
+          <a:stretch>
+            <a:fillRect/>
+          </a:stretch>
+        </p:blipFill>
+        <p:spPr>
+          <a:xfrm>
+            <a:off x="9101136" y="3458306"/>
+            <a:ext cx="1950794" cy="1623642"/>
+          </a:xfrm>
+          <a:prstGeom prst="roundRect">
+            <a:avLst>
+              <a:gd name="adj" fmla="val 8594"/>
+            </a:avLst>
+          </a:prstGeom>
+          <a:solidFill>
+            <a:srgbClr val="FFFFFF">
+              <a:shade val="85000"/>
+            </a:srgbClr>
+          </a:solidFill>
+          <a:ln>
+            <a:noFill/>
+          </a:ln>
+          <a:effectLst>
+            <a:reflection blurRad="12700" stA="38000" endPos="28000" dist="5000" dir="5400000" sy="-100000" algn="bl" rotWithShape="0"/>
+          </a:effectLst>
+        </p:spPr>
+      </p:pic>
+      <p:pic>
+        <p:nvPicPr>
+          <p:cNvPr id="3" name="Picture 2">
+            <a:extLst>
+              <a:ext uri="{FF2B5EF4-FFF2-40B4-BE49-F238E27FC236}">
+                <a16:creationId xmlns:a16="http://schemas.microsoft.com/office/drawing/2014/main" id="{38E3B0E8-E270-D5E7-EB86-FA00A4AA9B79}"/>
+              </a:ext>
+            </a:extLst>
+          </p:cNvPr>
+          <p:cNvPicPr>
+            <a:picLocks noChangeAspect="1"/>
+          </p:cNvPicPr>
+          <p:nvPr/>
+        </p:nvPicPr>
+        <p:blipFill>
+          <a:blip r:embed="rId3"/>
+          <a:stretch>
+            <a:fillRect/>
+          </a:stretch>
+        </p:blipFill>
+        <p:spPr>
+          <a:xfrm>
+            <a:off x="2507722" y="3429000"/>
+            <a:ext cx="3588278" cy="2561125"/>
+          </a:xfrm>
+          <a:prstGeom prst="rect">
+            <a:avLst/>
+          </a:prstGeom>
+          <a:ln>
+            <a:noFill/>
+          </a:ln>
+          <a:effectLst>
+            <a:outerShdw blurRad="292100" dist="139700" dir="2700000" algn="tl" rotWithShape="0">
+              <a:srgbClr val="333333">
+                <a:alpha val="65000"/>
+              </a:srgbClr>
+            </a:outerShdw>
+          </a:effectLst>
+        </p:spPr>
+      </p:pic>
+    </p:spTree>
+    <p:extLst>
+      <p:ext uri="{BB962C8B-B14F-4D97-AF65-F5344CB8AC3E}">
+        <p14:creationId xmlns:p14="http://schemas.microsoft.com/office/powerpoint/2010/main" val="1494417473"/>
+      </p:ext>
+    </p:extLst>
+  </p:cSld>
+  <p:clrMapOvr>
+    <a:masterClrMapping/>
+  </p:clrMapOvr>
+</p:sld>
+</file>
+
+<file path=ppt/slides/slide12.xml><?xml version="1.0" encoding="utf-8"?>
+<p:sld xmlns:a="http://schemas.openxmlformats.org/drawingml/2006/main" xmlns:r="http://schemas.openxmlformats.org/officeDocument/2006/relationships" xmlns:p="http://schemas.openxmlformats.org/presentationml/2006/main">
+  <p:cSld>
+    <p:spTree>
+      <p:nvGrpSpPr>
+        <p:cNvPr id="1" name=""/>
+        <p:cNvGrpSpPr/>
+        <p:nvPr/>
+      </p:nvGrpSpPr>
+      <p:grpSpPr>
+        <a:xfrm>
+          <a:off x="0" y="0"/>
+          <a:ext cx="0" cy="0"/>
+          <a:chOff x="0" y="0"/>
+          <a:chExt cx="0" cy="0"/>
+        </a:xfrm>
+      </p:grpSpPr>
+      <p:sp>
+        <p:nvSpPr>
+          <p:cNvPr id="4" name="Title 3">
+            <a:extLst>
+              <a:ext uri="{FF2B5EF4-FFF2-40B4-BE49-F238E27FC236}">
+                <a16:creationId xmlns:a16="http://schemas.microsoft.com/office/drawing/2014/main" id="{1E1A75EA-3DE1-6BD1-8A84-A8D3D57E2F03}"/>
+              </a:ext>
+            </a:extLst>
+          </p:cNvPr>
+          <p:cNvSpPr>
+            <a:spLocks noGrp="1"/>
+          </p:cNvSpPr>
+          <p:nvPr>
+            <p:ph type="ctrTitle"/>
+          </p:nvPr>
+        </p:nvSpPr>
+        <p:spPr>
+          <a:xfrm>
+            <a:off x="581191" y="756139"/>
+            <a:ext cx="10993549" cy="1072662"/>
+          </a:xfrm>
+        </p:spPr>
+        <p:txBody>
+          <a:bodyPr>
+            <a:normAutofit/>
+          </a:bodyPr>
+          <a:lstStyle/>
+          <a:p>
+            <a:r>
+              <a:rPr lang="en-US" sz="4800" cap="none" dirty="0"/>
+              <a:t>OpenSCAD Modeling Practice</a:t>
+            </a:r>
+          </a:p>
+        </p:txBody>
+      </p:sp>
+      <p:sp>
+        <p:nvSpPr>
+          <p:cNvPr id="5" name="Subtitle 4">
+            <a:extLst>
+              <a:ext uri="{FF2B5EF4-FFF2-40B4-BE49-F238E27FC236}">
+                <a16:creationId xmlns:a16="http://schemas.microsoft.com/office/drawing/2014/main" id="{4B2FCE2E-86B8-4A2C-B7B7-0B929427A000}"/>
+              </a:ext>
+            </a:extLst>
+          </p:cNvPr>
+          <p:cNvSpPr>
+            <a:spLocks noGrp="1"/>
+          </p:cNvSpPr>
+          <p:nvPr>
+            <p:ph type="subTitle" idx="1"/>
+          </p:nvPr>
+        </p:nvSpPr>
+        <p:spPr>
+          <a:xfrm>
+            <a:off x="581194" y="2127739"/>
+            <a:ext cx="10993546" cy="958028"/>
+          </a:xfrm>
+        </p:spPr>
+        <p:txBody>
+          <a:bodyPr>
+            <a:normAutofit fontScale="92500" lnSpcReduction="20000"/>
+          </a:bodyPr>
+          <a:lstStyle/>
+          <a:p>
+            <a:r>
+              <a:rPr lang="en-US" sz="3600" cap="none" dirty="0"/>
+              <a:t>OpenSCAD Tutorial/Chapter 4 (part 3 – Default Values in Modules)</a:t>
+            </a:r>
+          </a:p>
+        </p:txBody>
+      </p:sp>
+      <p:pic>
+        <p:nvPicPr>
+          <p:cNvPr id="6" name="Picture 5" descr="A yellow and green object with holes&#10;&#10;Description automatically generated">
+            <a:extLst>
+              <a:ext uri="{FF2B5EF4-FFF2-40B4-BE49-F238E27FC236}">
+                <a16:creationId xmlns:a16="http://schemas.microsoft.com/office/drawing/2014/main" id="{0731BA8F-6478-2556-A80D-8B9077A55A1F}"/>
+              </a:ext>
+            </a:extLst>
+          </p:cNvPr>
+          <p:cNvPicPr>
+            <a:picLocks noChangeAspect="1"/>
+          </p:cNvPicPr>
+          <p:nvPr/>
+        </p:nvPicPr>
+        <p:blipFill>
+          <a:blip r:embed="rId2"/>
+          <a:stretch>
+            <a:fillRect/>
+          </a:stretch>
+        </p:blipFill>
+        <p:spPr>
+          <a:xfrm>
+            <a:off x="9101136" y="3458306"/>
+            <a:ext cx="1950794" cy="1623642"/>
+          </a:xfrm>
+          <a:prstGeom prst="roundRect">
+            <a:avLst>
+              <a:gd name="adj" fmla="val 8594"/>
+            </a:avLst>
+          </a:prstGeom>
+          <a:solidFill>
+            <a:srgbClr val="FFFFFF">
+              <a:shade val="85000"/>
+            </a:srgbClr>
+          </a:solidFill>
+          <a:ln>
+            <a:noFill/>
+          </a:ln>
+          <a:effectLst>
+            <a:reflection blurRad="12700" stA="38000" endPos="28000" dist="5000" dir="5400000" sy="-100000" algn="bl" rotWithShape="0"/>
+          </a:effectLst>
+        </p:spPr>
+      </p:pic>
+      <p:pic>
+        <p:nvPicPr>
+          <p:cNvPr id="3" name="Picture 2">
+            <a:extLst>
+              <a:ext uri="{FF2B5EF4-FFF2-40B4-BE49-F238E27FC236}">
+                <a16:creationId xmlns:a16="http://schemas.microsoft.com/office/drawing/2014/main" id="{D27766E7-C0C1-5852-82FA-4C5166CDEC9B}"/>
+              </a:ext>
+            </a:extLst>
+          </p:cNvPr>
+          <p:cNvPicPr>
+            <a:picLocks noChangeAspect="1"/>
+          </p:cNvPicPr>
+          <p:nvPr/>
+        </p:nvPicPr>
+        <p:blipFill>
+          <a:blip r:embed="rId3"/>
+          <a:stretch>
+            <a:fillRect/>
+          </a:stretch>
+        </p:blipFill>
+        <p:spPr>
+          <a:xfrm>
+            <a:off x="738188" y="4194386"/>
+            <a:ext cx="1166966" cy="1253408"/>
+          </a:xfrm>
+          <a:prstGeom prst="rect">
+            <a:avLst/>
+          </a:prstGeom>
+          <a:ln>
+            <a:noFill/>
+          </a:ln>
+          <a:effectLst>
+            <a:outerShdw blurRad="292100" dist="139700" dir="2700000" algn="tl" rotWithShape="0">
+              <a:srgbClr val="333333">
+                <a:alpha val="65000"/>
+              </a:srgbClr>
+            </a:outerShdw>
+          </a:effectLst>
+        </p:spPr>
+      </p:pic>
+      <p:pic>
+        <p:nvPicPr>
+          <p:cNvPr id="8" name="Picture 7">
+            <a:extLst>
+              <a:ext uri="{FF2B5EF4-FFF2-40B4-BE49-F238E27FC236}">
+                <a16:creationId xmlns:a16="http://schemas.microsoft.com/office/drawing/2014/main" id="{A3C8FEC8-C168-8DE2-551E-1A77C4D59F2B}"/>
+              </a:ext>
+            </a:extLst>
+          </p:cNvPr>
+          <p:cNvPicPr>
+            <a:picLocks noChangeAspect="1"/>
+          </p:cNvPicPr>
+          <p:nvPr/>
+        </p:nvPicPr>
+        <p:blipFill>
+          <a:blip r:embed="rId4"/>
+          <a:stretch>
+            <a:fillRect/>
+          </a:stretch>
+        </p:blipFill>
+        <p:spPr>
+          <a:xfrm>
+            <a:off x="2181756" y="4287003"/>
+            <a:ext cx="1166966" cy="1068175"/>
+          </a:xfrm>
+          <a:prstGeom prst="rect">
+            <a:avLst/>
+          </a:prstGeom>
+          <a:ln>
+            <a:noFill/>
+          </a:ln>
+          <a:effectLst>
+            <a:outerShdw blurRad="292100" dist="139700" dir="2700000" algn="tl" rotWithShape="0">
+              <a:srgbClr val="333333">
+                <a:alpha val="65000"/>
+              </a:srgbClr>
+            </a:outerShdw>
+          </a:effectLst>
+        </p:spPr>
+      </p:pic>
+      <p:pic>
+        <p:nvPicPr>
+          <p:cNvPr id="10" name="Picture 9">
+            <a:extLst>
+              <a:ext uri="{FF2B5EF4-FFF2-40B4-BE49-F238E27FC236}">
+                <a16:creationId xmlns:a16="http://schemas.microsoft.com/office/drawing/2014/main" id="{97AC62D4-9938-C5E7-05A3-E9A93FCFFDD5}"/>
+              </a:ext>
+            </a:extLst>
+          </p:cNvPr>
+          <p:cNvPicPr>
+            <a:picLocks noChangeAspect="1"/>
+          </p:cNvPicPr>
+          <p:nvPr/>
+        </p:nvPicPr>
+        <p:blipFill>
+          <a:blip r:embed="rId5"/>
+          <a:stretch>
+            <a:fillRect/>
+          </a:stretch>
+        </p:blipFill>
+        <p:spPr>
+          <a:xfrm>
+            <a:off x="3625324" y="4231433"/>
+            <a:ext cx="1197838" cy="1179315"/>
+          </a:xfrm>
+          <a:prstGeom prst="rect">
+            <a:avLst/>
+          </a:prstGeom>
+          <a:ln>
+            <a:noFill/>
+          </a:ln>
+          <a:effectLst>
+            <a:outerShdw blurRad="292100" dist="139700" dir="2700000" algn="tl" rotWithShape="0">
+              <a:srgbClr val="333333">
+                <a:alpha val="65000"/>
+              </a:srgbClr>
+            </a:outerShdw>
+          </a:effectLst>
+        </p:spPr>
+      </p:pic>
+      <p:pic>
+        <p:nvPicPr>
+          <p:cNvPr id="12" name="Picture 11">
+            <a:extLst>
+              <a:ext uri="{FF2B5EF4-FFF2-40B4-BE49-F238E27FC236}">
+                <a16:creationId xmlns:a16="http://schemas.microsoft.com/office/drawing/2014/main" id="{10AE1FB0-EA8B-B321-7B20-F6A43844C28B}"/>
+              </a:ext>
+            </a:extLst>
+          </p:cNvPr>
+          <p:cNvPicPr>
+            <a:picLocks noChangeAspect="1"/>
+          </p:cNvPicPr>
+          <p:nvPr/>
+        </p:nvPicPr>
+        <p:blipFill>
+          <a:blip r:embed="rId6"/>
+          <a:stretch>
+            <a:fillRect/>
+          </a:stretch>
+        </p:blipFill>
+        <p:spPr>
+          <a:xfrm>
+            <a:off x="5099764" y="4163514"/>
+            <a:ext cx="1321326" cy="1315152"/>
+          </a:xfrm>
+          <a:prstGeom prst="rect">
+            <a:avLst/>
+          </a:prstGeom>
+          <a:ln>
+            <a:noFill/>
+          </a:ln>
+          <a:effectLst>
+            <a:outerShdw blurRad="292100" dist="139700" dir="2700000" algn="tl" rotWithShape="0">
+              <a:srgbClr val="333333">
+                <a:alpha val="65000"/>
+              </a:srgbClr>
+            </a:outerShdw>
+          </a:effectLst>
+        </p:spPr>
+      </p:pic>
+      <p:pic>
+        <p:nvPicPr>
+          <p:cNvPr id="14" name="Picture 13">
+            <a:extLst>
+              <a:ext uri="{FF2B5EF4-FFF2-40B4-BE49-F238E27FC236}">
+                <a16:creationId xmlns:a16="http://schemas.microsoft.com/office/drawing/2014/main" id="{EC783A29-4257-E681-48B5-2D935CE3F122}"/>
+              </a:ext>
+            </a:extLst>
+          </p:cNvPr>
+          <p:cNvPicPr>
+            <a:picLocks noChangeAspect="1"/>
+          </p:cNvPicPr>
+          <p:nvPr/>
+        </p:nvPicPr>
+        <p:blipFill>
+          <a:blip r:embed="rId7"/>
+          <a:stretch>
+            <a:fillRect/>
+          </a:stretch>
+        </p:blipFill>
+        <p:spPr>
+          <a:xfrm>
+            <a:off x="6697691" y="4197474"/>
+            <a:ext cx="1333675" cy="1247233"/>
+          </a:xfrm>
+          <a:prstGeom prst="rect">
+            <a:avLst/>
+          </a:prstGeom>
+          <a:ln>
+            <a:noFill/>
+          </a:ln>
+          <a:effectLst>
+            <a:outerShdw blurRad="292100" dist="139700" dir="2700000" algn="tl" rotWithShape="0">
+              <a:srgbClr val="333333">
+                <a:alpha val="65000"/>
+              </a:srgbClr>
+            </a:outerShdw>
+          </a:effectLst>
+        </p:spPr>
+      </p:pic>
+    </p:spTree>
+    <p:extLst>
+      <p:ext uri="{BB962C8B-B14F-4D97-AF65-F5344CB8AC3E}">
+        <p14:creationId xmlns:p14="http://schemas.microsoft.com/office/powerpoint/2010/main" val="3041413717"/>
+      </p:ext>
+    </p:extLst>
+  </p:cSld>
+  <p:clrMapOvr>
+    <a:masterClrMapping/>
+  </p:clrMapOvr>
+</p:sld>
+</file>
+
+<file path=ppt/slides/slide13.xml><?xml version="1.0" encoding="utf-8"?>
+<p:sld xmlns:a="http://schemas.openxmlformats.org/drawingml/2006/main" xmlns:r="http://schemas.openxmlformats.org/officeDocument/2006/relationships" xmlns:p="http://schemas.openxmlformats.org/presentationml/2006/main">
+  <p:cSld>
+    <p:spTree>
+      <p:nvGrpSpPr>
+        <p:cNvPr id="1" name=""/>
+        <p:cNvGrpSpPr/>
+        <p:nvPr/>
+      </p:nvGrpSpPr>
+      <p:grpSpPr>
+        <a:xfrm>
+          <a:off x="0" y="0"/>
+          <a:ext cx="0" cy="0"/>
+          <a:chOff x="0" y="0"/>
+          <a:chExt cx="0" cy="0"/>
+        </a:xfrm>
+      </p:grpSpPr>
+      <p:sp>
+        <p:nvSpPr>
+          <p:cNvPr id="4" name="Title 3">
+            <a:extLst>
+              <a:ext uri="{FF2B5EF4-FFF2-40B4-BE49-F238E27FC236}">
+                <a16:creationId xmlns:a16="http://schemas.microsoft.com/office/drawing/2014/main" id="{1E1A75EA-3DE1-6BD1-8A84-A8D3D57E2F03}"/>
+              </a:ext>
+            </a:extLst>
+          </p:cNvPr>
+          <p:cNvSpPr>
+            <a:spLocks noGrp="1"/>
+          </p:cNvSpPr>
+          <p:nvPr>
+            <p:ph type="ctrTitle"/>
+          </p:nvPr>
+        </p:nvSpPr>
+        <p:spPr>
+          <a:xfrm>
+            <a:off x="581191" y="756139"/>
+            <a:ext cx="10993549" cy="1072662"/>
+          </a:xfrm>
+        </p:spPr>
+        <p:txBody>
+          <a:bodyPr>
+            <a:normAutofit/>
+          </a:bodyPr>
+          <a:lstStyle/>
+          <a:p>
+            <a:r>
+              <a:rPr lang="en-US" sz="4800" cap="none" dirty="0"/>
+              <a:t>OpenSCAD Modeling Practice</a:t>
+            </a:r>
+          </a:p>
+        </p:txBody>
+      </p:sp>
+      <p:sp>
+        <p:nvSpPr>
+          <p:cNvPr id="5" name="Subtitle 4">
+            <a:extLst>
+              <a:ext uri="{FF2B5EF4-FFF2-40B4-BE49-F238E27FC236}">
+                <a16:creationId xmlns:a16="http://schemas.microsoft.com/office/drawing/2014/main" id="{4B2FCE2E-86B8-4A2C-B7B7-0B929427A000}"/>
+              </a:ext>
+            </a:extLst>
+          </p:cNvPr>
+          <p:cNvSpPr>
+            <a:spLocks noGrp="1"/>
+          </p:cNvSpPr>
+          <p:nvPr>
+            <p:ph type="subTitle" idx="1"/>
+          </p:nvPr>
+        </p:nvSpPr>
+        <p:spPr>
+          <a:xfrm>
+            <a:off x="581194" y="2127739"/>
+            <a:ext cx="10993546" cy="958028"/>
+          </a:xfrm>
+        </p:spPr>
+        <p:txBody>
+          <a:bodyPr>
+            <a:normAutofit fontScale="92500" lnSpcReduction="20000"/>
+          </a:bodyPr>
+          <a:lstStyle/>
+          <a:p>
+            <a:r>
+              <a:rPr lang="en-US" sz="3600" cap="none" dirty="0"/>
+              <a:t>OpenSCAD Tutorial/Chapter 4 (part 4 – Separating Model into Modules)</a:t>
+            </a:r>
+          </a:p>
+        </p:txBody>
+      </p:sp>
+      <p:pic>
+        <p:nvPicPr>
+          <p:cNvPr id="6" name="Picture 5" descr="A yellow and green object with holes&#10;&#10;Description automatically generated">
+            <a:extLst>
+              <a:ext uri="{FF2B5EF4-FFF2-40B4-BE49-F238E27FC236}">
+                <a16:creationId xmlns:a16="http://schemas.microsoft.com/office/drawing/2014/main" id="{0731BA8F-6478-2556-A80D-8B9077A55A1F}"/>
+              </a:ext>
+            </a:extLst>
+          </p:cNvPr>
+          <p:cNvPicPr>
+            <a:picLocks noChangeAspect="1"/>
+          </p:cNvPicPr>
+          <p:nvPr/>
+        </p:nvPicPr>
+        <p:blipFill>
+          <a:blip r:embed="rId2"/>
+          <a:stretch>
+            <a:fillRect/>
+          </a:stretch>
+        </p:blipFill>
+        <p:spPr>
+          <a:xfrm>
+            <a:off x="9101136" y="3458306"/>
+            <a:ext cx="1950794" cy="1623642"/>
+          </a:xfrm>
+          <a:prstGeom prst="roundRect">
+            <a:avLst>
+              <a:gd name="adj" fmla="val 8594"/>
+            </a:avLst>
+          </a:prstGeom>
+          <a:solidFill>
+            <a:srgbClr val="FFFFFF">
+              <a:shade val="85000"/>
+            </a:srgbClr>
+          </a:solidFill>
+          <a:ln>
+            <a:noFill/>
+          </a:ln>
+          <a:effectLst>
+            <a:reflection blurRad="12700" stA="38000" endPos="28000" dist="5000" dir="5400000" sy="-100000" algn="bl" rotWithShape="0"/>
+          </a:effectLst>
+        </p:spPr>
+      </p:pic>
+      <p:pic>
+        <p:nvPicPr>
+          <p:cNvPr id="3" name="Picture 2">
+            <a:extLst>
+              <a:ext uri="{FF2B5EF4-FFF2-40B4-BE49-F238E27FC236}">
+                <a16:creationId xmlns:a16="http://schemas.microsoft.com/office/drawing/2014/main" id="{658CB04C-1684-01BF-EA97-AE3FED7B7293}"/>
+              </a:ext>
+            </a:extLst>
+          </p:cNvPr>
+          <p:cNvPicPr>
+            <a:picLocks noChangeAspect="1"/>
+          </p:cNvPicPr>
+          <p:nvPr/>
+        </p:nvPicPr>
+        <p:blipFill>
+          <a:blip r:embed="rId3"/>
+          <a:stretch>
+            <a:fillRect/>
+          </a:stretch>
+        </p:blipFill>
+        <p:spPr>
+          <a:xfrm>
+            <a:off x="2494817" y="3528644"/>
+            <a:ext cx="3737437" cy="2388208"/>
+          </a:xfrm>
+          <a:prstGeom prst="rect">
+            <a:avLst/>
+          </a:prstGeom>
+          <a:ln>
+            <a:noFill/>
+          </a:ln>
+          <a:effectLst>
+            <a:outerShdw blurRad="292100" dist="139700" dir="2700000" algn="tl" rotWithShape="0">
+              <a:srgbClr val="333333">
+                <a:alpha val="65000"/>
+              </a:srgbClr>
+            </a:outerShdw>
+          </a:effectLst>
+        </p:spPr>
+      </p:pic>
+    </p:spTree>
+    <p:extLst>
+      <p:ext uri="{BB962C8B-B14F-4D97-AF65-F5344CB8AC3E}">
+        <p14:creationId xmlns:p14="http://schemas.microsoft.com/office/powerpoint/2010/main" val="1375082128"/>
       </p:ext>
     </p:extLst>
   </p:cSld>
@@ -7473,6 +8409,35 @@
 </file>
 
 <file path=customXml/item1.xml><?xml version="1.0" encoding="utf-8"?>
+<p:properties xmlns:p="http://schemas.microsoft.com/office/2006/metadata/properties" xmlns:xsi="http://www.w3.org/2001/XMLSchema-instance" xmlns:pc="http://schemas.microsoft.com/office/infopath/2007/PartnerControls">
+  <documentManagement>
+    <_ip_UnifiedCompliancePolicyUIAction xmlns="http://schemas.microsoft.com/sharepoint/v3" xsi:nil="true"/>
+    <Image xmlns="71af3243-3dd4-4a8d-8c0d-dd76da1f02a5">
+      <Url xsi:nil="true"/>
+      <Description xsi:nil="true"/>
+    </Image>
+    <Status xmlns="71af3243-3dd4-4a8d-8c0d-dd76da1f02a5">Not started</Status>
+    <Background xmlns="71af3243-3dd4-4a8d-8c0d-dd76da1f02a5">false</Background>
+    <_ip_UnifiedCompliancePolicyProperties xmlns="http://schemas.microsoft.com/sharepoint/v3" xsi:nil="true"/>
+    <ImageTagsTaxHTField xmlns="71af3243-3dd4-4a8d-8c0d-dd76da1f02a5">
+      <Terms xmlns="http://schemas.microsoft.com/office/infopath/2007/PartnerControls"/>
+    </ImageTagsTaxHTField>
+    <TaxCatchAll xmlns="230e9df3-be65-4c73-a93b-d1236ebd677e" xsi:nil="true"/>
+    <MediaServiceKeyPoints xmlns="71af3243-3dd4-4a8d-8c0d-dd76da1f02a5" xsi:nil="true"/>
+  </documentManagement>
+</p:properties>
+</file>
+
+<file path=customXml/item2.xml><?xml version="1.0" encoding="utf-8"?>
+<?mso-contentType ?>
+<FormTemplates xmlns="http://schemas.microsoft.com/sharepoint/v3/contenttype/forms">
+  <Display>DocumentLibraryForm</Display>
+  <Edit>DocumentLibraryForm</Edit>
+  <New>DocumentLibraryForm</New>
+</FormTemplates>
+</file>
+
+<file path=customXml/item3.xml><?xml version="1.0" encoding="utf-8"?>
 <ct:contentTypeSchema xmlns:ct="http://schemas.microsoft.com/office/2006/metadata/contentType" xmlns:ma="http://schemas.microsoft.com/office/2006/metadata/properties/metaAttributes" ct:_="" ma:_="" ma:contentTypeName="Document" ma:contentTypeID="0x01010079F111ED35F8CC479449609E8A0923A6" ma:contentTypeVersion="27" ma:contentTypeDescription="Create a new document." ma:contentTypeScope="" ma:versionID="c6f9a84f66a9c8b9a21755b9ffafb945">
   <xsd:schema xmlns:xsd="http://www.w3.org/2001/XMLSchema" xmlns:xs="http://www.w3.org/2001/XMLSchema" xmlns:p="http://schemas.microsoft.com/office/2006/metadata/properties" xmlns:ns1="http://schemas.microsoft.com/sharepoint/v3" xmlns:ns2="71af3243-3dd4-4a8d-8c0d-dd76da1f02a5" xmlns:ns3="16c05727-aa75-4e4a-9b5f-8a80a1165891" xmlns:ns4="230e9df3-be65-4c73-a93b-d1236ebd677e" targetNamespace="http://schemas.microsoft.com/office/2006/metadata/properties" ma:root="true" ma:fieldsID="27df39e3e7036dff54f89ddd5805ce72" ns1:_="" ns2:_="" ns3:_="" ns4:_="">
     <xsd:import namespace="http://schemas.microsoft.com/sharepoint/v3"/>
@@ -7778,36 +8743,27 @@
 </ct:contentTypeSchema>
 </file>
 
-<file path=customXml/item2.xml><?xml version="1.0" encoding="utf-8"?>
-<?mso-contentType ?>
-<FormTemplates xmlns="http://schemas.microsoft.com/sharepoint/v3/contenttype/forms">
-  <Display>DocumentLibraryForm</Display>
-  <Edit>DocumentLibraryForm</Edit>
-  <New>DocumentLibraryForm</New>
-</FormTemplates>
+<file path=customXml/itemProps1.xml><?xml version="1.0" encoding="utf-8"?>
+<ds:datastoreItem xmlns:ds="http://schemas.openxmlformats.org/officeDocument/2006/customXml" ds:itemID="{3791575F-4C21-47C4-8D13-EB9BE66B536F}">
+  <ds:schemaRefs>
+    <ds:schemaRef ds:uri="http://schemas.microsoft.com/office/2006/metadata/properties"/>
+    <ds:schemaRef ds:uri="http://schemas.microsoft.com/office/infopath/2007/PartnerControls"/>
+    <ds:schemaRef ds:uri="http://schemas.microsoft.com/sharepoint/v3"/>
+    <ds:schemaRef ds:uri="71af3243-3dd4-4a8d-8c0d-dd76da1f02a5"/>
+    <ds:schemaRef ds:uri="230e9df3-be65-4c73-a93b-d1236ebd677e"/>
+  </ds:schemaRefs>
+</ds:datastoreItem>
 </file>
 
-<file path=customXml/item3.xml><?xml version="1.0" encoding="utf-8"?>
-<p:properties xmlns:p="http://schemas.microsoft.com/office/2006/metadata/properties" xmlns:xsi="http://www.w3.org/2001/XMLSchema-instance" xmlns:pc="http://schemas.microsoft.com/office/infopath/2007/PartnerControls">
-  <documentManagement>
-    <_ip_UnifiedCompliancePolicyUIAction xmlns="http://schemas.microsoft.com/sharepoint/v3" xsi:nil="true"/>
-    <Image xmlns="71af3243-3dd4-4a8d-8c0d-dd76da1f02a5">
-      <Url xsi:nil="true"/>
-      <Description xsi:nil="true"/>
-    </Image>
-    <Status xmlns="71af3243-3dd4-4a8d-8c0d-dd76da1f02a5">Not started</Status>
-    <Background xmlns="71af3243-3dd4-4a8d-8c0d-dd76da1f02a5">false</Background>
-    <_ip_UnifiedCompliancePolicyProperties xmlns="http://schemas.microsoft.com/sharepoint/v3" xsi:nil="true"/>
-    <ImageTagsTaxHTField xmlns="71af3243-3dd4-4a8d-8c0d-dd76da1f02a5">
-      <Terms xmlns="http://schemas.microsoft.com/office/infopath/2007/PartnerControls"/>
-    </ImageTagsTaxHTField>
-    <TaxCatchAll xmlns="230e9df3-be65-4c73-a93b-d1236ebd677e" xsi:nil="true"/>
-    <MediaServiceKeyPoints xmlns="71af3243-3dd4-4a8d-8c0d-dd76da1f02a5" xsi:nil="true"/>
-  </documentManagement>
-</p:properties>
+<file path=customXml/itemProps2.xml><?xml version="1.0" encoding="utf-8"?>
+<ds:datastoreItem xmlns:ds="http://schemas.openxmlformats.org/officeDocument/2006/customXml" ds:itemID="{342D3C2F-55A5-48C0-9D5A-95C7FF0389D0}">
+  <ds:schemaRefs>
+    <ds:schemaRef ds:uri="http://schemas.microsoft.com/sharepoint/v3/contenttype/forms"/>
+  </ds:schemaRefs>
+</ds:datastoreItem>
 </file>
 
-<file path=customXml/itemProps1.xml><?xml version="1.0" encoding="utf-8"?>
+<file path=customXml/itemProps3.xml><?xml version="1.0" encoding="utf-8"?>
 <ds:datastoreItem xmlns:ds="http://schemas.openxmlformats.org/officeDocument/2006/customXml" ds:itemID="{792209EB-3212-4116-B574-D1F56C7C4922}">
   <ds:schemaRefs>
     <ds:schemaRef ds:uri="http://schemas.microsoft.com/office/2006/metadata/contentType"/>
@@ -7826,24 +8782,4 @@
     <ds:schemaRef ds:uri="http://schemas.microsoft.com/internal/obd"/>
   </ds:schemaRefs>
 </ds:datastoreItem>
-</file>
-
-<file path=customXml/itemProps2.xml><?xml version="1.0" encoding="utf-8"?>
-<ds:datastoreItem xmlns:ds="http://schemas.openxmlformats.org/officeDocument/2006/customXml" ds:itemID="{342D3C2F-55A5-48C0-9D5A-95C7FF0389D0}">
-  <ds:schemaRefs>
-    <ds:schemaRef ds:uri="http://schemas.microsoft.com/sharepoint/v3/contenttype/forms"/>
-  </ds:schemaRefs>
-</ds:datastoreItem>
-</file>
-
-<file path=customXml/itemProps3.xml><?xml version="1.0" encoding="utf-8"?>
-<ds:datastoreItem xmlns:ds="http://schemas.openxmlformats.org/officeDocument/2006/customXml" ds:itemID="{3791575F-4C21-47C4-8D13-EB9BE66B536F}">
-  <ds:schemaRefs>
-    <ds:schemaRef ds:uri="http://schemas.microsoft.com/office/2006/metadata/properties"/>
-    <ds:schemaRef ds:uri="http://schemas.microsoft.com/office/infopath/2007/PartnerControls"/>
-    <ds:schemaRef ds:uri="http://schemas.microsoft.com/sharepoint/v3"/>
-    <ds:schemaRef ds:uri="71af3243-3dd4-4a8d-8c0d-dd76da1f02a5"/>
-    <ds:schemaRef ds:uri="230e9df3-be65-4c73-a93b-d1236ebd677e"/>
-  </ds:schemaRefs>
-</ds:datastoreItem>
 </file>
</xml_diff>

<commit_message>
chapter 7 part 1
</commit_message>
<xml_diff>
--- a/OpenSCAD.pptx
+++ b/OpenSCAD.pptx
@@ -5,10 +5,10 @@
     <p:sldMasterId id="2147483672" r:id="rId4"/>
   </p:sldMasterIdLst>
   <p:notesMasterIdLst>
-    <p:notesMasterId r:id="rId27"/>
+    <p:notesMasterId r:id="rId33"/>
   </p:notesMasterIdLst>
   <p:handoutMasterIdLst>
-    <p:handoutMasterId r:id="rId28"/>
+    <p:handoutMasterId r:id="rId34"/>
   </p:handoutMasterIdLst>
   <p:sldIdLst>
     <p:sldId id="256" r:id="rId5"/>
@@ -33,6 +33,12 @@
     <p:sldId id="276" r:id="rId24"/>
     <p:sldId id="275" r:id="rId25"/>
     <p:sldId id="277" r:id="rId26"/>
+    <p:sldId id="278" r:id="rId27"/>
+    <p:sldId id="279" r:id="rId28"/>
+    <p:sldId id="280" r:id="rId29"/>
+    <p:sldId id="281" r:id="rId30"/>
+    <p:sldId id="282" r:id="rId31"/>
+    <p:sldId id="283" r:id="rId32"/>
   </p:sldIdLst>
   <p:sldSz cx="12192000" cy="6858000"/>
   <p:notesSz cx="6858000" cy="9144000"/>
@@ -7885,6 +7891,1104 @@
     <p:extLst>
       <p:ext uri="{BB962C8B-B14F-4D97-AF65-F5344CB8AC3E}">
         <p14:creationId xmlns:p14="http://schemas.microsoft.com/office/powerpoint/2010/main" val="329241309"/>
+      </p:ext>
+    </p:extLst>
+  </p:cSld>
+  <p:clrMapOvr>
+    <a:masterClrMapping/>
+  </p:clrMapOvr>
+</p:sld>
+</file>
+
+<file path=ppt/slides/slide23.xml><?xml version="1.0" encoding="utf-8"?>
+<p:sld xmlns:a="http://schemas.openxmlformats.org/drawingml/2006/main" xmlns:r="http://schemas.openxmlformats.org/officeDocument/2006/relationships" xmlns:p="http://schemas.openxmlformats.org/presentationml/2006/main">
+  <p:cSld>
+    <p:spTree>
+      <p:nvGrpSpPr>
+        <p:cNvPr id="1" name=""/>
+        <p:cNvGrpSpPr/>
+        <p:nvPr/>
+      </p:nvGrpSpPr>
+      <p:grpSpPr>
+        <a:xfrm>
+          <a:off x="0" y="0"/>
+          <a:ext cx="0" cy="0"/>
+          <a:chOff x="0" y="0"/>
+          <a:chExt cx="0" cy="0"/>
+        </a:xfrm>
+      </p:grpSpPr>
+      <p:sp>
+        <p:nvSpPr>
+          <p:cNvPr id="4" name="Title 3">
+            <a:extLst>
+              <a:ext uri="{FF2B5EF4-FFF2-40B4-BE49-F238E27FC236}">
+                <a16:creationId xmlns:a16="http://schemas.microsoft.com/office/drawing/2014/main" id="{1E1A75EA-3DE1-6BD1-8A84-A8D3D57E2F03}"/>
+              </a:ext>
+            </a:extLst>
+          </p:cNvPr>
+          <p:cNvSpPr>
+            <a:spLocks noGrp="1"/>
+          </p:cNvSpPr>
+          <p:nvPr>
+            <p:ph type="ctrTitle"/>
+          </p:nvPr>
+        </p:nvSpPr>
+        <p:spPr>
+          <a:xfrm>
+            <a:off x="581191" y="756139"/>
+            <a:ext cx="10993549" cy="1072662"/>
+          </a:xfrm>
+        </p:spPr>
+        <p:txBody>
+          <a:bodyPr>
+            <a:normAutofit/>
+          </a:bodyPr>
+          <a:lstStyle/>
+          <a:p>
+            <a:r>
+              <a:rPr lang="en-US" sz="4800" cap="none" dirty="0"/>
+              <a:t>OpenSCAD Modeling Practice</a:t>
+            </a:r>
+          </a:p>
+        </p:txBody>
+      </p:sp>
+      <p:sp>
+        <p:nvSpPr>
+          <p:cNvPr id="5" name="Subtitle 4">
+            <a:extLst>
+              <a:ext uri="{FF2B5EF4-FFF2-40B4-BE49-F238E27FC236}">
+                <a16:creationId xmlns:a16="http://schemas.microsoft.com/office/drawing/2014/main" id="{4B2FCE2E-86B8-4A2C-B7B7-0B929427A000}"/>
+              </a:ext>
+            </a:extLst>
+          </p:cNvPr>
+          <p:cNvSpPr>
+            <a:spLocks noGrp="1"/>
+          </p:cNvSpPr>
+          <p:nvPr>
+            <p:ph type="subTitle" idx="1"/>
+          </p:nvPr>
+        </p:nvSpPr>
+        <p:spPr>
+          <a:xfrm>
+            <a:off x="581194" y="2127739"/>
+            <a:ext cx="10993546" cy="958028"/>
+          </a:xfrm>
+        </p:spPr>
+        <p:txBody>
+          <a:bodyPr>
+            <a:normAutofit/>
+          </a:bodyPr>
+          <a:lstStyle/>
+          <a:p>
+            <a:r>
+              <a:rPr lang="en-US" sz="3600" cap="none" dirty="0"/>
+              <a:t>OpenSCAD Tutorial/Chapter 7 (part 1 – For loops)</a:t>
+            </a:r>
+          </a:p>
+        </p:txBody>
+      </p:sp>
+      <p:pic>
+        <p:nvPicPr>
+          <p:cNvPr id="6" name="Picture 5" descr="A yellow and green object with holes&#10;&#10;Description automatically generated">
+            <a:extLst>
+              <a:ext uri="{FF2B5EF4-FFF2-40B4-BE49-F238E27FC236}">
+                <a16:creationId xmlns:a16="http://schemas.microsoft.com/office/drawing/2014/main" id="{0731BA8F-6478-2556-A80D-8B9077A55A1F}"/>
+              </a:ext>
+            </a:extLst>
+          </p:cNvPr>
+          <p:cNvPicPr>
+            <a:picLocks noChangeAspect="1"/>
+          </p:cNvPicPr>
+          <p:nvPr/>
+        </p:nvPicPr>
+        <p:blipFill>
+          <a:blip r:embed="rId2"/>
+          <a:stretch>
+            <a:fillRect/>
+          </a:stretch>
+        </p:blipFill>
+        <p:spPr>
+          <a:xfrm>
+            <a:off x="9101136" y="3458306"/>
+            <a:ext cx="1950794" cy="1623642"/>
+          </a:xfrm>
+          <a:prstGeom prst="roundRect">
+            <a:avLst>
+              <a:gd name="adj" fmla="val 8594"/>
+            </a:avLst>
+          </a:prstGeom>
+          <a:solidFill>
+            <a:srgbClr val="FFFFFF">
+              <a:shade val="85000"/>
+            </a:srgbClr>
+          </a:solidFill>
+          <a:ln>
+            <a:noFill/>
+          </a:ln>
+          <a:effectLst>
+            <a:reflection blurRad="12700" stA="38000" endPos="28000" dist="5000" dir="5400000" sy="-100000" algn="bl" rotWithShape="0"/>
+          </a:effectLst>
+        </p:spPr>
+      </p:pic>
+      <p:pic>
+        <p:nvPicPr>
+          <p:cNvPr id="7" name="Picture 6">
+            <a:extLst>
+              <a:ext uri="{FF2B5EF4-FFF2-40B4-BE49-F238E27FC236}">
+                <a16:creationId xmlns:a16="http://schemas.microsoft.com/office/drawing/2014/main" id="{372B7135-B9AE-4417-C486-CCFBAF7C4654}"/>
+              </a:ext>
+            </a:extLst>
+          </p:cNvPr>
+          <p:cNvPicPr>
+            <a:picLocks noChangeAspect="1"/>
+          </p:cNvPicPr>
+          <p:nvPr/>
+        </p:nvPicPr>
+        <p:blipFill>
+          <a:blip r:embed="rId3"/>
+          <a:stretch>
+            <a:fillRect/>
+          </a:stretch>
+        </p:blipFill>
+        <p:spPr>
+          <a:xfrm>
+            <a:off x="1813048" y="3384705"/>
+            <a:ext cx="5104992" cy="2612414"/>
+          </a:xfrm>
+          <a:prstGeom prst="rect">
+            <a:avLst/>
+          </a:prstGeom>
+          <a:ln>
+            <a:noFill/>
+          </a:ln>
+          <a:effectLst>
+            <a:outerShdw blurRad="292100" dist="139700" dir="2700000" algn="tl" rotWithShape="0">
+              <a:srgbClr val="333333">
+                <a:alpha val="65000"/>
+              </a:srgbClr>
+            </a:outerShdw>
+          </a:effectLst>
+        </p:spPr>
+      </p:pic>
+    </p:spTree>
+    <p:extLst>
+      <p:ext uri="{BB962C8B-B14F-4D97-AF65-F5344CB8AC3E}">
+        <p14:creationId xmlns:p14="http://schemas.microsoft.com/office/powerpoint/2010/main" val="1755860600"/>
+      </p:ext>
+    </p:extLst>
+  </p:cSld>
+  <p:clrMapOvr>
+    <a:masterClrMapping/>
+  </p:clrMapOvr>
+</p:sld>
+</file>
+
+<file path=ppt/slides/slide24.xml><?xml version="1.0" encoding="utf-8"?>
+<p:sld xmlns:a="http://schemas.openxmlformats.org/drawingml/2006/main" xmlns:r="http://schemas.openxmlformats.org/officeDocument/2006/relationships" xmlns:p="http://schemas.openxmlformats.org/presentationml/2006/main">
+  <p:cSld>
+    <p:spTree>
+      <p:nvGrpSpPr>
+        <p:cNvPr id="1" name=""/>
+        <p:cNvGrpSpPr/>
+        <p:nvPr/>
+      </p:nvGrpSpPr>
+      <p:grpSpPr>
+        <a:xfrm>
+          <a:off x="0" y="0"/>
+          <a:ext cx="0" cy="0"/>
+          <a:chOff x="0" y="0"/>
+          <a:chExt cx="0" cy="0"/>
+        </a:xfrm>
+      </p:grpSpPr>
+      <p:sp>
+        <p:nvSpPr>
+          <p:cNvPr id="4" name="Title 3">
+            <a:extLst>
+              <a:ext uri="{FF2B5EF4-FFF2-40B4-BE49-F238E27FC236}">
+                <a16:creationId xmlns:a16="http://schemas.microsoft.com/office/drawing/2014/main" id="{1E1A75EA-3DE1-6BD1-8A84-A8D3D57E2F03}"/>
+              </a:ext>
+            </a:extLst>
+          </p:cNvPr>
+          <p:cNvSpPr>
+            <a:spLocks noGrp="1"/>
+          </p:cNvSpPr>
+          <p:nvPr>
+            <p:ph type="ctrTitle"/>
+          </p:nvPr>
+        </p:nvSpPr>
+        <p:spPr>
+          <a:xfrm>
+            <a:off x="581191" y="756139"/>
+            <a:ext cx="10993549" cy="1072662"/>
+          </a:xfrm>
+        </p:spPr>
+        <p:txBody>
+          <a:bodyPr>
+            <a:normAutofit/>
+          </a:bodyPr>
+          <a:lstStyle/>
+          <a:p>
+            <a:r>
+              <a:rPr lang="en-US" sz="4800" cap="none" dirty="0"/>
+              <a:t>OpenSCAD Modeling Practice</a:t>
+            </a:r>
+          </a:p>
+        </p:txBody>
+      </p:sp>
+      <p:sp>
+        <p:nvSpPr>
+          <p:cNvPr id="5" name="Subtitle 4">
+            <a:extLst>
+              <a:ext uri="{FF2B5EF4-FFF2-40B4-BE49-F238E27FC236}">
+                <a16:creationId xmlns:a16="http://schemas.microsoft.com/office/drawing/2014/main" id="{4B2FCE2E-86B8-4A2C-B7B7-0B929427A000}"/>
+              </a:ext>
+            </a:extLst>
+          </p:cNvPr>
+          <p:cNvSpPr>
+            <a:spLocks noGrp="1"/>
+          </p:cNvSpPr>
+          <p:nvPr>
+            <p:ph type="subTitle" idx="1"/>
+          </p:nvPr>
+        </p:nvSpPr>
+        <p:spPr>
+          <a:xfrm>
+            <a:off x="581194" y="2127739"/>
+            <a:ext cx="10993546" cy="958028"/>
+          </a:xfrm>
+        </p:spPr>
+        <p:txBody>
+          <a:bodyPr>
+            <a:normAutofit fontScale="92500" lnSpcReduction="20000"/>
+          </a:bodyPr>
+          <a:lstStyle/>
+          <a:p>
+            <a:r>
+              <a:rPr lang="en-US" sz="3600" cap="none" dirty="0"/>
+              <a:t>OpenSCAD Tutorial/Chapter 7 (part 2 – More Complex Patterns)</a:t>
+            </a:r>
+          </a:p>
+        </p:txBody>
+      </p:sp>
+      <p:pic>
+        <p:nvPicPr>
+          <p:cNvPr id="6" name="Picture 5" descr="A yellow and green object with holes&#10;&#10;Description automatically generated">
+            <a:extLst>
+              <a:ext uri="{FF2B5EF4-FFF2-40B4-BE49-F238E27FC236}">
+                <a16:creationId xmlns:a16="http://schemas.microsoft.com/office/drawing/2014/main" id="{0731BA8F-6478-2556-A80D-8B9077A55A1F}"/>
+              </a:ext>
+            </a:extLst>
+          </p:cNvPr>
+          <p:cNvPicPr>
+            <a:picLocks noChangeAspect="1"/>
+          </p:cNvPicPr>
+          <p:nvPr/>
+        </p:nvPicPr>
+        <p:blipFill>
+          <a:blip r:embed="rId2"/>
+          <a:stretch>
+            <a:fillRect/>
+          </a:stretch>
+        </p:blipFill>
+        <p:spPr>
+          <a:xfrm>
+            <a:off x="9101136" y="3458306"/>
+            <a:ext cx="1950794" cy="1623642"/>
+          </a:xfrm>
+          <a:prstGeom prst="roundRect">
+            <a:avLst>
+              <a:gd name="adj" fmla="val 8594"/>
+            </a:avLst>
+          </a:prstGeom>
+          <a:solidFill>
+            <a:srgbClr val="FFFFFF">
+              <a:shade val="85000"/>
+            </a:srgbClr>
+          </a:solidFill>
+          <a:ln>
+            <a:noFill/>
+          </a:ln>
+          <a:effectLst>
+            <a:reflection blurRad="12700" stA="38000" endPos="28000" dist="5000" dir="5400000" sy="-100000" algn="bl" rotWithShape="0"/>
+          </a:effectLst>
+        </p:spPr>
+      </p:pic>
+      <p:pic>
+        <p:nvPicPr>
+          <p:cNvPr id="3" name="Picture 2">
+            <a:extLst>
+              <a:ext uri="{FF2B5EF4-FFF2-40B4-BE49-F238E27FC236}">
+                <a16:creationId xmlns:a16="http://schemas.microsoft.com/office/drawing/2014/main" id="{58A15267-81E5-47A2-C97C-BCFAE83F18E4}"/>
+              </a:ext>
+            </a:extLst>
+          </p:cNvPr>
+          <p:cNvPicPr>
+            <a:picLocks noChangeAspect="1"/>
+          </p:cNvPicPr>
+          <p:nvPr/>
+        </p:nvPicPr>
+        <p:blipFill>
+          <a:blip r:embed="rId3"/>
+          <a:stretch>
+            <a:fillRect/>
+          </a:stretch>
+        </p:blipFill>
+        <p:spPr>
+          <a:xfrm>
+            <a:off x="2290396" y="3429000"/>
+            <a:ext cx="3532224" cy="2552700"/>
+          </a:xfrm>
+          <a:prstGeom prst="rect">
+            <a:avLst/>
+          </a:prstGeom>
+          <a:ln>
+            <a:noFill/>
+          </a:ln>
+          <a:effectLst>
+            <a:outerShdw blurRad="292100" dist="139700" dir="2700000" algn="tl" rotWithShape="0">
+              <a:srgbClr val="333333">
+                <a:alpha val="65000"/>
+              </a:srgbClr>
+            </a:outerShdw>
+          </a:effectLst>
+        </p:spPr>
+      </p:pic>
+    </p:spTree>
+    <p:extLst>
+      <p:ext uri="{BB962C8B-B14F-4D97-AF65-F5344CB8AC3E}">
+        <p14:creationId xmlns:p14="http://schemas.microsoft.com/office/powerpoint/2010/main" val="2564374602"/>
+      </p:ext>
+    </p:extLst>
+  </p:cSld>
+  <p:clrMapOvr>
+    <a:masterClrMapping/>
+  </p:clrMapOvr>
+</p:sld>
+</file>
+
+<file path=ppt/slides/slide25.xml><?xml version="1.0" encoding="utf-8"?>
+<p:sld xmlns:a="http://schemas.openxmlformats.org/drawingml/2006/main" xmlns:r="http://schemas.openxmlformats.org/officeDocument/2006/relationships" xmlns:p="http://schemas.openxmlformats.org/presentationml/2006/main">
+  <p:cSld>
+    <p:spTree>
+      <p:nvGrpSpPr>
+        <p:cNvPr id="1" name=""/>
+        <p:cNvGrpSpPr/>
+        <p:nvPr/>
+      </p:nvGrpSpPr>
+      <p:grpSpPr>
+        <a:xfrm>
+          <a:off x="0" y="0"/>
+          <a:ext cx="0" cy="0"/>
+          <a:chOff x="0" y="0"/>
+          <a:chExt cx="0" cy="0"/>
+        </a:xfrm>
+      </p:grpSpPr>
+      <p:sp>
+        <p:nvSpPr>
+          <p:cNvPr id="4" name="Title 3">
+            <a:extLst>
+              <a:ext uri="{FF2B5EF4-FFF2-40B4-BE49-F238E27FC236}">
+                <a16:creationId xmlns:a16="http://schemas.microsoft.com/office/drawing/2014/main" id="{1E1A75EA-3DE1-6BD1-8A84-A8D3D57E2F03}"/>
+              </a:ext>
+            </a:extLst>
+          </p:cNvPr>
+          <p:cNvSpPr>
+            <a:spLocks noGrp="1"/>
+          </p:cNvSpPr>
+          <p:nvPr>
+            <p:ph type="ctrTitle"/>
+          </p:nvPr>
+        </p:nvSpPr>
+        <p:spPr>
+          <a:xfrm>
+            <a:off x="581191" y="756139"/>
+            <a:ext cx="10993549" cy="1072662"/>
+          </a:xfrm>
+        </p:spPr>
+        <p:txBody>
+          <a:bodyPr>
+            <a:normAutofit/>
+          </a:bodyPr>
+          <a:lstStyle/>
+          <a:p>
+            <a:r>
+              <a:rPr lang="en-US" sz="4800" cap="none" dirty="0"/>
+              <a:t>OpenSCAD Modeling Practice</a:t>
+            </a:r>
+          </a:p>
+        </p:txBody>
+      </p:sp>
+      <p:sp>
+        <p:nvSpPr>
+          <p:cNvPr id="5" name="Subtitle 4">
+            <a:extLst>
+              <a:ext uri="{FF2B5EF4-FFF2-40B4-BE49-F238E27FC236}">
+                <a16:creationId xmlns:a16="http://schemas.microsoft.com/office/drawing/2014/main" id="{4B2FCE2E-86B8-4A2C-B7B7-0B929427A000}"/>
+              </a:ext>
+            </a:extLst>
+          </p:cNvPr>
+          <p:cNvSpPr>
+            <a:spLocks noGrp="1"/>
+          </p:cNvSpPr>
+          <p:nvPr>
+            <p:ph type="subTitle" idx="1"/>
+          </p:nvPr>
+        </p:nvSpPr>
+        <p:spPr>
+          <a:xfrm>
+            <a:off x="581194" y="2127739"/>
+            <a:ext cx="10993546" cy="958028"/>
+          </a:xfrm>
+        </p:spPr>
+        <p:txBody>
+          <a:bodyPr>
+            <a:normAutofit fontScale="92500" lnSpcReduction="20000"/>
+          </a:bodyPr>
+          <a:lstStyle/>
+          <a:p>
+            <a:r>
+              <a:rPr lang="en-US" sz="3600" cap="none" dirty="0"/>
+              <a:t>OpenSCAD Tutorial/Chapter 7 (part 2 – More Complex Patterns – Car Circle)</a:t>
+            </a:r>
+          </a:p>
+        </p:txBody>
+      </p:sp>
+      <p:pic>
+        <p:nvPicPr>
+          <p:cNvPr id="6" name="Picture 5" descr="A yellow and green object with holes&#10;&#10;Description automatically generated">
+            <a:extLst>
+              <a:ext uri="{FF2B5EF4-FFF2-40B4-BE49-F238E27FC236}">
+                <a16:creationId xmlns:a16="http://schemas.microsoft.com/office/drawing/2014/main" id="{0731BA8F-6478-2556-A80D-8B9077A55A1F}"/>
+              </a:ext>
+            </a:extLst>
+          </p:cNvPr>
+          <p:cNvPicPr>
+            <a:picLocks noChangeAspect="1"/>
+          </p:cNvPicPr>
+          <p:nvPr/>
+        </p:nvPicPr>
+        <p:blipFill>
+          <a:blip r:embed="rId2"/>
+          <a:stretch>
+            <a:fillRect/>
+          </a:stretch>
+        </p:blipFill>
+        <p:spPr>
+          <a:xfrm>
+            <a:off x="9101136" y="3458306"/>
+            <a:ext cx="1950794" cy="1623642"/>
+          </a:xfrm>
+          <a:prstGeom prst="roundRect">
+            <a:avLst>
+              <a:gd name="adj" fmla="val 8594"/>
+            </a:avLst>
+          </a:prstGeom>
+          <a:solidFill>
+            <a:srgbClr val="FFFFFF">
+              <a:shade val="85000"/>
+            </a:srgbClr>
+          </a:solidFill>
+          <a:ln>
+            <a:noFill/>
+          </a:ln>
+          <a:effectLst>
+            <a:reflection blurRad="12700" stA="38000" endPos="28000" dist="5000" dir="5400000" sy="-100000" algn="bl" rotWithShape="0"/>
+          </a:effectLst>
+        </p:spPr>
+      </p:pic>
+      <p:pic>
+        <p:nvPicPr>
+          <p:cNvPr id="3" name="Picture 2">
+            <a:extLst>
+              <a:ext uri="{FF2B5EF4-FFF2-40B4-BE49-F238E27FC236}">
+                <a16:creationId xmlns:a16="http://schemas.microsoft.com/office/drawing/2014/main" id="{58A15267-81E5-47A2-C97C-BCFAE83F18E4}"/>
+              </a:ext>
+            </a:extLst>
+          </p:cNvPr>
+          <p:cNvPicPr>
+            <a:picLocks noChangeAspect="1"/>
+          </p:cNvPicPr>
+          <p:nvPr/>
+        </p:nvPicPr>
+        <p:blipFill>
+          <a:blip r:embed="rId3"/>
+          <a:stretch>
+            <a:fillRect/>
+          </a:stretch>
+        </p:blipFill>
+        <p:spPr>
+          <a:xfrm>
+            <a:off x="2290396" y="3429000"/>
+            <a:ext cx="3532224" cy="2552700"/>
+          </a:xfrm>
+          <a:prstGeom prst="rect">
+            <a:avLst/>
+          </a:prstGeom>
+          <a:ln>
+            <a:noFill/>
+          </a:ln>
+          <a:effectLst>
+            <a:outerShdw blurRad="292100" dist="139700" dir="2700000" algn="tl" rotWithShape="0">
+              <a:srgbClr val="333333">
+                <a:alpha val="65000"/>
+              </a:srgbClr>
+            </a:outerShdw>
+          </a:effectLst>
+        </p:spPr>
+      </p:pic>
+    </p:spTree>
+    <p:extLst>
+      <p:ext uri="{BB962C8B-B14F-4D97-AF65-F5344CB8AC3E}">
+        <p14:creationId xmlns:p14="http://schemas.microsoft.com/office/powerpoint/2010/main" val="1949156716"/>
+      </p:ext>
+    </p:extLst>
+  </p:cSld>
+  <p:clrMapOvr>
+    <a:masterClrMapping/>
+  </p:clrMapOvr>
+</p:sld>
+</file>
+
+<file path=ppt/slides/slide26.xml><?xml version="1.0" encoding="utf-8"?>
+<p:sld xmlns:a="http://schemas.openxmlformats.org/drawingml/2006/main" xmlns:r="http://schemas.openxmlformats.org/officeDocument/2006/relationships" xmlns:p="http://schemas.openxmlformats.org/presentationml/2006/main">
+  <p:cSld>
+    <p:spTree>
+      <p:nvGrpSpPr>
+        <p:cNvPr id="1" name=""/>
+        <p:cNvGrpSpPr/>
+        <p:nvPr/>
+      </p:nvGrpSpPr>
+      <p:grpSpPr>
+        <a:xfrm>
+          <a:off x="0" y="0"/>
+          <a:ext cx="0" cy="0"/>
+          <a:chOff x="0" y="0"/>
+          <a:chExt cx="0" cy="0"/>
+        </a:xfrm>
+      </p:grpSpPr>
+      <p:sp>
+        <p:nvSpPr>
+          <p:cNvPr id="4" name="Title 3">
+            <a:extLst>
+              <a:ext uri="{FF2B5EF4-FFF2-40B4-BE49-F238E27FC236}">
+                <a16:creationId xmlns:a16="http://schemas.microsoft.com/office/drawing/2014/main" id="{1E1A75EA-3DE1-6BD1-8A84-A8D3D57E2F03}"/>
+              </a:ext>
+            </a:extLst>
+          </p:cNvPr>
+          <p:cNvSpPr>
+            <a:spLocks noGrp="1"/>
+          </p:cNvSpPr>
+          <p:nvPr>
+            <p:ph type="ctrTitle"/>
+          </p:nvPr>
+        </p:nvSpPr>
+        <p:spPr>
+          <a:xfrm>
+            <a:off x="581191" y="756139"/>
+            <a:ext cx="10993549" cy="1072662"/>
+          </a:xfrm>
+        </p:spPr>
+        <p:txBody>
+          <a:bodyPr>
+            <a:normAutofit/>
+          </a:bodyPr>
+          <a:lstStyle/>
+          <a:p>
+            <a:r>
+              <a:rPr lang="en-US" sz="4800" cap="none" dirty="0"/>
+              <a:t>OpenSCAD Modeling Practice</a:t>
+            </a:r>
+          </a:p>
+        </p:txBody>
+      </p:sp>
+      <p:sp>
+        <p:nvSpPr>
+          <p:cNvPr id="5" name="Subtitle 4">
+            <a:extLst>
+              <a:ext uri="{FF2B5EF4-FFF2-40B4-BE49-F238E27FC236}">
+                <a16:creationId xmlns:a16="http://schemas.microsoft.com/office/drawing/2014/main" id="{4B2FCE2E-86B8-4A2C-B7B7-0B929427A000}"/>
+              </a:ext>
+            </a:extLst>
+          </p:cNvPr>
+          <p:cNvSpPr>
+            <a:spLocks noGrp="1"/>
+          </p:cNvSpPr>
+          <p:nvPr>
+            <p:ph type="subTitle" idx="1"/>
+          </p:nvPr>
+        </p:nvSpPr>
+        <p:spPr>
+          <a:xfrm>
+            <a:off x="581194" y="2127739"/>
+            <a:ext cx="10993546" cy="958028"/>
+          </a:xfrm>
+        </p:spPr>
+        <p:txBody>
+          <a:bodyPr>
+            <a:normAutofit fontScale="92500" lnSpcReduction="20000"/>
+          </a:bodyPr>
+          <a:lstStyle/>
+          <a:p>
+            <a:r>
+              <a:rPr lang="en-US" sz="3600" cap="none" dirty="0"/>
+              <a:t>OpenSCAD Tutorial/Chapter 7 (part 2 – More Complex Patterns – Spoked_Wheel)</a:t>
+            </a:r>
+          </a:p>
+        </p:txBody>
+      </p:sp>
+      <p:pic>
+        <p:nvPicPr>
+          <p:cNvPr id="6" name="Picture 5" descr="A yellow and green object with holes&#10;&#10;Description automatically generated">
+            <a:extLst>
+              <a:ext uri="{FF2B5EF4-FFF2-40B4-BE49-F238E27FC236}">
+                <a16:creationId xmlns:a16="http://schemas.microsoft.com/office/drawing/2014/main" id="{0731BA8F-6478-2556-A80D-8B9077A55A1F}"/>
+              </a:ext>
+            </a:extLst>
+          </p:cNvPr>
+          <p:cNvPicPr>
+            <a:picLocks noChangeAspect="1"/>
+          </p:cNvPicPr>
+          <p:nvPr/>
+        </p:nvPicPr>
+        <p:blipFill>
+          <a:blip r:embed="rId2"/>
+          <a:stretch>
+            <a:fillRect/>
+          </a:stretch>
+        </p:blipFill>
+        <p:spPr>
+          <a:xfrm>
+            <a:off x="9101136" y="3458306"/>
+            <a:ext cx="1950794" cy="1623642"/>
+          </a:xfrm>
+          <a:prstGeom prst="roundRect">
+            <a:avLst>
+              <a:gd name="adj" fmla="val 8594"/>
+            </a:avLst>
+          </a:prstGeom>
+          <a:solidFill>
+            <a:srgbClr val="FFFFFF">
+              <a:shade val="85000"/>
+            </a:srgbClr>
+          </a:solidFill>
+          <a:ln>
+            <a:noFill/>
+          </a:ln>
+          <a:effectLst>
+            <a:reflection blurRad="12700" stA="38000" endPos="28000" dist="5000" dir="5400000" sy="-100000" algn="bl" rotWithShape="0"/>
+          </a:effectLst>
+        </p:spPr>
+      </p:pic>
+      <p:pic>
+        <p:nvPicPr>
+          <p:cNvPr id="7" name="Picture 6">
+            <a:extLst>
+              <a:ext uri="{FF2B5EF4-FFF2-40B4-BE49-F238E27FC236}">
+                <a16:creationId xmlns:a16="http://schemas.microsoft.com/office/drawing/2014/main" id="{FCFD5A29-A275-E86A-8871-E3A933BCBFBA}"/>
+              </a:ext>
+            </a:extLst>
+          </p:cNvPr>
+          <p:cNvPicPr>
+            <a:picLocks noChangeAspect="1"/>
+          </p:cNvPicPr>
+          <p:nvPr/>
+        </p:nvPicPr>
+        <p:blipFill>
+          <a:blip r:embed="rId3"/>
+          <a:stretch>
+            <a:fillRect/>
+          </a:stretch>
+        </p:blipFill>
+        <p:spPr>
+          <a:xfrm>
+            <a:off x="2561858" y="3368186"/>
+            <a:ext cx="3305175" cy="2733675"/>
+          </a:xfrm>
+          <a:prstGeom prst="rect">
+            <a:avLst/>
+          </a:prstGeom>
+          <a:ln>
+            <a:noFill/>
+          </a:ln>
+          <a:effectLst>
+            <a:outerShdw blurRad="292100" dist="139700" dir="2700000" algn="tl" rotWithShape="0">
+              <a:srgbClr val="333333">
+                <a:alpha val="65000"/>
+              </a:srgbClr>
+            </a:outerShdw>
+          </a:effectLst>
+        </p:spPr>
+      </p:pic>
+    </p:spTree>
+    <p:extLst>
+      <p:ext uri="{BB962C8B-B14F-4D97-AF65-F5344CB8AC3E}">
+        <p14:creationId xmlns:p14="http://schemas.microsoft.com/office/powerpoint/2010/main" val="2925498711"/>
+      </p:ext>
+    </p:extLst>
+  </p:cSld>
+  <p:clrMapOvr>
+    <a:masterClrMapping/>
+  </p:clrMapOvr>
+</p:sld>
+</file>
+
+<file path=ppt/slides/slide27.xml><?xml version="1.0" encoding="utf-8"?>
+<p:sld xmlns:a="http://schemas.openxmlformats.org/drawingml/2006/main" xmlns:r="http://schemas.openxmlformats.org/officeDocument/2006/relationships" xmlns:p="http://schemas.openxmlformats.org/presentationml/2006/main">
+  <p:cSld>
+    <p:spTree>
+      <p:nvGrpSpPr>
+        <p:cNvPr id="1" name=""/>
+        <p:cNvGrpSpPr/>
+        <p:nvPr/>
+      </p:nvGrpSpPr>
+      <p:grpSpPr>
+        <a:xfrm>
+          <a:off x="0" y="0"/>
+          <a:ext cx="0" cy="0"/>
+          <a:chOff x="0" y="0"/>
+          <a:chExt cx="0" cy="0"/>
+        </a:xfrm>
+      </p:grpSpPr>
+      <p:sp>
+        <p:nvSpPr>
+          <p:cNvPr id="4" name="Title 3">
+            <a:extLst>
+              <a:ext uri="{FF2B5EF4-FFF2-40B4-BE49-F238E27FC236}">
+                <a16:creationId xmlns:a16="http://schemas.microsoft.com/office/drawing/2014/main" id="{1E1A75EA-3DE1-6BD1-8A84-A8D3D57E2F03}"/>
+              </a:ext>
+            </a:extLst>
+          </p:cNvPr>
+          <p:cNvSpPr>
+            <a:spLocks noGrp="1"/>
+          </p:cNvSpPr>
+          <p:nvPr>
+            <p:ph type="ctrTitle"/>
+          </p:nvPr>
+        </p:nvSpPr>
+        <p:spPr>
+          <a:xfrm>
+            <a:off x="581191" y="756139"/>
+            <a:ext cx="10993549" cy="1072662"/>
+          </a:xfrm>
+        </p:spPr>
+        <p:txBody>
+          <a:bodyPr>
+            <a:normAutofit/>
+          </a:bodyPr>
+          <a:lstStyle/>
+          <a:p>
+            <a:r>
+              <a:rPr lang="en-US" sz="4800" cap="none" dirty="0"/>
+              <a:t>OpenSCAD Modeling Practice</a:t>
+            </a:r>
+          </a:p>
+        </p:txBody>
+      </p:sp>
+      <p:sp>
+        <p:nvSpPr>
+          <p:cNvPr id="5" name="Subtitle 4">
+            <a:extLst>
+              <a:ext uri="{FF2B5EF4-FFF2-40B4-BE49-F238E27FC236}">
+                <a16:creationId xmlns:a16="http://schemas.microsoft.com/office/drawing/2014/main" id="{4B2FCE2E-86B8-4A2C-B7B7-0B929427A000}"/>
+              </a:ext>
+            </a:extLst>
+          </p:cNvPr>
+          <p:cNvSpPr>
+            <a:spLocks noGrp="1"/>
+          </p:cNvSpPr>
+          <p:nvPr>
+            <p:ph type="subTitle" idx="1"/>
+          </p:nvPr>
+        </p:nvSpPr>
+        <p:spPr>
+          <a:xfrm>
+            <a:off x="581194" y="2127739"/>
+            <a:ext cx="10993546" cy="958028"/>
+          </a:xfrm>
+        </p:spPr>
+        <p:txBody>
+          <a:bodyPr>
+            <a:normAutofit fontScale="92500" lnSpcReduction="20000"/>
+          </a:bodyPr>
+          <a:lstStyle/>
+          <a:p>
+            <a:r>
+              <a:rPr lang="en-US" sz="3600" cap="none" dirty="0"/>
+              <a:t>OpenSCAD Tutorial/Chapter 7 (part 2 – More Complex Patterns – Car with Spoked_Wheels)</a:t>
+            </a:r>
+          </a:p>
+        </p:txBody>
+      </p:sp>
+      <p:pic>
+        <p:nvPicPr>
+          <p:cNvPr id="6" name="Picture 5" descr="A yellow and green object with holes&#10;&#10;Description automatically generated">
+            <a:extLst>
+              <a:ext uri="{FF2B5EF4-FFF2-40B4-BE49-F238E27FC236}">
+                <a16:creationId xmlns:a16="http://schemas.microsoft.com/office/drawing/2014/main" id="{0731BA8F-6478-2556-A80D-8B9077A55A1F}"/>
+              </a:ext>
+            </a:extLst>
+          </p:cNvPr>
+          <p:cNvPicPr>
+            <a:picLocks noChangeAspect="1"/>
+          </p:cNvPicPr>
+          <p:nvPr/>
+        </p:nvPicPr>
+        <p:blipFill>
+          <a:blip r:embed="rId2"/>
+          <a:stretch>
+            <a:fillRect/>
+          </a:stretch>
+        </p:blipFill>
+        <p:spPr>
+          <a:xfrm>
+            <a:off x="9101136" y="3458306"/>
+            <a:ext cx="1950794" cy="1623642"/>
+          </a:xfrm>
+          <a:prstGeom prst="roundRect">
+            <a:avLst>
+              <a:gd name="adj" fmla="val 8594"/>
+            </a:avLst>
+          </a:prstGeom>
+          <a:solidFill>
+            <a:srgbClr val="FFFFFF">
+              <a:shade val="85000"/>
+            </a:srgbClr>
+          </a:solidFill>
+          <a:ln>
+            <a:noFill/>
+          </a:ln>
+          <a:effectLst>
+            <a:reflection blurRad="12700" stA="38000" endPos="28000" dist="5000" dir="5400000" sy="-100000" algn="bl" rotWithShape="0"/>
+          </a:effectLst>
+        </p:spPr>
+      </p:pic>
+      <p:pic>
+        <p:nvPicPr>
+          <p:cNvPr id="7" name="Picture 6">
+            <a:extLst>
+              <a:ext uri="{FF2B5EF4-FFF2-40B4-BE49-F238E27FC236}">
+                <a16:creationId xmlns:a16="http://schemas.microsoft.com/office/drawing/2014/main" id="{AD105070-3EB9-7991-1F07-0DF4EC8E8711}"/>
+              </a:ext>
+            </a:extLst>
+          </p:cNvPr>
+          <p:cNvPicPr>
+            <a:picLocks noChangeAspect="1"/>
+          </p:cNvPicPr>
+          <p:nvPr/>
+        </p:nvPicPr>
+        <p:blipFill>
+          <a:blip r:embed="rId3"/>
+          <a:stretch>
+            <a:fillRect/>
+          </a:stretch>
+        </p:blipFill>
+        <p:spPr>
+          <a:xfrm>
+            <a:off x="2474668" y="3429000"/>
+            <a:ext cx="4153671" cy="2672861"/>
+          </a:xfrm>
+          <a:prstGeom prst="rect">
+            <a:avLst/>
+          </a:prstGeom>
+          <a:ln>
+            <a:noFill/>
+          </a:ln>
+          <a:effectLst>
+            <a:outerShdw blurRad="292100" dist="139700" dir="2700000" algn="tl" rotWithShape="0">
+              <a:srgbClr val="333333">
+                <a:alpha val="65000"/>
+              </a:srgbClr>
+            </a:outerShdw>
+          </a:effectLst>
+        </p:spPr>
+      </p:pic>
+    </p:spTree>
+    <p:extLst>
+      <p:ext uri="{BB962C8B-B14F-4D97-AF65-F5344CB8AC3E}">
+        <p14:creationId xmlns:p14="http://schemas.microsoft.com/office/powerpoint/2010/main" val="3896617627"/>
+      </p:ext>
+    </p:extLst>
+  </p:cSld>
+  <p:clrMapOvr>
+    <a:masterClrMapping/>
+  </p:clrMapOvr>
+</p:sld>
+</file>
+
+<file path=ppt/slides/slide28.xml><?xml version="1.0" encoding="utf-8"?>
+<p:sld xmlns:a="http://schemas.openxmlformats.org/drawingml/2006/main" xmlns:r="http://schemas.openxmlformats.org/officeDocument/2006/relationships" xmlns:p="http://schemas.openxmlformats.org/presentationml/2006/main">
+  <p:cSld>
+    <p:spTree>
+      <p:nvGrpSpPr>
+        <p:cNvPr id="1" name=""/>
+        <p:cNvGrpSpPr/>
+        <p:nvPr/>
+      </p:nvGrpSpPr>
+      <p:grpSpPr>
+        <a:xfrm>
+          <a:off x="0" y="0"/>
+          <a:ext cx="0" cy="0"/>
+          <a:chOff x="0" y="0"/>
+          <a:chExt cx="0" cy="0"/>
+        </a:xfrm>
+      </p:grpSpPr>
+      <p:sp>
+        <p:nvSpPr>
+          <p:cNvPr id="4" name="Title 3">
+            <a:extLst>
+              <a:ext uri="{FF2B5EF4-FFF2-40B4-BE49-F238E27FC236}">
+                <a16:creationId xmlns:a16="http://schemas.microsoft.com/office/drawing/2014/main" id="{1E1A75EA-3DE1-6BD1-8A84-A8D3D57E2F03}"/>
+              </a:ext>
+            </a:extLst>
+          </p:cNvPr>
+          <p:cNvSpPr>
+            <a:spLocks noGrp="1"/>
+          </p:cNvSpPr>
+          <p:nvPr>
+            <p:ph type="ctrTitle"/>
+          </p:nvPr>
+        </p:nvSpPr>
+        <p:spPr>
+          <a:xfrm>
+            <a:off x="581191" y="756139"/>
+            <a:ext cx="10993549" cy="1072662"/>
+          </a:xfrm>
+        </p:spPr>
+        <p:txBody>
+          <a:bodyPr>
+            <a:normAutofit/>
+          </a:bodyPr>
+          <a:lstStyle/>
+          <a:p>
+            <a:r>
+              <a:rPr lang="en-US" sz="4800" cap="none" dirty="0"/>
+              <a:t>OpenSCAD Modeling Practice</a:t>
+            </a:r>
+          </a:p>
+        </p:txBody>
+      </p:sp>
+      <p:sp>
+        <p:nvSpPr>
+          <p:cNvPr id="5" name="Subtitle 4">
+            <a:extLst>
+              <a:ext uri="{FF2B5EF4-FFF2-40B4-BE49-F238E27FC236}">
+                <a16:creationId xmlns:a16="http://schemas.microsoft.com/office/drawing/2014/main" id="{4B2FCE2E-86B8-4A2C-B7B7-0B929427A000}"/>
+              </a:ext>
+            </a:extLst>
+          </p:cNvPr>
+          <p:cNvSpPr>
+            <a:spLocks noGrp="1"/>
+          </p:cNvSpPr>
+          <p:nvPr>
+            <p:ph type="subTitle" idx="1"/>
+          </p:nvPr>
+        </p:nvSpPr>
+        <p:spPr>
+          <a:xfrm>
+            <a:off x="581194" y="2127739"/>
+            <a:ext cx="10993546" cy="958028"/>
+          </a:xfrm>
+        </p:spPr>
+        <p:txBody>
+          <a:bodyPr>
+            <a:normAutofit fontScale="92500"/>
+          </a:bodyPr>
+          <a:lstStyle/>
+          <a:p>
+            <a:r>
+              <a:rPr lang="en-US" sz="3600" cap="none" dirty="0"/>
+              <a:t>OpenSCAD Tutorial/Chapter 7 (part 3 – Nested For Loops)</a:t>
+            </a:r>
+          </a:p>
+        </p:txBody>
+      </p:sp>
+      <p:pic>
+        <p:nvPicPr>
+          <p:cNvPr id="6" name="Picture 5" descr="A yellow and green object with holes&#10;&#10;Description automatically generated">
+            <a:extLst>
+              <a:ext uri="{FF2B5EF4-FFF2-40B4-BE49-F238E27FC236}">
+                <a16:creationId xmlns:a16="http://schemas.microsoft.com/office/drawing/2014/main" id="{0731BA8F-6478-2556-A80D-8B9077A55A1F}"/>
+              </a:ext>
+            </a:extLst>
+          </p:cNvPr>
+          <p:cNvPicPr>
+            <a:picLocks noChangeAspect="1"/>
+          </p:cNvPicPr>
+          <p:nvPr/>
+        </p:nvPicPr>
+        <p:blipFill>
+          <a:blip r:embed="rId2"/>
+          <a:stretch>
+            <a:fillRect/>
+          </a:stretch>
+        </p:blipFill>
+        <p:spPr>
+          <a:xfrm>
+            <a:off x="9101136" y="3458306"/>
+            <a:ext cx="1950794" cy="1623642"/>
+          </a:xfrm>
+          <a:prstGeom prst="roundRect">
+            <a:avLst>
+              <a:gd name="adj" fmla="val 8594"/>
+            </a:avLst>
+          </a:prstGeom>
+          <a:solidFill>
+            <a:srgbClr val="FFFFFF">
+              <a:shade val="85000"/>
+            </a:srgbClr>
+          </a:solidFill>
+          <a:ln>
+            <a:noFill/>
+          </a:ln>
+          <a:effectLst>
+            <a:reflection blurRad="12700" stA="38000" endPos="28000" dist="5000" dir="5400000" sy="-100000" algn="bl" rotWithShape="0"/>
+          </a:effectLst>
+        </p:spPr>
+      </p:pic>
+      <p:pic>
+        <p:nvPicPr>
+          <p:cNvPr id="3" name="Picture 2">
+            <a:extLst>
+              <a:ext uri="{FF2B5EF4-FFF2-40B4-BE49-F238E27FC236}">
+                <a16:creationId xmlns:a16="http://schemas.microsoft.com/office/drawing/2014/main" id="{BADCE95D-F494-E642-001C-C363132B6FD3}"/>
+              </a:ext>
+            </a:extLst>
+          </p:cNvPr>
+          <p:cNvPicPr>
+            <a:picLocks noChangeAspect="1"/>
+          </p:cNvPicPr>
+          <p:nvPr/>
+        </p:nvPicPr>
+        <p:blipFill>
+          <a:blip r:embed="rId3"/>
+          <a:stretch>
+            <a:fillRect/>
+          </a:stretch>
+        </p:blipFill>
+        <p:spPr>
+          <a:xfrm>
+            <a:off x="2416053" y="3268154"/>
+            <a:ext cx="4090255" cy="2853127"/>
+          </a:xfrm>
+          <a:prstGeom prst="rect">
+            <a:avLst/>
+          </a:prstGeom>
+          <a:ln>
+            <a:noFill/>
+          </a:ln>
+          <a:effectLst>
+            <a:outerShdw blurRad="292100" dist="139700" dir="2700000" algn="tl" rotWithShape="0">
+              <a:srgbClr val="333333">
+                <a:alpha val="65000"/>
+              </a:srgbClr>
+            </a:outerShdw>
+          </a:effectLst>
+        </p:spPr>
+      </p:pic>
+    </p:spTree>
+    <p:extLst>
+      <p:ext uri="{BB962C8B-B14F-4D97-AF65-F5344CB8AC3E}">
+        <p14:creationId xmlns:p14="http://schemas.microsoft.com/office/powerpoint/2010/main" val="3752950023"/>
       </p:ext>
     </p:extLst>
   </p:cSld>
@@ -10073,15 +11177,6 @@
 </file>
 
 <file path=customXml/item1.xml><?xml version="1.0" encoding="utf-8"?>
-<?mso-contentType ?>
-<FormTemplates xmlns="http://schemas.microsoft.com/sharepoint/v3/contenttype/forms">
-  <Display>DocumentLibraryForm</Display>
-  <Edit>DocumentLibraryForm</Edit>
-  <New>DocumentLibraryForm</New>
-</FormTemplates>
-</file>
-
-<file path=customXml/item2.xml><?xml version="1.0" encoding="utf-8"?>
 <ct:contentTypeSchema xmlns:ct="http://schemas.microsoft.com/office/2006/metadata/contentType" xmlns:ma="http://schemas.microsoft.com/office/2006/metadata/properties/metaAttributes" ct:_="" ma:_="" ma:contentTypeName="Document" ma:contentTypeID="0x01010079F111ED35F8CC479449609E8A0923A6" ma:contentTypeVersion="27" ma:contentTypeDescription="Create a new document." ma:contentTypeScope="" ma:versionID="c6f9a84f66a9c8b9a21755b9ffafb945">
   <xsd:schema xmlns:xsd="http://www.w3.org/2001/XMLSchema" xmlns:xs="http://www.w3.org/2001/XMLSchema" xmlns:p="http://schemas.microsoft.com/office/2006/metadata/properties" xmlns:ns1="http://schemas.microsoft.com/sharepoint/v3" xmlns:ns2="71af3243-3dd4-4a8d-8c0d-dd76da1f02a5" xmlns:ns3="16c05727-aa75-4e4a-9b5f-8a80a1165891" xmlns:ns4="230e9df3-be65-4c73-a93b-d1236ebd677e" targetNamespace="http://schemas.microsoft.com/office/2006/metadata/properties" ma:root="true" ma:fieldsID="27df39e3e7036dff54f89ddd5805ce72" ns1:_="" ns2:_="" ns3:_="" ns4:_="">
     <xsd:import namespace="http://schemas.microsoft.com/sharepoint/v3"/>
@@ -10387,6 +11482,15 @@
 </ct:contentTypeSchema>
 </file>
 
+<file path=customXml/item2.xml><?xml version="1.0" encoding="utf-8"?>
+<?mso-contentType ?>
+<FormTemplates xmlns="http://schemas.microsoft.com/sharepoint/v3/contenttype/forms">
+  <Display>DocumentLibraryForm</Display>
+  <Edit>DocumentLibraryForm</Edit>
+  <New>DocumentLibraryForm</New>
+</FormTemplates>
+</file>
+
 <file path=customXml/item3.xml><?xml version="1.0" encoding="utf-8"?>
 <p:properties xmlns:p="http://schemas.microsoft.com/office/2006/metadata/properties" xmlns:xsi="http://www.w3.org/2001/XMLSchema-instance" xmlns:pc="http://schemas.microsoft.com/office/infopath/2007/PartnerControls">
   <documentManagement>
@@ -10408,14 +11512,6 @@
 </file>
 
 <file path=customXml/itemProps1.xml><?xml version="1.0" encoding="utf-8"?>
-<ds:datastoreItem xmlns:ds="http://schemas.openxmlformats.org/officeDocument/2006/customXml" ds:itemID="{342D3C2F-55A5-48C0-9D5A-95C7FF0389D0}">
-  <ds:schemaRefs>
-    <ds:schemaRef ds:uri="http://schemas.microsoft.com/sharepoint/v3/contenttype/forms"/>
-  </ds:schemaRefs>
-</ds:datastoreItem>
-</file>
-
-<file path=customXml/itemProps2.xml><?xml version="1.0" encoding="utf-8"?>
 <ds:datastoreItem xmlns:ds="http://schemas.openxmlformats.org/officeDocument/2006/customXml" ds:itemID="{792209EB-3212-4116-B574-D1F56C7C4922}">
   <ds:schemaRefs>
     <ds:schemaRef ds:uri="http://schemas.microsoft.com/office/2006/metadata/contentType"/>
@@ -10436,6 +11532,14 @@
 </ds:datastoreItem>
 </file>
 
+<file path=customXml/itemProps2.xml><?xml version="1.0" encoding="utf-8"?>
+<ds:datastoreItem xmlns:ds="http://schemas.openxmlformats.org/officeDocument/2006/customXml" ds:itemID="{342D3C2F-55A5-48C0-9D5A-95C7FF0389D0}">
+  <ds:schemaRefs>
+    <ds:schemaRef ds:uri="http://schemas.microsoft.com/sharepoint/v3/contenttype/forms"/>
+  </ds:schemaRefs>
+</ds:datastoreItem>
+</file>
+
 <file path=customXml/itemProps3.xml><?xml version="1.0" encoding="utf-8"?>
 <ds:datastoreItem xmlns:ds="http://schemas.openxmlformats.org/officeDocument/2006/customXml" ds:itemID="{3791575F-4C21-47C4-8D13-EB9BE66B536F}">
   <ds:schemaRefs>

</xml_diff>